<commit_message>
solved some startup timing bugs
</commit_message>
<xml_diff>
--- a/graphics/Presentation1.pptx
+++ b/graphics/Presentation1.pptx
@@ -5864,23 +5864,4096 @@
           <a:chExt cx="0" cy="0"/>
         </a:xfrm>
       </p:grpSpPr>
+      <p:sp>
+        <p:nvSpPr>
+          <p:cNvPr id="13" name="Freeform 12"/>
+          <p:cNvSpPr/>
+          <p:nvPr/>
+        </p:nvSpPr>
+        <p:spPr>
+          <a:xfrm>
+            <a:off x="5612730" y="907471"/>
+            <a:ext cx="1834550" cy="1398610"/>
+          </a:xfrm>
+          <a:custGeom>
+            <a:avLst/>
+            <a:gdLst>
+              <a:gd name="connsiteX0" fmla="*/ 609600 w 2885440"/>
+              <a:gd name="connsiteY0" fmla="*/ 2194560 h 2194560"/>
+              <a:gd name="connsiteX1" fmla="*/ 629920 w 2885440"/>
+              <a:gd name="connsiteY1" fmla="*/ 1788160 h 2194560"/>
+              <a:gd name="connsiteX2" fmla="*/ 0 w 2885440"/>
+              <a:gd name="connsiteY2" fmla="*/ 1117600 h 2194560"/>
+              <a:gd name="connsiteX3" fmla="*/ 1249680 w 2885440"/>
+              <a:gd name="connsiteY3" fmla="*/ 0 h 2194560"/>
+              <a:gd name="connsiteX4" fmla="*/ 2824480 w 2885440"/>
+              <a:gd name="connsiteY4" fmla="*/ 873760 h 2194560"/>
+              <a:gd name="connsiteX5" fmla="*/ 2885440 w 2885440"/>
+              <a:gd name="connsiteY5" fmla="*/ 944880 h 2194560"/>
+              <a:gd name="connsiteX6" fmla="*/ 1757680 w 2885440"/>
+              <a:gd name="connsiteY6" fmla="*/ 1737360 h 2194560"/>
+              <a:gd name="connsiteX7" fmla="*/ 1320800 w 2885440"/>
+              <a:gd name="connsiteY7" fmla="*/ 1666240 h 2194560"/>
+              <a:gd name="connsiteX8" fmla="*/ 609600 w 2885440"/>
+              <a:gd name="connsiteY8" fmla="*/ 2194560 h 2194560"/>
+              <a:gd name="connsiteX0" fmla="*/ 620973 w 2896813"/>
+              <a:gd name="connsiteY0" fmla="*/ 2194560 h 2194560"/>
+              <a:gd name="connsiteX1" fmla="*/ 641293 w 2896813"/>
+              <a:gd name="connsiteY1" fmla="*/ 1788160 h 2194560"/>
+              <a:gd name="connsiteX2" fmla="*/ 11373 w 2896813"/>
+              <a:gd name="connsiteY2" fmla="*/ 1117600 h 2194560"/>
+              <a:gd name="connsiteX3" fmla="*/ 1261053 w 2896813"/>
+              <a:gd name="connsiteY3" fmla="*/ 0 h 2194560"/>
+              <a:gd name="connsiteX4" fmla="*/ 2835853 w 2896813"/>
+              <a:gd name="connsiteY4" fmla="*/ 873760 h 2194560"/>
+              <a:gd name="connsiteX5" fmla="*/ 2896813 w 2896813"/>
+              <a:gd name="connsiteY5" fmla="*/ 944880 h 2194560"/>
+              <a:gd name="connsiteX6" fmla="*/ 1769053 w 2896813"/>
+              <a:gd name="connsiteY6" fmla="*/ 1737360 h 2194560"/>
+              <a:gd name="connsiteX7" fmla="*/ 1332173 w 2896813"/>
+              <a:gd name="connsiteY7" fmla="*/ 1666240 h 2194560"/>
+              <a:gd name="connsiteX8" fmla="*/ 620973 w 2896813"/>
+              <a:gd name="connsiteY8" fmla="*/ 2194560 h 2194560"/>
+              <a:gd name="connsiteX0" fmla="*/ 620973 w 2896813"/>
+              <a:gd name="connsiteY0" fmla="*/ 2242785 h 2242785"/>
+              <a:gd name="connsiteX1" fmla="*/ 641293 w 2896813"/>
+              <a:gd name="connsiteY1" fmla="*/ 1836385 h 2242785"/>
+              <a:gd name="connsiteX2" fmla="*/ 11373 w 2896813"/>
+              <a:gd name="connsiteY2" fmla="*/ 1165825 h 2242785"/>
+              <a:gd name="connsiteX3" fmla="*/ 1261053 w 2896813"/>
+              <a:gd name="connsiteY3" fmla="*/ 48225 h 2242785"/>
+              <a:gd name="connsiteX4" fmla="*/ 2835853 w 2896813"/>
+              <a:gd name="connsiteY4" fmla="*/ 921985 h 2242785"/>
+              <a:gd name="connsiteX5" fmla="*/ 2896813 w 2896813"/>
+              <a:gd name="connsiteY5" fmla="*/ 993105 h 2242785"/>
+              <a:gd name="connsiteX6" fmla="*/ 1769053 w 2896813"/>
+              <a:gd name="connsiteY6" fmla="*/ 1785585 h 2242785"/>
+              <a:gd name="connsiteX7" fmla="*/ 1332173 w 2896813"/>
+              <a:gd name="connsiteY7" fmla="*/ 1714465 h 2242785"/>
+              <a:gd name="connsiteX8" fmla="*/ 620973 w 2896813"/>
+              <a:gd name="connsiteY8" fmla="*/ 2242785 h 2242785"/>
+              <a:gd name="connsiteX0" fmla="*/ 620973 w 3136213"/>
+              <a:gd name="connsiteY0" fmla="*/ 2242785 h 2242785"/>
+              <a:gd name="connsiteX1" fmla="*/ 641293 w 3136213"/>
+              <a:gd name="connsiteY1" fmla="*/ 1836385 h 2242785"/>
+              <a:gd name="connsiteX2" fmla="*/ 11373 w 3136213"/>
+              <a:gd name="connsiteY2" fmla="*/ 1165825 h 2242785"/>
+              <a:gd name="connsiteX3" fmla="*/ 1261053 w 3136213"/>
+              <a:gd name="connsiteY3" fmla="*/ 48225 h 2242785"/>
+              <a:gd name="connsiteX4" fmla="*/ 2835853 w 3136213"/>
+              <a:gd name="connsiteY4" fmla="*/ 921985 h 2242785"/>
+              <a:gd name="connsiteX5" fmla="*/ 2896813 w 3136213"/>
+              <a:gd name="connsiteY5" fmla="*/ 993105 h 2242785"/>
+              <a:gd name="connsiteX6" fmla="*/ 1769053 w 3136213"/>
+              <a:gd name="connsiteY6" fmla="*/ 1785585 h 2242785"/>
+              <a:gd name="connsiteX7" fmla="*/ 1332173 w 3136213"/>
+              <a:gd name="connsiteY7" fmla="*/ 1714465 h 2242785"/>
+              <a:gd name="connsiteX8" fmla="*/ 620973 w 3136213"/>
+              <a:gd name="connsiteY8" fmla="*/ 2242785 h 2242785"/>
+              <a:gd name="connsiteX0" fmla="*/ 620973 w 2896813"/>
+              <a:gd name="connsiteY0" fmla="*/ 2242785 h 2242785"/>
+              <a:gd name="connsiteX1" fmla="*/ 641293 w 2896813"/>
+              <a:gd name="connsiteY1" fmla="*/ 1836385 h 2242785"/>
+              <a:gd name="connsiteX2" fmla="*/ 11373 w 2896813"/>
+              <a:gd name="connsiteY2" fmla="*/ 1165825 h 2242785"/>
+              <a:gd name="connsiteX3" fmla="*/ 1261053 w 2896813"/>
+              <a:gd name="connsiteY3" fmla="*/ 48225 h 2242785"/>
+              <a:gd name="connsiteX4" fmla="*/ 2896813 w 2896813"/>
+              <a:gd name="connsiteY4" fmla="*/ 993105 h 2242785"/>
+              <a:gd name="connsiteX5" fmla="*/ 1769053 w 2896813"/>
+              <a:gd name="connsiteY5" fmla="*/ 1785585 h 2242785"/>
+              <a:gd name="connsiteX6" fmla="*/ 1332173 w 2896813"/>
+              <a:gd name="connsiteY6" fmla="*/ 1714465 h 2242785"/>
+              <a:gd name="connsiteX7" fmla="*/ 620973 w 2896813"/>
+              <a:gd name="connsiteY7" fmla="*/ 2242785 h 2242785"/>
+              <a:gd name="connsiteX0" fmla="*/ 620973 w 3020934"/>
+              <a:gd name="connsiteY0" fmla="*/ 2242785 h 2242785"/>
+              <a:gd name="connsiteX1" fmla="*/ 641293 w 3020934"/>
+              <a:gd name="connsiteY1" fmla="*/ 1836385 h 2242785"/>
+              <a:gd name="connsiteX2" fmla="*/ 11373 w 3020934"/>
+              <a:gd name="connsiteY2" fmla="*/ 1165825 h 2242785"/>
+              <a:gd name="connsiteX3" fmla="*/ 1261053 w 3020934"/>
+              <a:gd name="connsiteY3" fmla="*/ 48225 h 2242785"/>
+              <a:gd name="connsiteX4" fmla="*/ 2896813 w 3020934"/>
+              <a:gd name="connsiteY4" fmla="*/ 993105 h 2242785"/>
+              <a:gd name="connsiteX5" fmla="*/ 1769053 w 3020934"/>
+              <a:gd name="connsiteY5" fmla="*/ 1785585 h 2242785"/>
+              <a:gd name="connsiteX6" fmla="*/ 1332173 w 3020934"/>
+              <a:gd name="connsiteY6" fmla="*/ 1714465 h 2242785"/>
+              <a:gd name="connsiteX7" fmla="*/ 620973 w 3020934"/>
+              <a:gd name="connsiteY7" fmla="*/ 2242785 h 2242785"/>
+              <a:gd name="connsiteX0" fmla="*/ 620973 w 2901590"/>
+              <a:gd name="connsiteY0" fmla="*/ 2242785 h 2242785"/>
+              <a:gd name="connsiteX1" fmla="*/ 641293 w 2901590"/>
+              <a:gd name="connsiteY1" fmla="*/ 1836385 h 2242785"/>
+              <a:gd name="connsiteX2" fmla="*/ 11373 w 2901590"/>
+              <a:gd name="connsiteY2" fmla="*/ 1165825 h 2242785"/>
+              <a:gd name="connsiteX3" fmla="*/ 1261053 w 2901590"/>
+              <a:gd name="connsiteY3" fmla="*/ 48225 h 2242785"/>
+              <a:gd name="connsiteX4" fmla="*/ 2896813 w 2901590"/>
+              <a:gd name="connsiteY4" fmla="*/ 993105 h 2242785"/>
+              <a:gd name="connsiteX5" fmla="*/ 1769053 w 2901590"/>
+              <a:gd name="connsiteY5" fmla="*/ 1785585 h 2242785"/>
+              <a:gd name="connsiteX6" fmla="*/ 1332173 w 2901590"/>
+              <a:gd name="connsiteY6" fmla="*/ 1714465 h 2242785"/>
+              <a:gd name="connsiteX7" fmla="*/ 620973 w 2901590"/>
+              <a:gd name="connsiteY7" fmla="*/ 2242785 h 2242785"/>
+              <a:gd name="connsiteX0" fmla="*/ 620973 w 2901590"/>
+              <a:gd name="connsiteY0" fmla="*/ 2242785 h 2242785"/>
+              <a:gd name="connsiteX1" fmla="*/ 641293 w 2901590"/>
+              <a:gd name="connsiteY1" fmla="*/ 1836385 h 2242785"/>
+              <a:gd name="connsiteX2" fmla="*/ 11373 w 2901590"/>
+              <a:gd name="connsiteY2" fmla="*/ 1165825 h 2242785"/>
+              <a:gd name="connsiteX3" fmla="*/ 1261053 w 2901590"/>
+              <a:gd name="connsiteY3" fmla="*/ 48225 h 2242785"/>
+              <a:gd name="connsiteX4" fmla="*/ 2896813 w 2901590"/>
+              <a:gd name="connsiteY4" fmla="*/ 993105 h 2242785"/>
+              <a:gd name="connsiteX5" fmla="*/ 1769053 w 2901590"/>
+              <a:gd name="connsiteY5" fmla="*/ 1785585 h 2242785"/>
+              <a:gd name="connsiteX6" fmla="*/ 1332173 w 2901590"/>
+              <a:gd name="connsiteY6" fmla="*/ 1714465 h 2242785"/>
+              <a:gd name="connsiteX7" fmla="*/ 620973 w 2901590"/>
+              <a:gd name="connsiteY7" fmla="*/ 2242785 h 2242785"/>
+              <a:gd name="connsiteX0" fmla="*/ 620973 w 3020934"/>
+              <a:gd name="connsiteY0" fmla="*/ 2242785 h 2242785"/>
+              <a:gd name="connsiteX1" fmla="*/ 641293 w 3020934"/>
+              <a:gd name="connsiteY1" fmla="*/ 1836385 h 2242785"/>
+              <a:gd name="connsiteX2" fmla="*/ 11373 w 3020934"/>
+              <a:gd name="connsiteY2" fmla="*/ 1165825 h 2242785"/>
+              <a:gd name="connsiteX3" fmla="*/ 1261053 w 3020934"/>
+              <a:gd name="connsiteY3" fmla="*/ 48225 h 2242785"/>
+              <a:gd name="connsiteX4" fmla="*/ 2896813 w 3020934"/>
+              <a:gd name="connsiteY4" fmla="*/ 993105 h 2242785"/>
+              <a:gd name="connsiteX5" fmla="*/ 1769053 w 3020934"/>
+              <a:gd name="connsiteY5" fmla="*/ 1785585 h 2242785"/>
+              <a:gd name="connsiteX6" fmla="*/ 1332173 w 3020934"/>
+              <a:gd name="connsiteY6" fmla="*/ 1714465 h 2242785"/>
+              <a:gd name="connsiteX7" fmla="*/ 620973 w 3020934"/>
+              <a:gd name="connsiteY7" fmla="*/ 2242785 h 2242785"/>
+              <a:gd name="connsiteX0" fmla="*/ 620973 w 2905181"/>
+              <a:gd name="connsiteY0" fmla="*/ 2242785 h 2242785"/>
+              <a:gd name="connsiteX1" fmla="*/ 641293 w 2905181"/>
+              <a:gd name="connsiteY1" fmla="*/ 1836385 h 2242785"/>
+              <a:gd name="connsiteX2" fmla="*/ 11373 w 2905181"/>
+              <a:gd name="connsiteY2" fmla="*/ 1165825 h 2242785"/>
+              <a:gd name="connsiteX3" fmla="*/ 1261053 w 2905181"/>
+              <a:gd name="connsiteY3" fmla="*/ 48225 h 2242785"/>
+              <a:gd name="connsiteX4" fmla="*/ 2896813 w 2905181"/>
+              <a:gd name="connsiteY4" fmla="*/ 993105 h 2242785"/>
+              <a:gd name="connsiteX5" fmla="*/ 1769053 w 2905181"/>
+              <a:gd name="connsiteY5" fmla="*/ 1785585 h 2242785"/>
+              <a:gd name="connsiteX6" fmla="*/ 1332173 w 2905181"/>
+              <a:gd name="connsiteY6" fmla="*/ 1714465 h 2242785"/>
+              <a:gd name="connsiteX7" fmla="*/ 620973 w 2905181"/>
+              <a:gd name="connsiteY7" fmla="*/ 2242785 h 2242785"/>
+              <a:gd name="connsiteX0" fmla="*/ 620973 w 2905181"/>
+              <a:gd name="connsiteY0" fmla="*/ 2221232 h 2221232"/>
+              <a:gd name="connsiteX1" fmla="*/ 641293 w 2905181"/>
+              <a:gd name="connsiteY1" fmla="*/ 1814832 h 2221232"/>
+              <a:gd name="connsiteX2" fmla="*/ 11373 w 2905181"/>
+              <a:gd name="connsiteY2" fmla="*/ 1144272 h 2221232"/>
+              <a:gd name="connsiteX3" fmla="*/ 1261053 w 2905181"/>
+              <a:gd name="connsiteY3" fmla="*/ 26672 h 2221232"/>
+              <a:gd name="connsiteX4" fmla="*/ 2896813 w 2905181"/>
+              <a:gd name="connsiteY4" fmla="*/ 971552 h 2221232"/>
+              <a:gd name="connsiteX5" fmla="*/ 1769053 w 2905181"/>
+              <a:gd name="connsiteY5" fmla="*/ 1764032 h 2221232"/>
+              <a:gd name="connsiteX6" fmla="*/ 1332173 w 2905181"/>
+              <a:gd name="connsiteY6" fmla="*/ 1692912 h 2221232"/>
+              <a:gd name="connsiteX7" fmla="*/ 620973 w 2905181"/>
+              <a:gd name="connsiteY7" fmla="*/ 2221232 h 2221232"/>
+              <a:gd name="connsiteX0" fmla="*/ 640021 w 2924229"/>
+              <a:gd name="connsiteY0" fmla="*/ 2221232 h 2221232"/>
+              <a:gd name="connsiteX1" fmla="*/ 660341 w 2924229"/>
+              <a:gd name="connsiteY1" fmla="*/ 1814832 h 2221232"/>
+              <a:gd name="connsiteX2" fmla="*/ 30421 w 2924229"/>
+              <a:gd name="connsiteY2" fmla="*/ 1144272 h 2221232"/>
+              <a:gd name="connsiteX3" fmla="*/ 1280101 w 2924229"/>
+              <a:gd name="connsiteY3" fmla="*/ 26672 h 2221232"/>
+              <a:gd name="connsiteX4" fmla="*/ 2915861 w 2924229"/>
+              <a:gd name="connsiteY4" fmla="*/ 971552 h 2221232"/>
+              <a:gd name="connsiteX5" fmla="*/ 1788101 w 2924229"/>
+              <a:gd name="connsiteY5" fmla="*/ 1764032 h 2221232"/>
+              <a:gd name="connsiteX6" fmla="*/ 1351221 w 2924229"/>
+              <a:gd name="connsiteY6" fmla="*/ 1692912 h 2221232"/>
+              <a:gd name="connsiteX7" fmla="*/ 640021 w 2924229"/>
+              <a:gd name="connsiteY7" fmla="*/ 2221232 h 2221232"/>
+              <a:gd name="connsiteX0" fmla="*/ 589221 w 2924229"/>
+              <a:gd name="connsiteY0" fmla="*/ 2292352 h 2292352"/>
+              <a:gd name="connsiteX1" fmla="*/ 660341 w 2924229"/>
+              <a:gd name="connsiteY1" fmla="*/ 1814832 h 2292352"/>
+              <a:gd name="connsiteX2" fmla="*/ 30421 w 2924229"/>
+              <a:gd name="connsiteY2" fmla="*/ 1144272 h 2292352"/>
+              <a:gd name="connsiteX3" fmla="*/ 1280101 w 2924229"/>
+              <a:gd name="connsiteY3" fmla="*/ 26672 h 2292352"/>
+              <a:gd name="connsiteX4" fmla="*/ 2915861 w 2924229"/>
+              <a:gd name="connsiteY4" fmla="*/ 971552 h 2292352"/>
+              <a:gd name="connsiteX5" fmla="*/ 1788101 w 2924229"/>
+              <a:gd name="connsiteY5" fmla="*/ 1764032 h 2292352"/>
+              <a:gd name="connsiteX6" fmla="*/ 1351221 w 2924229"/>
+              <a:gd name="connsiteY6" fmla="*/ 1692912 h 2292352"/>
+              <a:gd name="connsiteX7" fmla="*/ 589221 w 2924229"/>
+              <a:gd name="connsiteY7" fmla="*/ 2292352 h 2292352"/>
+              <a:gd name="connsiteX0" fmla="*/ 589221 w 2924229"/>
+              <a:gd name="connsiteY0" fmla="*/ 2292352 h 2292352"/>
+              <a:gd name="connsiteX1" fmla="*/ 660341 w 2924229"/>
+              <a:gd name="connsiteY1" fmla="*/ 1814832 h 2292352"/>
+              <a:gd name="connsiteX2" fmla="*/ 30421 w 2924229"/>
+              <a:gd name="connsiteY2" fmla="*/ 1144272 h 2292352"/>
+              <a:gd name="connsiteX3" fmla="*/ 1280101 w 2924229"/>
+              <a:gd name="connsiteY3" fmla="*/ 26672 h 2292352"/>
+              <a:gd name="connsiteX4" fmla="*/ 2915861 w 2924229"/>
+              <a:gd name="connsiteY4" fmla="*/ 971552 h 2292352"/>
+              <a:gd name="connsiteX5" fmla="*/ 1788101 w 2924229"/>
+              <a:gd name="connsiteY5" fmla="*/ 1764032 h 2292352"/>
+              <a:gd name="connsiteX6" fmla="*/ 1351221 w 2924229"/>
+              <a:gd name="connsiteY6" fmla="*/ 1692912 h 2292352"/>
+              <a:gd name="connsiteX7" fmla="*/ 589221 w 2924229"/>
+              <a:gd name="connsiteY7" fmla="*/ 2292352 h 2292352"/>
+              <a:gd name="connsiteX0" fmla="*/ 589221 w 2924229"/>
+              <a:gd name="connsiteY0" fmla="*/ 2292352 h 2293313"/>
+              <a:gd name="connsiteX1" fmla="*/ 660341 w 2924229"/>
+              <a:gd name="connsiteY1" fmla="*/ 1814832 h 2293313"/>
+              <a:gd name="connsiteX2" fmla="*/ 30421 w 2924229"/>
+              <a:gd name="connsiteY2" fmla="*/ 1144272 h 2293313"/>
+              <a:gd name="connsiteX3" fmla="*/ 1280101 w 2924229"/>
+              <a:gd name="connsiteY3" fmla="*/ 26672 h 2293313"/>
+              <a:gd name="connsiteX4" fmla="*/ 2915861 w 2924229"/>
+              <a:gd name="connsiteY4" fmla="*/ 971552 h 2293313"/>
+              <a:gd name="connsiteX5" fmla="*/ 1788101 w 2924229"/>
+              <a:gd name="connsiteY5" fmla="*/ 1764032 h 2293313"/>
+              <a:gd name="connsiteX6" fmla="*/ 1351221 w 2924229"/>
+              <a:gd name="connsiteY6" fmla="*/ 1692912 h 2293313"/>
+              <a:gd name="connsiteX7" fmla="*/ 589221 w 2924229"/>
+              <a:gd name="connsiteY7" fmla="*/ 2292352 h 2293313"/>
+              <a:gd name="connsiteX0" fmla="*/ 589221 w 2924281"/>
+              <a:gd name="connsiteY0" fmla="*/ 2292352 h 2293313"/>
+              <a:gd name="connsiteX1" fmla="*/ 660341 w 2924281"/>
+              <a:gd name="connsiteY1" fmla="*/ 1814832 h 2293313"/>
+              <a:gd name="connsiteX2" fmla="*/ 30421 w 2924281"/>
+              <a:gd name="connsiteY2" fmla="*/ 1144272 h 2293313"/>
+              <a:gd name="connsiteX3" fmla="*/ 1280101 w 2924281"/>
+              <a:gd name="connsiteY3" fmla="*/ 26672 h 2293313"/>
+              <a:gd name="connsiteX4" fmla="*/ 2915861 w 2924281"/>
+              <a:gd name="connsiteY4" fmla="*/ 971552 h 2293313"/>
+              <a:gd name="connsiteX5" fmla="*/ 1788101 w 2924281"/>
+              <a:gd name="connsiteY5" fmla="*/ 1764032 h 2293313"/>
+              <a:gd name="connsiteX6" fmla="*/ 1310581 w 2924281"/>
+              <a:gd name="connsiteY6" fmla="*/ 1723392 h 2293313"/>
+              <a:gd name="connsiteX7" fmla="*/ 589221 w 2924281"/>
+              <a:gd name="connsiteY7" fmla="*/ 2292352 h 2293313"/>
+              <a:gd name="connsiteX0" fmla="*/ 589221 w 2924281"/>
+              <a:gd name="connsiteY0" fmla="*/ 2292352 h 2293313"/>
+              <a:gd name="connsiteX1" fmla="*/ 660341 w 2924281"/>
+              <a:gd name="connsiteY1" fmla="*/ 1814832 h 2293313"/>
+              <a:gd name="connsiteX2" fmla="*/ 30421 w 2924281"/>
+              <a:gd name="connsiteY2" fmla="*/ 1144272 h 2293313"/>
+              <a:gd name="connsiteX3" fmla="*/ 1280101 w 2924281"/>
+              <a:gd name="connsiteY3" fmla="*/ 26672 h 2293313"/>
+              <a:gd name="connsiteX4" fmla="*/ 2915861 w 2924281"/>
+              <a:gd name="connsiteY4" fmla="*/ 971552 h 2293313"/>
+              <a:gd name="connsiteX5" fmla="*/ 1788101 w 2924281"/>
+              <a:gd name="connsiteY5" fmla="*/ 1764032 h 2293313"/>
+              <a:gd name="connsiteX6" fmla="*/ 1310581 w 2924281"/>
+              <a:gd name="connsiteY6" fmla="*/ 1723392 h 2293313"/>
+              <a:gd name="connsiteX7" fmla="*/ 589221 w 2924281"/>
+              <a:gd name="connsiteY7" fmla="*/ 2292352 h 2293313"/>
+              <a:gd name="connsiteX0" fmla="*/ 589221 w 2937136"/>
+              <a:gd name="connsiteY0" fmla="*/ 2275012 h 2275973"/>
+              <a:gd name="connsiteX1" fmla="*/ 660341 w 2937136"/>
+              <a:gd name="connsiteY1" fmla="*/ 1797492 h 2275973"/>
+              <a:gd name="connsiteX2" fmla="*/ 30421 w 2937136"/>
+              <a:gd name="connsiteY2" fmla="*/ 1126932 h 2275973"/>
+              <a:gd name="connsiteX3" fmla="*/ 1280101 w 2937136"/>
+              <a:gd name="connsiteY3" fmla="*/ 9332 h 2275973"/>
+              <a:gd name="connsiteX4" fmla="*/ 2915861 w 2937136"/>
+              <a:gd name="connsiteY4" fmla="*/ 954212 h 2275973"/>
+              <a:gd name="connsiteX5" fmla="*/ 2153861 w 2937136"/>
+              <a:gd name="connsiteY5" fmla="*/ 1756852 h 2275973"/>
+              <a:gd name="connsiteX6" fmla="*/ 1310581 w 2937136"/>
+              <a:gd name="connsiteY6" fmla="*/ 1706052 h 2275973"/>
+              <a:gd name="connsiteX7" fmla="*/ 589221 w 2937136"/>
+              <a:gd name="connsiteY7" fmla="*/ 2275012 h 2275973"/>
+              <a:gd name="connsiteX0" fmla="*/ 589221 w 2915876"/>
+              <a:gd name="connsiteY0" fmla="*/ 2274921 h 2275882"/>
+              <a:gd name="connsiteX1" fmla="*/ 660341 w 2915876"/>
+              <a:gd name="connsiteY1" fmla="*/ 1797401 h 2275882"/>
+              <a:gd name="connsiteX2" fmla="*/ 30421 w 2915876"/>
+              <a:gd name="connsiteY2" fmla="*/ 1126841 h 2275882"/>
+              <a:gd name="connsiteX3" fmla="*/ 1280101 w 2915876"/>
+              <a:gd name="connsiteY3" fmla="*/ 9241 h 2275882"/>
+              <a:gd name="connsiteX4" fmla="*/ 2915861 w 2915876"/>
+              <a:gd name="connsiteY4" fmla="*/ 954121 h 2275882"/>
+              <a:gd name="connsiteX5" fmla="*/ 1310581 w 2915876"/>
+              <a:gd name="connsiteY5" fmla="*/ 1705961 h 2275882"/>
+              <a:gd name="connsiteX6" fmla="*/ 589221 w 2915876"/>
+              <a:gd name="connsiteY6" fmla="*/ 2274921 h 2275882"/>
+              <a:gd name="connsiteX0" fmla="*/ 589221 w 2915907"/>
+              <a:gd name="connsiteY0" fmla="*/ 2274921 h 2275882"/>
+              <a:gd name="connsiteX1" fmla="*/ 660341 w 2915907"/>
+              <a:gd name="connsiteY1" fmla="*/ 1797401 h 2275882"/>
+              <a:gd name="connsiteX2" fmla="*/ 30421 w 2915907"/>
+              <a:gd name="connsiteY2" fmla="*/ 1126841 h 2275882"/>
+              <a:gd name="connsiteX3" fmla="*/ 1280101 w 2915907"/>
+              <a:gd name="connsiteY3" fmla="*/ 9241 h 2275882"/>
+              <a:gd name="connsiteX4" fmla="*/ 2915861 w 2915907"/>
+              <a:gd name="connsiteY4" fmla="*/ 954121 h 2275882"/>
+              <a:gd name="connsiteX5" fmla="*/ 1310581 w 2915907"/>
+              <a:gd name="connsiteY5" fmla="*/ 1705961 h 2275882"/>
+              <a:gd name="connsiteX6" fmla="*/ 589221 w 2915907"/>
+              <a:gd name="connsiteY6" fmla="*/ 2274921 h 2275882"/>
+              <a:gd name="connsiteX0" fmla="*/ 589221 w 2923626"/>
+              <a:gd name="connsiteY0" fmla="*/ 2278914 h 2279875"/>
+              <a:gd name="connsiteX1" fmla="*/ 660341 w 2923626"/>
+              <a:gd name="connsiteY1" fmla="*/ 1801394 h 2279875"/>
+              <a:gd name="connsiteX2" fmla="*/ 30421 w 2923626"/>
+              <a:gd name="connsiteY2" fmla="*/ 1130834 h 2279875"/>
+              <a:gd name="connsiteX3" fmla="*/ 1280101 w 2923626"/>
+              <a:gd name="connsiteY3" fmla="*/ 13234 h 2279875"/>
+              <a:gd name="connsiteX4" fmla="*/ 2915861 w 2923626"/>
+              <a:gd name="connsiteY4" fmla="*/ 958114 h 2279875"/>
+              <a:gd name="connsiteX5" fmla="*/ 1310581 w 2923626"/>
+              <a:gd name="connsiteY5" fmla="*/ 1709954 h 2279875"/>
+              <a:gd name="connsiteX6" fmla="*/ 589221 w 2923626"/>
+              <a:gd name="connsiteY6" fmla="*/ 2278914 h 2279875"/>
+              <a:gd name="connsiteX0" fmla="*/ 589221 w 2918996"/>
+              <a:gd name="connsiteY0" fmla="*/ 2276579 h 2277540"/>
+              <a:gd name="connsiteX1" fmla="*/ 660341 w 2918996"/>
+              <a:gd name="connsiteY1" fmla="*/ 1799059 h 2277540"/>
+              <a:gd name="connsiteX2" fmla="*/ 30421 w 2918996"/>
+              <a:gd name="connsiteY2" fmla="*/ 1128499 h 2277540"/>
+              <a:gd name="connsiteX3" fmla="*/ 1280101 w 2918996"/>
+              <a:gd name="connsiteY3" fmla="*/ 10899 h 2277540"/>
+              <a:gd name="connsiteX4" fmla="*/ 2915861 w 2918996"/>
+              <a:gd name="connsiteY4" fmla="*/ 955779 h 2277540"/>
+              <a:gd name="connsiteX5" fmla="*/ 1310581 w 2918996"/>
+              <a:gd name="connsiteY5" fmla="*/ 1707619 h 2277540"/>
+              <a:gd name="connsiteX6" fmla="*/ 589221 w 2918996"/>
+              <a:gd name="connsiteY6" fmla="*/ 2276579 h 2277540"/>
+              <a:gd name="connsiteX0" fmla="*/ 589221 w 2918996"/>
+              <a:gd name="connsiteY0" fmla="*/ 2276147 h 2277108"/>
+              <a:gd name="connsiteX1" fmla="*/ 660341 w 2918996"/>
+              <a:gd name="connsiteY1" fmla="*/ 1798627 h 2277108"/>
+              <a:gd name="connsiteX2" fmla="*/ 30421 w 2918996"/>
+              <a:gd name="connsiteY2" fmla="*/ 1128067 h 2277108"/>
+              <a:gd name="connsiteX3" fmla="*/ 1280101 w 2918996"/>
+              <a:gd name="connsiteY3" fmla="*/ 10467 h 2277108"/>
+              <a:gd name="connsiteX4" fmla="*/ 2915861 w 2918996"/>
+              <a:gd name="connsiteY4" fmla="*/ 955347 h 2277108"/>
+              <a:gd name="connsiteX5" fmla="*/ 1310581 w 2918996"/>
+              <a:gd name="connsiteY5" fmla="*/ 1707187 h 2277108"/>
+              <a:gd name="connsiteX6" fmla="*/ 589221 w 2918996"/>
+              <a:gd name="connsiteY6" fmla="*/ 2276147 h 2277108"/>
+              <a:gd name="connsiteX0" fmla="*/ 589221 w 2918996"/>
+              <a:gd name="connsiteY0" fmla="*/ 2276147 h 2276147"/>
+              <a:gd name="connsiteX1" fmla="*/ 660341 w 2918996"/>
+              <a:gd name="connsiteY1" fmla="*/ 1798627 h 2276147"/>
+              <a:gd name="connsiteX2" fmla="*/ 30421 w 2918996"/>
+              <a:gd name="connsiteY2" fmla="*/ 1128067 h 2276147"/>
+              <a:gd name="connsiteX3" fmla="*/ 1280101 w 2918996"/>
+              <a:gd name="connsiteY3" fmla="*/ 10467 h 2276147"/>
+              <a:gd name="connsiteX4" fmla="*/ 2915861 w 2918996"/>
+              <a:gd name="connsiteY4" fmla="*/ 955347 h 2276147"/>
+              <a:gd name="connsiteX5" fmla="*/ 1310581 w 2918996"/>
+              <a:gd name="connsiteY5" fmla="*/ 1707187 h 2276147"/>
+              <a:gd name="connsiteX6" fmla="*/ 589221 w 2918996"/>
+              <a:gd name="connsiteY6" fmla="*/ 2276147 h 2276147"/>
+              <a:gd name="connsiteX0" fmla="*/ 518101 w 2918996"/>
+              <a:gd name="connsiteY0" fmla="*/ 2265987 h 2265987"/>
+              <a:gd name="connsiteX1" fmla="*/ 660341 w 2918996"/>
+              <a:gd name="connsiteY1" fmla="*/ 1798627 h 2265987"/>
+              <a:gd name="connsiteX2" fmla="*/ 30421 w 2918996"/>
+              <a:gd name="connsiteY2" fmla="*/ 1128067 h 2265987"/>
+              <a:gd name="connsiteX3" fmla="*/ 1280101 w 2918996"/>
+              <a:gd name="connsiteY3" fmla="*/ 10467 h 2265987"/>
+              <a:gd name="connsiteX4" fmla="*/ 2915861 w 2918996"/>
+              <a:gd name="connsiteY4" fmla="*/ 955347 h 2265987"/>
+              <a:gd name="connsiteX5" fmla="*/ 1310581 w 2918996"/>
+              <a:gd name="connsiteY5" fmla="*/ 1707187 h 2265987"/>
+              <a:gd name="connsiteX6" fmla="*/ 518101 w 2918996"/>
+              <a:gd name="connsiteY6" fmla="*/ 2265987 h 2265987"/>
+              <a:gd name="connsiteX0" fmla="*/ 518101 w 2918996"/>
+              <a:gd name="connsiteY0" fmla="*/ 2265987 h 2266204"/>
+              <a:gd name="connsiteX1" fmla="*/ 660341 w 2918996"/>
+              <a:gd name="connsiteY1" fmla="*/ 1798627 h 2266204"/>
+              <a:gd name="connsiteX2" fmla="*/ 30421 w 2918996"/>
+              <a:gd name="connsiteY2" fmla="*/ 1128067 h 2266204"/>
+              <a:gd name="connsiteX3" fmla="*/ 1280101 w 2918996"/>
+              <a:gd name="connsiteY3" fmla="*/ 10467 h 2266204"/>
+              <a:gd name="connsiteX4" fmla="*/ 2915861 w 2918996"/>
+              <a:gd name="connsiteY4" fmla="*/ 955347 h 2266204"/>
+              <a:gd name="connsiteX5" fmla="*/ 1310581 w 2918996"/>
+              <a:gd name="connsiteY5" fmla="*/ 1707187 h 2266204"/>
+              <a:gd name="connsiteX6" fmla="*/ 518101 w 2918996"/>
+              <a:gd name="connsiteY6" fmla="*/ 2265987 h 2266204"/>
+              <a:gd name="connsiteX0" fmla="*/ 394025 w 2794920"/>
+              <a:gd name="connsiteY0" fmla="*/ 2258136 h 2258353"/>
+              <a:gd name="connsiteX1" fmla="*/ 536265 w 2794920"/>
+              <a:gd name="connsiteY1" fmla="*/ 1790776 h 2258353"/>
+              <a:gd name="connsiteX2" fmla="*/ 18105 w 2794920"/>
+              <a:gd name="connsiteY2" fmla="*/ 1231976 h 2258353"/>
+              <a:gd name="connsiteX3" fmla="*/ 1156025 w 2794920"/>
+              <a:gd name="connsiteY3" fmla="*/ 2616 h 2258353"/>
+              <a:gd name="connsiteX4" fmla="*/ 2791785 w 2794920"/>
+              <a:gd name="connsiteY4" fmla="*/ 947496 h 2258353"/>
+              <a:gd name="connsiteX5" fmla="*/ 1186505 w 2794920"/>
+              <a:gd name="connsiteY5" fmla="*/ 1699336 h 2258353"/>
+              <a:gd name="connsiteX6" fmla="*/ 394025 w 2794920"/>
+              <a:gd name="connsiteY6" fmla="*/ 2258136 h 2258353"/>
+              <a:gd name="connsiteX0" fmla="*/ 494142 w 2895037"/>
+              <a:gd name="connsiteY0" fmla="*/ 2256537 h 2256754"/>
+              <a:gd name="connsiteX1" fmla="*/ 636382 w 2895037"/>
+              <a:gd name="connsiteY1" fmla="*/ 1789177 h 2256754"/>
+              <a:gd name="connsiteX2" fmla="*/ 16622 w 2895037"/>
+              <a:gd name="connsiteY2" fmla="*/ 1118617 h 2256754"/>
+              <a:gd name="connsiteX3" fmla="*/ 1256142 w 2895037"/>
+              <a:gd name="connsiteY3" fmla="*/ 1017 h 2256754"/>
+              <a:gd name="connsiteX4" fmla="*/ 2891902 w 2895037"/>
+              <a:gd name="connsiteY4" fmla="*/ 945897 h 2256754"/>
+              <a:gd name="connsiteX5" fmla="*/ 1286622 w 2895037"/>
+              <a:gd name="connsiteY5" fmla="*/ 1697737 h 2256754"/>
+              <a:gd name="connsiteX6" fmla="*/ 494142 w 2895037"/>
+              <a:gd name="connsiteY6" fmla="*/ 2256537 h 2256754"/>
+              <a:gd name="connsiteX0" fmla="*/ 500928 w 2901823"/>
+              <a:gd name="connsiteY0" fmla="*/ 2263922 h 2264139"/>
+              <a:gd name="connsiteX1" fmla="*/ 643168 w 2901823"/>
+              <a:gd name="connsiteY1" fmla="*/ 1796562 h 2264139"/>
+              <a:gd name="connsiteX2" fmla="*/ 23408 w 2901823"/>
+              <a:gd name="connsiteY2" fmla="*/ 1126002 h 2264139"/>
+              <a:gd name="connsiteX3" fmla="*/ 1262928 w 2901823"/>
+              <a:gd name="connsiteY3" fmla="*/ 8402 h 2264139"/>
+              <a:gd name="connsiteX4" fmla="*/ 2898688 w 2901823"/>
+              <a:gd name="connsiteY4" fmla="*/ 953282 h 2264139"/>
+              <a:gd name="connsiteX5" fmla="*/ 1293408 w 2901823"/>
+              <a:gd name="connsiteY5" fmla="*/ 1705122 h 2264139"/>
+              <a:gd name="connsiteX6" fmla="*/ 500928 w 2901823"/>
+              <a:gd name="connsiteY6" fmla="*/ 2263922 h 2264139"/>
+              <a:gd name="connsiteX0" fmla="*/ 501232 w 2902127"/>
+              <a:gd name="connsiteY0" fmla="*/ 2278543 h 2278760"/>
+              <a:gd name="connsiteX1" fmla="*/ 643472 w 2902127"/>
+              <a:gd name="connsiteY1" fmla="*/ 1811183 h 2278760"/>
+              <a:gd name="connsiteX2" fmla="*/ 23712 w 2902127"/>
+              <a:gd name="connsiteY2" fmla="*/ 1140623 h 2278760"/>
+              <a:gd name="connsiteX3" fmla="*/ 1263232 w 2902127"/>
+              <a:gd name="connsiteY3" fmla="*/ 23023 h 2278760"/>
+              <a:gd name="connsiteX4" fmla="*/ 2898992 w 2902127"/>
+              <a:gd name="connsiteY4" fmla="*/ 967903 h 2278760"/>
+              <a:gd name="connsiteX5" fmla="*/ 1293712 w 2902127"/>
+              <a:gd name="connsiteY5" fmla="*/ 1719743 h 2278760"/>
+              <a:gd name="connsiteX6" fmla="*/ 501232 w 2902127"/>
+              <a:gd name="connsiteY6" fmla="*/ 2278543 h 2278760"/>
+              <a:gd name="connsiteX0" fmla="*/ 494249 w 2935556"/>
+              <a:gd name="connsiteY0" fmla="*/ 2268783 h 2269000"/>
+              <a:gd name="connsiteX1" fmla="*/ 636489 w 2935556"/>
+              <a:gd name="connsiteY1" fmla="*/ 1801423 h 2269000"/>
+              <a:gd name="connsiteX2" fmla="*/ 16729 w 2935556"/>
+              <a:gd name="connsiteY2" fmla="*/ 1130863 h 2269000"/>
+              <a:gd name="connsiteX3" fmla="*/ 1256249 w 2935556"/>
+              <a:gd name="connsiteY3" fmla="*/ 13263 h 2269000"/>
+              <a:gd name="connsiteX4" fmla="*/ 2932649 w 2935556"/>
+              <a:gd name="connsiteY4" fmla="*/ 633023 h 2269000"/>
+              <a:gd name="connsiteX5" fmla="*/ 1286729 w 2935556"/>
+              <a:gd name="connsiteY5" fmla="*/ 1709983 h 2269000"/>
+              <a:gd name="connsiteX6" fmla="*/ 494249 w 2935556"/>
+              <a:gd name="connsiteY6" fmla="*/ 2268783 h 2269000"/>
+              <a:gd name="connsiteX0" fmla="*/ 494275 w 2945690"/>
+              <a:gd name="connsiteY0" fmla="*/ 2262674 h 2262891"/>
+              <a:gd name="connsiteX1" fmla="*/ 636515 w 2945690"/>
+              <a:gd name="connsiteY1" fmla="*/ 1795314 h 2262891"/>
+              <a:gd name="connsiteX2" fmla="*/ 16755 w 2945690"/>
+              <a:gd name="connsiteY2" fmla="*/ 1124754 h 2262891"/>
+              <a:gd name="connsiteX3" fmla="*/ 1256275 w 2945690"/>
+              <a:gd name="connsiteY3" fmla="*/ 7154 h 2262891"/>
+              <a:gd name="connsiteX4" fmla="*/ 2942835 w 2945690"/>
+              <a:gd name="connsiteY4" fmla="*/ 728514 h 2262891"/>
+              <a:gd name="connsiteX5" fmla="*/ 1286755 w 2945690"/>
+              <a:gd name="connsiteY5" fmla="*/ 1703874 h 2262891"/>
+              <a:gd name="connsiteX6" fmla="*/ 494275 w 2945690"/>
+              <a:gd name="connsiteY6" fmla="*/ 2262674 h 2262891"/>
+              <a:gd name="connsiteX0" fmla="*/ 494329 w 2965965"/>
+              <a:gd name="connsiteY0" fmla="*/ 2260953 h 2261170"/>
+              <a:gd name="connsiteX1" fmla="*/ 636569 w 2965965"/>
+              <a:gd name="connsiteY1" fmla="*/ 1793593 h 2261170"/>
+              <a:gd name="connsiteX2" fmla="*/ 16809 w 2965965"/>
+              <a:gd name="connsiteY2" fmla="*/ 1123033 h 2261170"/>
+              <a:gd name="connsiteX3" fmla="*/ 1256329 w 2965965"/>
+              <a:gd name="connsiteY3" fmla="*/ 5433 h 2261170"/>
+              <a:gd name="connsiteX4" fmla="*/ 2963209 w 2965965"/>
+              <a:gd name="connsiteY4" fmla="*/ 767433 h 2261170"/>
+              <a:gd name="connsiteX5" fmla="*/ 1286809 w 2965965"/>
+              <a:gd name="connsiteY5" fmla="*/ 1702153 h 2261170"/>
+              <a:gd name="connsiteX6" fmla="*/ 494329 w 2965965"/>
+              <a:gd name="connsiteY6" fmla="*/ 2260953 h 2261170"/>
+            </a:gdLst>
+            <a:ahLst/>
+            <a:cxnLst>
+              <a:cxn ang="0">
+                <a:pos x="connsiteX0" y="connsiteY0"/>
+              </a:cxn>
+              <a:cxn ang="0">
+                <a:pos x="connsiteX1" y="connsiteY1"/>
+              </a:cxn>
+              <a:cxn ang="0">
+                <a:pos x="connsiteX2" y="connsiteY2"/>
+              </a:cxn>
+              <a:cxn ang="0">
+                <a:pos x="connsiteX3" y="connsiteY3"/>
+              </a:cxn>
+              <a:cxn ang="0">
+                <a:pos x="connsiteX4" y="connsiteY4"/>
+              </a:cxn>
+              <a:cxn ang="0">
+                <a:pos x="connsiteX5" y="connsiteY5"/>
+              </a:cxn>
+              <a:cxn ang="0">
+                <a:pos x="connsiteX6" y="connsiteY6"/>
+              </a:cxn>
+            </a:cxnLst>
+            <a:rect l="l" t="t" r="r" b="b"/>
+            <a:pathLst>
+              <a:path w="2965965" h="2261170">
+                <a:moveTo>
+                  <a:pt x="494329" y="2260953"/>
+                </a:moveTo>
+                <a:cubicBezTo>
+                  <a:pt x="501102" y="2098393"/>
+                  <a:pt x="729702" y="1984940"/>
+                  <a:pt x="636569" y="1793593"/>
+                </a:cubicBezTo>
+                <a:cubicBezTo>
+                  <a:pt x="534969" y="1614100"/>
+                  <a:pt x="167516" y="1654740"/>
+                  <a:pt x="16809" y="1123033"/>
+                </a:cubicBezTo>
+                <a:cubicBezTo>
+                  <a:pt x="-133898" y="591326"/>
+                  <a:pt x="765262" y="64700"/>
+                  <a:pt x="1256329" y="5433"/>
+                </a:cubicBezTo>
+                <a:cubicBezTo>
+                  <a:pt x="1747396" y="-53834"/>
+                  <a:pt x="2917489" y="383046"/>
+                  <a:pt x="2963209" y="767433"/>
+                </a:cubicBezTo>
+                <a:cubicBezTo>
+                  <a:pt x="3008929" y="1151820"/>
+                  <a:pt x="2487382" y="2071300"/>
+                  <a:pt x="1286809" y="1702153"/>
+                </a:cubicBezTo>
+                <a:cubicBezTo>
+                  <a:pt x="899036" y="1922286"/>
+                  <a:pt x="690756" y="2271113"/>
+                  <a:pt x="494329" y="2260953"/>
+                </a:cubicBezTo>
+                <a:close/>
+              </a:path>
+            </a:pathLst>
+          </a:custGeom>
+          <a:solidFill>
+            <a:srgbClr val="E74C3C"/>
+          </a:solidFill>
+          <a:ln w="28575">
+            <a:noFill/>
+          </a:ln>
+        </p:spPr>
+        <p:style>
+          <a:lnRef idx="2">
+            <a:schemeClr val="accent1">
+              <a:shade val="50000"/>
+            </a:schemeClr>
+          </a:lnRef>
+          <a:fillRef idx="1">
+            <a:schemeClr val="accent1"/>
+          </a:fillRef>
+          <a:effectRef idx="0">
+            <a:schemeClr val="accent1"/>
+          </a:effectRef>
+          <a:fontRef idx="minor">
+            <a:schemeClr val="lt1"/>
+          </a:fontRef>
+        </p:style>
+        <p:txBody>
+          <a:bodyPr rtlCol="0" anchor="ctr"/>
+          <a:lstStyle/>
+          <a:p>
+            <a:pPr algn="ctr"/>
+            <a:endParaRPr lang="en-US"/>
+          </a:p>
+        </p:txBody>
+      </p:sp>
+      <p:sp>
+        <p:nvSpPr>
+          <p:cNvPr id="2067" name="Freeform 2066"/>
+          <p:cNvSpPr/>
+          <p:nvPr/>
+        </p:nvSpPr>
+        <p:spPr>
+          <a:xfrm>
+            <a:off x="6085840" y="751840"/>
+            <a:ext cx="528320" cy="741680"/>
+          </a:xfrm>
+          <a:custGeom>
+            <a:avLst/>
+            <a:gdLst>
+              <a:gd name="connsiteX0" fmla="*/ 233680 w 711200"/>
+              <a:gd name="connsiteY0" fmla="*/ 518160 h 518160"/>
+              <a:gd name="connsiteX1" fmla="*/ 711200 w 711200"/>
+              <a:gd name="connsiteY1" fmla="*/ 91440 h 518160"/>
+              <a:gd name="connsiteX2" fmla="*/ 0 w 711200"/>
+              <a:gd name="connsiteY2" fmla="*/ 0 h 518160"/>
+              <a:gd name="connsiteX0" fmla="*/ 50800 w 528320"/>
+              <a:gd name="connsiteY0" fmla="*/ 741680 h 741680"/>
+              <a:gd name="connsiteX1" fmla="*/ 528320 w 528320"/>
+              <a:gd name="connsiteY1" fmla="*/ 314960 h 741680"/>
+              <a:gd name="connsiteX2" fmla="*/ 0 w 528320"/>
+              <a:gd name="connsiteY2" fmla="*/ 0 h 741680"/>
+              <a:gd name="connsiteX0" fmla="*/ 50800 w 528320"/>
+              <a:gd name="connsiteY0" fmla="*/ 741680 h 741680"/>
+              <a:gd name="connsiteX1" fmla="*/ 528320 w 528320"/>
+              <a:gd name="connsiteY1" fmla="*/ 314960 h 741680"/>
+              <a:gd name="connsiteX2" fmla="*/ 0 w 528320"/>
+              <a:gd name="connsiteY2" fmla="*/ 0 h 741680"/>
+              <a:gd name="connsiteX0" fmla="*/ 50800 w 528320"/>
+              <a:gd name="connsiteY0" fmla="*/ 741680 h 741680"/>
+              <a:gd name="connsiteX1" fmla="*/ 528320 w 528320"/>
+              <a:gd name="connsiteY1" fmla="*/ 314960 h 741680"/>
+              <a:gd name="connsiteX2" fmla="*/ 0 w 528320"/>
+              <a:gd name="connsiteY2" fmla="*/ 0 h 741680"/>
+              <a:gd name="connsiteX0" fmla="*/ 50800 w 528320"/>
+              <a:gd name="connsiteY0" fmla="*/ 741680 h 741680"/>
+              <a:gd name="connsiteX1" fmla="*/ 528320 w 528320"/>
+              <a:gd name="connsiteY1" fmla="*/ 314960 h 741680"/>
+              <a:gd name="connsiteX2" fmla="*/ 0 w 528320"/>
+              <a:gd name="connsiteY2" fmla="*/ 0 h 741680"/>
+            </a:gdLst>
+            <a:ahLst/>
+            <a:cxnLst>
+              <a:cxn ang="0">
+                <a:pos x="connsiteX0" y="connsiteY0"/>
+              </a:cxn>
+              <a:cxn ang="0">
+                <a:pos x="connsiteX1" y="connsiteY1"/>
+              </a:cxn>
+              <a:cxn ang="0">
+                <a:pos x="connsiteX2" y="connsiteY2"/>
+              </a:cxn>
+            </a:cxnLst>
+            <a:rect l="l" t="t" r="r" b="b"/>
+            <a:pathLst>
+              <a:path w="528320" h="741680">
+                <a:moveTo>
+                  <a:pt x="50800" y="741680"/>
+                </a:moveTo>
+                <a:cubicBezTo>
+                  <a:pt x="118533" y="528320"/>
+                  <a:pt x="226907" y="375920"/>
+                  <a:pt x="528320" y="314960"/>
+                </a:cubicBezTo>
+                <a:cubicBezTo>
+                  <a:pt x="453813" y="88053"/>
+                  <a:pt x="176107" y="104987"/>
+                  <a:pt x="0" y="0"/>
+                </a:cubicBezTo>
+              </a:path>
+            </a:pathLst>
+          </a:custGeom>
+          <a:noFill/>
+          <a:ln w="28575">
+            <a:solidFill>
+              <a:schemeClr val="bg1"/>
+            </a:solidFill>
+            <a:prstDash val="solid"/>
+          </a:ln>
+        </p:spPr>
+        <p:style>
+          <a:lnRef idx="2">
+            <a:schemeClr val="accent1">
+              <a:shade val="50000"/>
+            </a:schemeClr>
+          </a:lnRef>
+          <a:fillRef idx="1">
+            <a:schemeClr val="accent1"/>
+          </a:fillRef>
+          <a:effectRef idx="0">
+            <a:schemeClr val="accent1"/>
+          </a:effectRef>
+          <a:fontRef idx="minor">
+            <a:schemeClr val="lt1"/>
+          </a:fontRef>
+        </p:style>
+        <p:txBody>
+          <a:bodyPr rtlCol="0" anchor="ctr"/>
+          <a:lstStyle/>
+          <a:p>
+            <a:pPr algn="ctr"/>
+            <a:endParaRPr lang="en-US"/>
+          </a:p>
+        </p:txBody>
+      </p:sp>
+      <p:sp>
+        <p:nvSpPr>
+          <p:cNvPr id="2059" name="Freeform 2058"/>
+          <p:cNvSpPr/>
+          <p:nvPr/>
+        </p:nvSpPr>
+        <p:spPr>
+          <a:xfrm>
+            <a:off x="5770880" y="1971040"/>
+            <a:ext cx="386080" cy="396240"/>
+          </a:xfrm>
+          <a:custGeom>
+            <a:avLst/>
+            <a:gdLst>
+              <a:gd name="connsiteX0" fmla="*/ 0 w 457200"/>
+              <a:gd name="connsiteY0" fmla="*/ 416560 h 416560"/>
+              <a:gd name="connsiteX1" fmla="*/ 457200 w 457200"/>
+              <a:gd name="connsiteY1" fmla="*/ 0 h 416560"/>
+              <a:gd name="connsiteX0" fmla="*/ 0 w 264160"/>
+              <a:gd name="connsiteY0" fmla="*/ 497840 h 497840"/>
+              <a:gd name="connsiteX1" fmla="*/ 264160 w 264160"/>
+              <a:gd name="connsiteY1" fmla="*/ 0 h 497840"/>
+              <a:gd name="connsiteX0" fmla="*/ 0 w 264160"/>
+              <a:gd name="connsiteY0" fmla="*/ 497840 h 497840"/>
+              <a:gd name="connsiteX1" fmla="*/ 264160 w 264160"/>
+              <a:gd name="connsiteY1" fmla="*/ 0 h 497840"/>
+              <a:gd name="connsiteX0" fmla="*/ 0 w 386080"/>
+              <a:gd name="connsiteY0" fmla="*/ 396240 h 396240"/>
+              <a:gd name="connsiteX1" fmla="*/ 386080 w 386080"/>
+              <a:gd name="connsiteY1" fmla="*/ 0 h 396240"/>
+              <a:gd name="connsiteX0" fmla="*/ 0 w 386080"/>
+              <a:gd name="connsiteY0" fmla="*/ 396240 h 396240"/>
+              <a:gd name="connsiteX1" fmla="*/ 386080 w 386080"/>
+              <a:gd name="connsiteY1" fmla="*/ 0 h 396240"/>
+            </a:gdLst>
+            <a:ahLst/>
+            <a:cxnLst>
+              <a:cxn ang="0">
+                <a:pos x="connsiteX0" y="connsiteY0"/>
+              </a:cxn>
+              <a:cxn ang="0">
+                <a:pos x="connsiteX1" y="connsiteY1"/>
+              </a:cxn>
+            </a:cxnLst>
+            <a:rect l="l" t="t" r="r" b="b"/>
+            <a:pathLst>
+              <a:path w="386080" h="396240">
+                <a:moveTo>
+                  <a:pt x="0" y="396240"/>
+                </a:moveTo>
+                <a:cubicBezTo>
+                  <a:pt x="230293" y="311573"/>
+                  <a:pt x="298027" y="165947"/>
+                  <a:pt x="386080" y="0"/>
+                </a:cubicBezTo>
+              </a:path>
+            </a:pathLst>
+          </a:custGeom>
+          <a:noFill/>
+          <a:ln w="28575">
+            <a:solidFill>
+              <a:schemeClr val="bg1"/>
+            </a:solidFill>
+            <a:prstDash val="solid"/>
+          </a:ln>
+        </p:spPr>
+        <p:style>
+          <a:lnRef idx="2">
+            <a:schemeClr val="accent1">
+              <a:shade val="50000"/>
+            </a:schemeClr>
+          </a:lnRef>
+          <a:fillRef idx="1">
+            <a:schemeClr val="accent1"/>
+          </a:fillRef>
+          <a:effectRef idx="0">
+            <a:schemeClr val="accent1"/>
+          </a:effectRef>
+          <a:fontRef idx="minor">
+            <a:schemeClr val="lt1"/>
+          </a:fontRef>
+        </p:style>
+        <p:txBody>
+          <a:bodyPr rtlCol="0" anchor="ctr"/>
+          <a:lstStyle/>
+          <a:p>
+            <a:pPr algn="ctr"/>
+            <a:endParaRPr lang="en-US"/>
+          </a:p>
+        </p:txBody>
+      </p:sp>
       <p:pic>
         <p:nvPicPr>
-          <p:cNvPr id="4" name="Picture 3"/>
+          <p:cNvPr id="2050" name="Picture 2" descr="https://t1.ftcdn.net/jpg/00/84/62/30/500_F_84623057_Y0BW2SfH7wpUq0OJg9mcXakrVSUQySlM.jpg"/>
+          <p:cNvPicPr>
+            <a:picLocks noChangeAspect="1" noChangeArrowheads="1"/>
+          </p:cNvPicPr>
+          <p:nvPr/>
+        </p:nvPicPr>
+        <p:blipFill>
+          <a:blip r:embed="rId2">
+            <a:extLst>
+              <a:ext uri="{28A0092B-C50C-407E-A947-70E740481C1C}">
+                <a14:useLocalDpi xmlns:a14="http://schemas.microsoft.com/office/drawing/2010/main" val="0"/>
+              </a:ext>
+            </a:extLst>
+          </a:blip>
+          <a:srcRect/>
+          <a:stretch>
+            <a:fillRect/>
+          </a:stretch>
+        </p:blipFill>
+        <p:spPr bwMode="auto">
+          <a:xfrm>
+            <a:off x="-514985" y="-218123"/>
+            <a:ext cx="4762500" cy="3086101"/>
+          </a:xfrm>
+          <a:prstGeom prst="rect">
+            <a:avLst/>
+          </a:prstGeom>
+          <a:noFill/>
+          <a:extLst>
+            <a:ext uri="{909E8E84-426E-40DD-AFC4-6F175D3DCCD1}">
+              <a14:hiddenFill xmlns:a14="http://schemas.microsoft.com/office/drawing/2010/main">
+                <a:solidFill>
+                  <a:srgbClr val="FFFFFF"/>
+                </a:solidFill>
+              </a14:hiddenFill>
+            </a:ext>
+          </a:extLst>
+        </p:spPr>
+      </p:pic>
+      <p:pic>
+        <p:nvPicPr>
+          <p:cNvPr id="2052" name="Picture 4" descr="http://graphicpick.com/wp-content/uploads/edd/2015/12/tech-brain-logo.jpg"/>
+          <p:cNvPicPr>
+            <a:picLocks noChangeAspect="1" noChangeArrowheads="1"/>
+          </p:cNvPicPr>
+          <p:nvPr/>
+        </p:nvPicPr>
+        <p:blipFill rotWithShape="1">
+          <a:blip r:embed="rId3">
+            <a:clrChange>
+              <a:clrFrom>
+                <a:srgbClr val="FBFBFB"/>
+              </a:clrFrom>
+              <a:clrTo>
+                <a:srgbClr val="FBFBFB">
+                  <a:alpha val="0"/>
+                </a:srgbClr>
+              </a:clrTo>
+            </a:clrChange>
+            <a:extLst>
+              <a:ext uri="{28A0092B-C50C-407E-A947-70E740481C1C}">
+                <a14:useLocalDpi xmlns:a14="http://schemas.microsoft.com/office/drawing/2010/main" val="0"/>
+              </a:ext>
+            </a:extLst>
+          </a:blip>
+          <a:srcRect l="25622" t="21697" r="25027" b="24435"/>
+          <a:stretch/>
+        </p:blipFill>
+        <p:spPr bwMode="auto">
+          <a:xfrm>
+            <a:off x="8300720" y="152399"/>
+            <a:ext cx="3525520" cy="2560321"/>
+          </a:xfrm>
+          <a:prstGeom prst="rect">
+            <a:avLst/>
+          </a:prstGeom>
+          <a:noFill/>
+          <a:extLst>
+            <a:ext uri="{909E8E84-426E-40DD-AFC4-6F175D3DCCD1}">
+              <a14:hiddenFill xmlns:a14="http://schemas.microsoft.com/office/drawing/2010/main">
+                <a:solidFill>
+                  <a:srgbClr val="FFFFFF"/>
+                </a:solidFill>
+              </a14:hiddenFill>
+            </a:ext>
+          </a:extLst>
+        </p:spPr>
+      </p:pic>
+      <p:pic>
+        <p:nvPicPr>
+          <p:cNvPr id="8" name="Picture 2" descr="https://t1.ftcdn.net/jpg/00/84/62/30/500_F_84623057_Y0BW2SfH7wpUq0OJg9mcXakrVSUQySlM.jpg"/>
+          <p:cNvPicPr>
+            <a:picLocks noChangeAspect="1" noChangeArrowheads="1"/>
+          </p:cNvPicPr>
+          <p:nvPr/>
+        </p:nvPicPr>
+        <p:blipFill rotWithShape="1">
+          <a:blip r:embed="rId2">
+            <a:lum bright="70000" contrast="-70000"/>
+            <a:extLst>
+              <a:ext uri="{28A0092B-C50C-407E-A947-70E740481C1C}">
+                <a14:useLocalDpi xmlns:a14="http://schemas.microsoft.com/office/drawing/2010/main" val="0"/>
+              </a:ext>
+            </a:extLst>
+          </a:blip>
+          <a:srcRect l="25827" t="17212" r="25827" b="17212"/>
+          <a:stretch/>
+        </p:blipFill>
+        <p:spPr bwMode="auto">
+          <a:xfrm>
+            <a:off x="8187101" y="3820700"/>
+            <a:ext cx="3928110" cy="3452535"/>
+          </a:xfrm>
+          <a:prstGeom prst="rect">
+            <a:avLst/>
+          </a:prstGeom>
+          <a:noFill/>
+          <a:extLst>
+            <a:ext uri="{909E8E84-426E-40DD-AFC4-6F175D3DCCD1}">
+              <a14:hiddenFill xmlns:a14="http://schemas.microsoft.com/office/drawing/2010/main">
+                <a:solidFill>
+                  <a:srgbClr val="FFFFFF"/>
+                </a:solidFill>
+              </a14:hiddenFill>
+            </a:ext>
+          </a:extLst>
+        </p:spPr>
+      </p:pic>
+      <p:sp>
+        <p:nvSpPr>
+          <p:cNvPr id="7" name="Freeform 6"/>
+          <p:cNvSpPr/>
+          <p:nvPr/>
+        </p:nvSpPr>
+        <p:spPr>
+          <a:xfrm rot="16559386" flipV="1">
+            <a:off x="3602334" y="5396228"/>
+            <a:ext cx="650240" cy="640080"/>
+          </a:xfrm>
+          <a:custGeom>
+            <a:avLst/>
+            <a:gdLst>
+              <a:gd name="connsiteX0" fmla="*/ 0 w 650240"/>
+              <a:gd name="connsiteY0" fmla="*/ 640080 h 640080"/>
+              <a:gd name="connsiteX1" fmla="*/ 650240 w 650240"/>
+              <a:gd name="connsiteY1" fmla="*/ 0 h 640080"/>
+              <a:gd name="connsiteX0" fmla="*/ 0 w 650240"/>
+              <a:gd name="connsiteY0" fmla="*/ 640080 h 640080"/>
+              <a:gd name="connsiteX1" fmla="*/ 650240 w 650240"/>
+              <a:gd name="connsiteY1" fmla="*/ 0 h 640080"/>
+              <a:gd name="connsiteX0" fmla="*/ 0 w 650240"/>
+              <a:gd name="connsiteY0" fmla="*/ 640080 h 640080"/>
+              <a:gd name="connsiteX1" fmla="*/ 650240 w 650240"/>
+              <a:gd name="connsiteY1" fmla="*/ 0 h 640080"/>
+              <a:gd name="connsiteX0" fmla="*/ 0 w 650240"/>
+              <a:gd name="connsiteY0" fmla="*/ 640080 h 640080"/>
+              <a:gd name="connsiteX1" fmla="*/ 650240 w 650240"/>
+              <a:gd name="connsiteY1" fmla="*/ 0 h 640080"/>
+              <a:gd name="connsiteX0" fmla="*/ 0 w 650240"/>
+              <a:gd name="connsiteY0" fmla="*/ 640080 h 640080"/>
+              <a:gd name="connsiteX1" fmla="*/ 650240 w 650240"/>
+              <a:gd name="connsiteY1" fmla="*/ 0 h 640080"/>
+              <a:gd name="connsiteX0" fmla="*/ 0 w 650653"/>
+              <a:gd name="connsiteY0" fmla="*/ 640080 h 640080"/>
+              <a:gd name="connsiteX1" fmla="*/ 650240 w 650653"/>
+              <a:gd name="connsiteY1" fmla="*/ 0 h 640080"/>
+              <a:gd name="connsiteX0" fmla="*/ 0 w 650646"/>
+              <a:gd name="connsiteY0" fmla="*/ 640080 h 640080"/>
+              <a:gd name="connsiteX1" fmla="*/ 650240 w 650646"/>
+              <a:gd name="connsiteY1" fmla="*/ 0 h 640080"/>
+              <a:gd name="connsiteX0" fmla="*/ 0 w 650240"/>
+              <a:gd name="connsiteY0" fmla="*/ 640080 h 640080"/>
+              <a:gd name="connsiteX1" fmla="*/ 650240 w 650240"/>
+              <a:gd name="connsiteY1" fmla="*/ 0 h 640080"/>
+            </a:gdLst>
+            <a:ahLst/>
+            <a:cxnLst>
+              <a:cxn ang="0">
+                <a:pos x="connsiteX0" y="connsiteY0"/>
+              </a:cxn>
+              <a:cxn ang="0">
+                <a:pos x="connsiteX1" y="connsiteY1"/>
+              </a:cxn>
+            </a:cxnLst>
+            <a:rect l="l" t="t" r="r" b="b"/>
+            <a:pathLst>
+              <a:path w="650240" h="640080">
+                <a:moveTo>
+                  <a:pt x="0" y="640080"/>
+                </a:moveTo>
+                <a:cubicBezTo>
+                  <a:pt x="336752" y="583922"/>
+                  <a:pt x="579770" y="387592"/>
+                  <a:pt x="650240" y="0"/>
+                </a:cubicBezTo>
+              </a:path>
+            </a:pathLst>
+          </a:custGeom>
+          <a:noFill/>
+          <a:ln w="28575">
+            <a:solidFill>
+              <a:srgbClr val="FF0000"/>
+            </a:solidFill>
+          </a:ln>
+        </p:spPr>
+        <p:style>
+          <a:lnRef idx="2">
+            <a:schemeClr val="accent1">
+              <a:shade val="50000"/>
+            </a:schemeClr>
+          </a:lnRef>
+          <a:fillRef idx="1">
+            <a:schemeClr val="accent1"/>
+          </a:fillRef>
+          <a:effectRef idx="0">
+            <a:schemeClr val="accent1"/>
+          </a:effectRef>
+          <a:fontRef idx="minor">
+            <a:schemeClr val="lt1"/>
+          </a:fontRef>
+        </p:style>
+        <p:txBody>
+          <a:bodyPr rtlCol="0" anchor="ctr"/>
+          <a:lstStyle/>
+          <a:p>
+            <a:pPr algn="ctr"/>
+            <a:endParaRPr lang="en-US"/>
+          </a:p>
+        </p:txBody>
+      </p:sp>
+      <p:sp>
+        <p:nvSpPr>
+          <p:cNvPr id="16" name="Freeform 15"/>
+          <p:cNvSpPr/>
+          <p:nvPr/>
+        </p:nvSpPr>
+        <p:spPr>
+          <a:xfrm rot="4281812" flipV="1">
+            <a:off x="4660170" y="4357030"/>
+            <a:ext cx="656787" cy="1330335"/>
+          </a:xfrm>
+          <a:custGeom>
+            <a:avLst/>
+            <a:gdLst>
+              <a:gd name="connsiteX0" fmla="*/ 0 w 650240"/>
+              <a:gd name="connsiteY0" fmla="*/ 640080 h 640080"/>
+              <a:gd name="connsiteX1" fmla="*/ 650240 w 650240"/>
+              <a:gd name="connsiteY1" fmla="*/ 0 h 640080"/>
+              <a:gd name="connsiteX0" fmla="*/ 0 w 650240"/>
+              <a:gd name="connsiteY0" fmla="*/ 640080 h 640080"/>
+              <a:gd name="connsiteX1" fmla="*/ 650240 w 650240"/>
+              <a:gd name="connsiteY1" fmla="*/ 0 h 640080"/>
+              <a:gd name="connsiteX0" fmla="*/ 0 w 650240"/>
+              <a:gd name="connsiteY0" fmla="*/ 640080 h 640080"/>
+              <a:gd name="connsiteX1" fmla="*/ 650240 w 650240"/>
+              <a:gd name="connsiteY1" fmla="*/ 0 h 640080"/>
+              <a:gd name="connsiteX0" fmla="*/ 0 w 650240"/>
+              <a:gd name="connsiteY0" fmla="*/ 640080 h 640080"/>
+              <a:gd name="connsiteX1" fmla="*/ 650240 w 650240"/>
+              <a:gd name="connsiteY1" fmla="*/ 0 h 640080"/>
+              <a:gd name="connsiteX0" fmla="*/ 0 w 650240"/>
+              <a:gd name="connsiteY0" fmla="*/ 640080 h 640080"/>
+              <a:gd name="connsiteX1" fmla="*/ 650240 w 650240"/>
+              <a:gd name="connsiteY1" fmla="*/ 0 h 640080"/>
+              <a:gd name="connsiteX0" fmla="*/ 0 w 650653"/>
+              <a:gd name="connsiteY0" fmla="*/ 640080 h 640080"/>
+              <a:gd name="connsiteX1" fmla="*/ 650240 w 650653"/>
+              <a:gd name="connsiteY1" fmla="*/ 0 h 640080"/>
+              <a:gd name="connsiteX0" fmla="*/ 0 w 650646"/>
+              <a:gd name="connsiteY0" fmla="*/ 640080 h 640080"/>
+              <a:gd name="connsiteX1" fmla="*/ 650240 w 650646"/>
+              <a:gd name="connsiteY1" fmla="*/ 0 h 640080"/>
+              <a:gd name="connsiteX0" fmla="*/ 0 w 650240"/>
+              <a:gd name="connsiteY0" fmla="*/ 640080 h 640080"/>
+              <a:gd name="connsiteX1" fmla="*/ 650240 w 650240"/>
+              <a:gd name="connsiteY1" fmla="*/ 0 h 640080"/>
+              <a:gd name="connsiteX0" fmla="*/ 0 w 503232"/>
+              <a:gd name="connsiteY0" fmla="*/ 1330335 h 1330335"/>
+              <a:gd name="connsiteX1" fmla="*/ 503232 w 503232"/>
+              <a:gd name="connsiteY1" fmla="*/ 0 h 1330335"/>
+              <a:gd name="connsiteX0" fmla="*/ 0 w 656787"/>
+              <a:gd name="connsiteY0" fmla="*/ 1330335 h 1330335"/>
+              <a:gd name="connsiteX1" fmla="*/ 503232 w 656787"/>
+              <a:gd name="connsiteY1" fmla="*/ 0 h 1330335"/>
+            </a:gdLst>
+            <a:ahLst/>
+            <a:cxnLst>
+              <a:cxn ang="0">
+                <a:pos x="connsiteX0" y="connsiteY0"/>
+              </a:cxn>
+              <a:cxn ang="0">
+                <a:pos x="connsiteX1" y="connsiteY1"/>
+              </a:cxn>
+            </a:cxnLst>
+            <a:rect l="l" t="t" r="r" b="b"/>
+            <a:pathLst>
+              <a:path w="656787" h="1330335">
+                <a:moveTo>
+                  <a:pt x="0" y="1330335"/>
+                </a:moveTo>
+                <a:cubicBezTo>
+                  <a:pt x="336752" y="1274177"/>
+                  <a:pt x="941342" y="655686"/>
+                  <a:pt x="503232" y="0"/>
+                </a:cubicBezTo>
+              </a:path>
+            </a:pathLst>
+          </a:custGeom>
+          <a:noFill/>
+          <a:ln w="28575">
+            <a:solidFill>
+              <a:srgbClr val="FF0000"/>
+            </a:solidFill>
+          </a:ln>
+        </p:spPr>
+        <p:style>
+          <a:lnRef idx="2">
+            <a:schemeClr val="accent1">
+              <a:shade val="50000"/>
+            </a:schemeClr>
+          </a:lnRef>
+          <a:fillRef idx="1">
+            <a:schemeClr val="accent1"/>
+          </a:fillRef>
+          <a:effectRef idx="0">
+            <a:schemeClr val="accent1"/>
+          </a:effectRef>
+          <a:fontRef idx="minor">
+            <a:schemeClr val="lt1"/>
+          </a:fontRef>
+        </p:style>
+        <p:txBody>
+          <a:bodyPr rtlCol="0" anchor="ctr"/>
+          <a:lstStyle/>
+          <a:p>
+            <a:pPr algn="ctr"/>
+            <a:endParaRPr lang="en-US"/>
+          </a:p>
+        </p:txBody>
+      </p:sp>
+      <p:sp>
+        <p:nvSpPr>
+          <p:cNvPr id="17" name="Freeform 16"/>
+          <p:cNvSpPr/>
+          <p:nvPr/>
+        </p:nvSpPr>
+        <p:spPr>
+          <a:xfrm rot="16559386" flipV="1">
+            <a:off x="3859348" y="4189231"/>
+            <a:ext cx="446330" cy="439356"/>
+          </a:xfrm>
+          <a:custGeom>
+            <a:avLst/>
+            <a:gdLst>
+              <a:gd name="connsiteX0" fmla="*/ 0 w 650240"/>
+              <a:gd name="connsiteY0" fmla="*/ 640080 h 640080"/>
+              <a:gd name="connsiteX1" fmla="*/ 650240 w 650240"/>
+              <a:gd name="connsiteY1" fmla="*/ 0 h 640080"/>
+              <a:gd name="connsiteX0" fmla="*/ 0 w 650240"/>
+              <a:gd name="connsiteY0" fmla="*/ 640080 h 640080"/>
+              <a:gd name="connsiteX1" fmla="*/ 650240 w 650240"/>
+              <a:gd name="connsiteY1" fmla="*/ 0 h 640080"/>
+              <a:gd name="connsiteX0" fmla="*/ 0 w 650240"/>
+              <a:gd name="connsiteY0" fmla="*/ 640080 h 640080"/>
+              <a:gd name="connsiteX1" fmla="*/ 650240 w 650240"/>
+              <a:gd name="connsiteY1" fmla="*/ 0 h 640080"/>
+              <a:gd name="connsiteX0" fmla="*/ 0 w 650240"/>
+              <a:gd name="connsiteY0" fmla="*/ 640080 h 640080"/>
+              <a:gd name="connsiteX1" fmla="*/ 650240 w 650240"/>
+              <a:gd name="connsiteY1" fmla="*/ 0 h 640080"/>
+              <a:gd name="connsiteX0" fmla="*/ 0 w 650240"/>
+              <a:gd name="connsiteY0" fmla="*/ 640080 h 640080"/>
+              <a:gd name="connsiteX1" fmla="*/ 650240 w 650240"/>
+              <a:gd name="connsiteY1" fmla="*/ 0 h 640080"/>
+              <a:gd name="connsiteX0" fmla="*/ 0 w 650653"/>
+              <a:gd name="connsiteY0" fmla="*/ 640080 h 640080"/>
+              <a:gd name="connsiteX1" fmla="*/ 650240 w 650653"/>
+              <a:gd name="connsiteY1" fmla="*/ 0 h 640080"/>
+              <a:gd name="connsiteX0" fmla="*/ 0 w 650646"/>
+              <a:gd name="connsiteY0" fmla="*/ 640080 h 640080"/>
+              <a:gd name="connsiteX1" fmla="*/ 650240 w 650646"/>
+              <a:gd name="connsiteY1" fmla="*/ 0 h 640080"/>
+              <a:gd name="connsiteX0" fmla="*/ 0 w 650240"/>
+              <a:gd name="connsiteY0" fmla="*/ 640080 h 640080"/>
+              <a:gd name="connsiteX1" fmla="*/ 650240 w 650240"/>
+              <a:gd name="connsiteY1" fmla="*/ 0 h 640080"/>
+            </a:gdLst>
+            <a:ahLst/>
+            <a:cxnLst>
+              <a:cxn ang="0">
+                <a:pos x="connsiteX0" y="connsiteY0"/>
+              </a:cxn>
+              <a:cxn ang="0">
+                <a:pos x="connsiteX1" y="connsiteY1"/>
+              </a:cxn>
+            </a:cxnLst>
+            <a:rect l="l" t="t" r="r" b="b"/>
+            <a:pathLst>
+              <a:path w="650240" h="640080">
+                <a:moveTo>
+                  <a:pt x="0" y="640080"/>
+                </a:moveTo>
+                <a:cubicBezTo>
+                  <a:pt x="336752" y="583922"/>
+                  <a:pt x="579770" y="387592"/>
+                  <a:pt x="650240" y="0"/>
+                </a:cubicBezTo>
+              </a:path>
+            </a:pathLst>
+          </a:custGeom>
+          <a:noFill/>
+          <a:ln w="28575">
+            <a:solidFill>
+              <a:srgbClr val="FF0000"/>
+            </a:solidFill>
+          </a:ln>
+        </p:spPr>
+        <p:style>
+          <a:lnRef idx="2">
+            <a:schemeClr val="accent1">
+              <a:shade val="50000"/>
+            </a:schemeClr>
+          </a:lnRef>
+          <a:fillRef idx="1">
+            <a:schemeClr val="accent1"/>
+          </a:fillRef>
+          <a:effectRef idx="0">
+            <a:schemeClr val="accent1"/>
+          </a:effectRef>
+          <a:fontRef idx="minor">
+            <a:schemeClr val="lt1"/>
+          </a:fontRef>
+        </p:style>
+        <p:txBody>
+          <a:bodyPr rtlCol="0" anchor="ctr"/>
+          <a:lstStyle/>
+          <a:p>
+            <a:pPr algn="ctr"/>
+            <a:endParaRPr lang="en-US"/>
+          </a:p>
+        </p:txBody>
+      </p:sp>
+      <p:sp>
+        <p:nvSpPr>
+          <p:cNvPr id="18" name="Freeform 17"/>
+          <p:cNvSpPr/>
+          <p:nvPr/>
+        </p:nvSpPr>
+        <p:spPr>
+          <a:xfrm rot="19893752" flipV="1">
+            <a:off x="3542783" y="3785183"/>
+            <a:ext cx="650240" cy="640080"/>
+          </a:xfrm>
+          <a:custGeom>
+            <a:avLst/>
+            <a:gdLst>
+              <a:gd name="connsiteX0" fmla="*/ 0 w 650240"/>
+              <a:gd name="connsiteY0" fmla="*/ 640080 h 640080"/>
+              <a:gd name="connsiteX1" fmla="*/ 650240 w 650240"/>
+              <a:gd name="connsiteY1" fmla="*/ 0 h 640080"/>
+              <a:gd name="connsiteX0" fmla="*/ 0 w 650240"/>
+              <a:gd name="connsiteY0" fmla="*/ 640080 h 640080"/>
+              <a:gd name="connsiteX1" fmla="*/ 650240 w 650240"/>
+              <a:gd name="connsiteY1" fmla="*/ 0 h 640080"/>
+              <a:gd name="connsiteX0" fmla="*/ 0 w 650240"/>
+              <a:gd name="connsiteY0" fmla="*/ 640080 h 640080"/>
+              <a:gd name="connsiteX1" fmla="*/ 650240 w 650240"/>
+              <a:gd name="connsiteY1" fmla="*/ 0 h 640080"/>
+              <a:gd name="connsiteX0" fmla="*/ 0 w 650240"/>
+              <a:gd name="connsiteY0" fmla="*/ 640080 h 640080"/>
+              <a:gd name="connsiteX1" fmla="*/ 650240 w 650240"/>
+              <a:gd name="connsiteY1" fmla="*/ 0 h 640080"/>
+              <a:gd name="connsiteX0" fmla="*/ 0 w 650240"/>
+              <a:gd name="connsiteY0" fmla="*/ 640080 h 640080"/>
+              <a:gd name="connsiteX1" fmla="*/ 650240 w 650240"/>
+              <a:gd name="connsiteY1" fmla="*/ 0 h 640080"/>
+              <a:gd name="connsiteX0" fmla="*/ 0 w 650653"/>
+              <a:gd name="connsiteY0" fmla="*/ 640080 h 640080"/>
+              <a:gd name="connsiteX1" fmla="*/ 650240 w 650653"/>
+              <a:gd name="connsiteY1" fmla="*/ 0 h 640080"/>
+              <a:gd name="connsiteX0" fmla="*/ 0 w 650646"/>
+              <a:gd name="connsiteY0" fmla="*/ 640080 h 640080"/>
+              <a:gd name="connsiteX1" fmla="*/ 650240 w 650646"/>
+              <a:gd name="connsiteY1" fmla="*/ 0 h 640080"/>
+              <a:gd name="connsiteX0" fmla="*/ 0 w 650240"/>
+              <a:gd name="connsiteY0" fmla="*/ 640080 h 640080"/>
+              <a:gd name="connsiteX1" fmla="*/ 650240 w 650240"/>
+              <a:gd name="connsiteY1" fmla="*/ 0 h 640080"/>
+            </a:gdLst>
+            <a:ahLst/>
+            <a:cxnLst>
+              <a:cxn ang="0">
+                <a:pos x="connsiteX0" y="connsiteY0"/>
+              </a:cxn>
+              <a:cxn ang="0">
+                <a:pos x="connsiteX1" y="connsiteY1"/>
+              </a:cxn>
+            </a:cxnLst>
+            <a:rect l="l" t="t" r="r" b="b"/>
+            <a:pathLst>
+              <a:path w="650240" h="640080">
+                <a:moveTo>
+                  <a:pt x="0" y="640080"/>
+                </a:moveTo>
+                <a:cubicBezTo>
+                  <a:pt x="336752" y="583922"/>
+                  <a:pt x="579770" y="387592"/>
+                  <a:pt x="650240" y="0"/>
+                </a:cubicBezTo>
+              </a:path>
+            </a:pathLst>
+          </a:custGeom>
+          <a:noFill/>
+          <a:ln w="28575">
+            <a:solidFill>
+              <a:srgbClr val="FF0000"/>
+            </a:solidFill>
+          </a:ln>
+        </p:spPr>
+        <p:style>
+          <a:lnRef idx="2">
+            <a:schemeClr val="accent1">
+              <a:shade val="50000"/>
+            </a:schemeClr>
+          </a:lnRef>
+          <a:fillRef idx="1">
+            <a:schemeClr val="accent1"/>
+          </a:fillRef>
+          <a:effectRef idx="0">
+            <a:schemeClr val="accent1"/>
+          </a:effectRef>
+          <a:fontRef idx="minor">
+            <a:schemeClr val="lt1"/>
+          </a:fontRef>
+        </p:style>
+        <p:txBody>
+          <a:bodyPr rtlCol="0" anchor="ctr"/>
+          <a:lstStyle/>
+          <a:p>
+            <a:pPr algn="ctr"/>
+            <a:endParaRPr lang="en-US"/>
+          </a:p>
+        </p:txBody>
+      </p:sp>
+      <p:sp>
+        <p:nvSpPr>
+          <p:cNvPr id="19" name="Freeform 18"/>
+          <p:cNvSpPr/>
+          <p:nvPr/>
+        </p:nvSpPr>
+        <p:spPr>
+          <a:xfrm rot="14650282" flipV="1">
+            <a:off x="2839265" y="4341459"/>
+            <a:ext cx="1024648" cy="582434"/>
+          </a:xfrm>
+          <a:custGeom>
+            <a:avLst/>
+            <a:gdLst>
+              <a:gd name="connsiteX0" fmla="*/ 0 w 650240"/>
+              <a:gd name="connsiteY0" fmla="*/ 640080 h 640080"/>
+              <a:gd name="connsiteX1" fmla="*/ 650240 w 650240"/>
+              <a:gd name="connsiteY1" fmla="*/ 0 h 640080"/>
+              <a:gd name="connsiteX0" fmla="*/ 0 w 650240"/>
+              <a:gd name="connsiteY0" fmla="*/ 640080 h 640080"/>
+              <a:gd name="connsiteX1" fmla="*/ 650240 w 650240"/>
+              <a:gd name="connsiteY1" fmla="*/ 0 h 640080"/>
+              <a:gd name="connsiteX0" fmla="*/ 0 w 650240"/>
+              <a:gd name="connsiteY0" fmla="*/ 640080 h 640080"/>
+              <a:gd name="connsiteX1" fmla="*/ 650240 w 650240"/>
+              <a:gd name="connsiteY1" fmla="*/ 0 h 640080"/>
+              <a:gd name="connsiteX0" fmla="*/ 0 w 650240"/>
+              <a:gd name="connsiteY0" fmla="*/ 640080 h 640080"/>
+              <a:gd name="connsiteX1" fmla="*/ 650240 w 650240"/>
+              <a:gd name="connsiteY1" fmla="*/ 0 h 640080"/>
+              <a:gd name="connsiteX0" fmla="*/ 0 w 650240"/>
+              <a:gd name="connsiteY0" fmla="*/ 640080 h 640080"/>
+              <a:gd name="connsiteX1" fmla="*/ 650240 w 650240"/>
+              <a:gd name="connsiteY1" fmla="*/ 0 h 640080"/>
+              <a:gd name="connsiteX0" fmla="*/ 0 w 650653"/>
+              <a:gd name="connsiteY0" fmla="*/ 640080 h 640080"/>
+              <a:gd name="connsiteX1" fmla="*/ 650240 w 650653"/>
+              <a:gd name="connsiteY1" fmla="*/ 0 h 640080"/>
+              <a:gd name="connsiteX0" fmla="*/ 0 w 650646"/>
+              <a:gd name="connsiteY0" fmla="*/ 640080 h 640080"/>
+              <a:gd name="connsiteX1" fmla="*/ 650240 w 650646"/>
+              <a:gd name="connsiteY1" fmla="*/ 0 h 640080"/>
+              <a:gd name="connsiteX0" fmla="*/ 0 w 650240"/>
+              <a:gd name="connsiteY0" fmla="*/ 640080 h 640080"/>
+              <a:gd name="connsiteX1" fmla="*/ 650240 w 650240"/>
+              <a:gd name="connsiteY1" fmla="*/ 0 h 640080"/>
+              <a:gd name="connsiteX0" fmla="*/ 0 w 1024648"/>
+              <a:gd name="connsiteY0" fmla="*/ 426241 h 426241"/>
+              <a:gd name="connsiteX1" fmla="*/ 1024648 w 1024648"/>
+              <a:gd name="connsiteY1" fmla="*/ 0 h 426241"/>
+              <a:gd name="connsiteX0" fmla="*/ 0 w 1024648"/>
+              <a:gd name="connsiteY0" fmla="*/ 426241 h 582434"/>
+              <a:gd name="connsiteX1" fmla="*/ 1024648 w 1024648"/>
+              <a:gd name="connsiteY1" fmla="*/ 0 h 582434"/>
+            </a:gdLst>
+            <a:ahLst/>
+            <a:cxnLst>
+              <a:cxn ang="0">
+                <a:pos x="connsiteX0" y="connsiteY0"/>
+              </a:cxn>
+              <a:cxn ang="0">
+                <a:pos x="connsiteX1" y="connsiteY1"/>
+              </a:cxn>
+            </a:cxnLst>
+            <a:rect l="l" t="t" r="r" b="b"/>
+            <a:pathLst>
+              <a:path w="1024648" h="582434">
+                <a:moveTo>
+                  <a:pt x="0" y="426241"/>
+                </a:moveTo>
+                <a:cubicBezTo>
+                  <a:pt x="453640" y="821448"/>
+                  <a:pt x="954178" y="387592"/>
+                  <a:pt x="1024648" y="0"/>
+                </a:cubicBezTo>
+              </a:path>
+            </a:pathLst>
+          </a:custGeom>
+          <a:noFill/>
+          <a:ln w="28575">
+            <a:solidFill>
+              <a:srgbClr val="FF0000"/>
+            </a:solidFill>
+          </a:ln>
+        </p:spPr>
+        <p:style>
+          <a:lnRef idx="2">
+            <a:schemeClr val="accent1">
+              <a:shade val="50000"/>
+            </a:schemeClr>
+          </a:lnRef>
+          <a:fillRef idx="1">
+            <a:schemeClr val="accent1"/>
+          </a:fillRef>
+          <a:effectRef idx="0">
+            <a:schemeClr val="accent1"/>
+          </a:effectRef>
+          <a:fontRef idx="minor">
+            <a:schemeClr val="lt1"/>
+          </a:fontRef>
+        </p:style>
+        <p:txBody>
+          <a:bodyPr rtlCol="0" anchor="ctr"/>
+          <a:lstStyle/>
+          <a:p>
+            <a:pPr algn="ctr"/>
+            <a:endParaRPr lang="en-US"/>
+          </a:p>
+        </p:txBody>
+      </p:sp>
+      <p:sp>
+        <p:nvSpPr>
+          <p:cNvPr id="20" name="Freeform 19"/>
+          <p:cNvSpPr/>
+          <p:nvPr/>
+        </p:nvSpPr>
+        <p:spPr>
+          <a:xfrm rot="18201747" flipV="1">
+            <a:off x="3836473" y="3162861"/>
+            <a:ext cx="1046181" cy="1475765"/>
+          </a:xfrm>
+          <a:custGeom>
+            <a:avLst/>
+            <a:gdLst>
+              <a:gd name="connsiteX0" fmla="*/ 0 w 650240"/>
+              <a:gd name="connsiteY0" fmla="*/ 640080 h 640080"/>
+              <a:gd name="connsiteX1" fmla="*/ 650240 w 650240"/>
+              <a:gd name="connsiteY1" fmla="*/ 0 h 640080"/>
+              <a:gd name="connsiteX0" fmla="*/ 0 w 650240"/>
+              <a:gd name="connsiteY0" fmla="*/ 640080 h 640080"/>
+              <a:gd name="connsiteX1" fmla="*/ 650240 w 650240"/>
+              <a:gd name="connsiteY1" fmla="*/ 0 h 640080"/>
+              <a:gd name="connsiteX0" fmla="*/ 0 w 650240"/>
+              <a:gd name="connsiteY0" fmla="*/ 640080 h 640080"/>
+              <a:gd name="connsiteX1" fmla="*/ 650240 w 650240"/>
+              <a:gd name="connsiteY1" fmla="*/ 0 h 640080"/>
+              <a:gd name="connsiteX0" fmla="*/ 0 w 650240"/>
+              <a:gd name="connsiteY0" fmla="*/ 640080 h 640080"/>
+              <a:gd name="connsiteX1" fmla="*/ 650240 w 650240"/>
+              <a:gd name="connsiteY1" fmla="*/ 0 h 640080"/>
+              <a:gd name="connsiteX0" fmla="*/ 0 w 650240"/>
+              <a:gd name="connsiteY0" fmla="*/ 640080 h 640080"/>
+              <a:gd name="connsiteX1" fmla="*/ 650240 w 650240"/>
+              <a:gd name="connsiteY1" fmla="*/ 0 h 640080"/>
+              <a:gd name="connsiteX0" fmla="*/ 0 w 650653"/>
+              <a:gd name="connsiteY0" fmla="*/ 640080 h 640080"/>
+              <a:gd name="connsiteX1" fmla="*/ 650240 w 650653"/>
+              <a:gd name="connsiteY1" fmla="*/ 0 h 640080"/>
+              <a:gd name="connsiteX0" fmla="*/ 0 w 650646"/>
+              <a:gd name="connsiteY0" fmla="*/ 640080 h 640080"/>
+              <a:gd name="connsiteX1" fmla="*/ 650240 w 650646"/>
+              <a:gd name="connsiteY1" fmla="*/ 0 h 640080"/>
+              <a:gd name="connsiteX0" fmla="*/ 0 w 650240"/>
+              <a:gd name="connsiteY0" fmla="*/ 640080 h 640080"/>
+              <a:gd name="connsiteX1" fmla="*/ 650240 w 650240"/>
+              <a:gd name="connsiteY1" fmla="*/ 0 h 640080"/>
+            </a:gdLst>
+            <a:ahLst/>
+            <a:cxnLst>
+              <a:cxn ang="0">
+                <a:pos x="connsiteX0" y="connsiteY0"/>
+              </a:cxn>
+              <a:cxn ang="0">
+                <a:pos x="connsiteX1" y="connsiteY1"/>
+              </a:cxn>
+            </a:cxnLst>
+            <a:rect l="l" t="t" r="r" b="b"/>
+            <a:pathLst>
+              <a:path w="650240" h="640080">
+                <a:moveTo>
+                  <a:pt x="0" y="640080"/>
+                </a:moveTo>
+                <a:cubicBezTo>
+                  <a:pt x="336752" y="583922"/>
+                  <a:pt x="579770" y="387592"/>
+                  <a:pt x="650240" y="0"/>
+                </a:cubicBezTo>
+              </a:path>
+            </a:pathLst>
+          </a:custGeom>
+          <a:noFill/>
+          <a:ln w="28575">
+            <a:solidFill>
+              <a:srgbClr val="FF0000"/>
+            </a:solidFill>
+          </a:ln>
+        </p:spPr>
+        <p:style>
+          <a:lnRef idx="2">
+            <a:schemeClr val="accent1">
+              <a:shade val="50000"/>
+            </a:schemeClr>
+          </a:lnRef>
+          <a:fillRef idx="1">
+            <a:schemeClr val="accent1"/>
+          </a:fillRef>
+          <a:effectRef idx="0">
+            <a:schemeClr val="accent1"/>
+          </a:effectRef>
+          <a:fontRef idx="minor">
+            <a:schemeClr val="lt1"/>
+          </a:fontRef>
+        </p:style>
+        <p:txBody>
+          <a:bodyPr rtlCol="0" anchor="ctr"/>
+          <a:lstStyle/>
+          <a:p>
+            <a:pPr algn="ctr"/>
+            <a:endParaRPr lang="en-US"/>
+          </a:p>
+        </p:txBody>
+      </p:sp>
+      <p:sp>
+        <p:nvSpPr>
+          <p:cNvPr id="22" name="Freeform 21"/>
+          <p:cNvSpPr/>
+          <p:nvPr/>
+        </p:nvSpPr>
+        <p:spPr>
+          <a:xfrm rot="12468416" flipV="1">
+            <a:off x="3258874" y="4902468"/>
+            <a:ext cx="565358" cy="1008993"/>
+          </a:xfrm>
+          <a:custGeom>
+            <a:avLst/>
+            <a:gdLst>
+              <a:gd name="connsiteX0" fmla="*/ 0 w 650240"/>
+              <a:gd name="connsiteY0" fmla="*/ 640080 h 640080"/>
+              <a:gd name="connsiteX1" fmla="*/ 650240 w 650240"/>
+              <a:gd name="connsiteY1" fmla="*/ 0 h 640080"/>
+              <a:gd name="connsiteX0" fmla="*/ 0 w 650240"/>
+              <a:gd name="connsiteY0" fmla="*/ 640080 h 640080"/>
+              <a:gd name="connsiteX1" fmla="*/ 650240 w 650240"/>
+              <a:gd name="connsiteY1" fmla="*/ 0 h 640080"/>
+              <a:gd name="connsiteX0" fmla="*/ 0 w 650240"/>
+              <a:gd name="connsiteY0" fmla="*/ 640080 h 640080"/>
+              <a:gd name="connsiteX1" fmla="*/ 650240 w 650240"/>
+              <a:gd name="connsiteY1" fmla="*/ 0 h 640080"/>
+              <a:gd name="connsiteX0" fmla="*/ 0 w 650240"/>
+              <a:gd name="connsiteY0" fmla="*/ 640080 h 640080"/>
+              <a:gd name="connsiteX1" fmla="*/ 650240 w 650240"/>
+              <a:gd name="connsiteY1" fmla="*/ 0 h 640080"/>
+              <a:gd name="connsiteX0" fmla="*/ 0 w 650240"/>
+              <a:gd name="connsiteY0" fmla="*/ 640080 h 640080"/>
+              <a:gd name="connsiteX1" fmla="*/ 650240 w 650240"/>
+              <a:gd name="connsiteY1" fmla="*/ 0 h 640080"/>
+              <a:gd name="connsiteX0" fmla="*/ 0 w 650653"/>
+              <a:gd name="connsiteY0" fmla="*/ 640080 h 640080"/>
+              <a:gd name="connsiteX1" fmla="*/ 650240 w 650653"/>
+              <a:gd name="connsiteY1" fmla="*/ 0 h 640080"/>
+              <a:gd name="connsiteX0" fmla="*/ 0 w 650646"/>
+              <a:gd name="connsiteY0" fmla="*/ 640080 h 640080"/>
+              <a:gd name="connsiteX1" fmla="*/ 650240 w 650646"/>
+              <a:gd name="connsiteY1" fmla="*/ 0 h 640080"/>
+              <a:gd name="connsiteX0" fmla="*/ 0 w 650240"/>
+              <a:gd name="connsiteY0" fmla="*/ 640080 h 640080"/>
+              <a:gd name="connsiteX1" fmla="*/ 650240 w 650240"/>
+              <a:gd name="connsiteY1" fmla="*/ 0 h 640080"/>
+              <a:gd name="connsiteX0" fmla="*/ 0 w 661182"/>
+              <a:gd name="connsiteY0" fmla="*/ 1118440 h 1118440"/>
+              <a:gd name="connsiteX1" fmla="*/ 661182 w 661182"/>
+              <a:gd name="connsiteY1" fmla="*/ 0 h 1118440"/>
+            </a:gdLst>
+            <a:ahLst/>
+            <a:cxnLst>
+              <a:cxn ang="0">
+                <a:pos x="connsiteX0" y="connsiteY0"/>
+              </a:cxn>
+              <a:cxn ang="0">
+                <a:pos x="connsiteX1" y="connsiteY1"/>
+              </a:cxn>
+            </a:cxnLst>
+            <a:rect l="l" t="t" r="r" b="b"/>
+            <a:pathLst>
+              <a:path w="661182" h="1118440">
+                <a:moveTo>
+                  <a:pt x="0" y="1118440"/>
+                </a:moveTo>
+                <a:cubicBezTo>
+                  <a:pt x="336752" y="1062282"/>
+                  <a:pt x="590712" y="387592"/>
+                  <a:pt x="661182" y="0"/>
+                </a:cubicBezTo>
+              </a:path>
+            </a:pathLst>
+          </a:custGeom>
+          <a:noFill/>
+          <a:ln w="28575">
+            <a:solidFill>
+              <a:srgbClr val="FF0000"/>
+            </a:solidFill>
+          </a:ln>
+        </p:spPr>
+        <p:style>
+          <a:lnRef idx="2">
+            <a:schemeClr val="accent1">
+              <a:shade val="50000"/>
+            </a:schemeClr>
+          </a:lnRef>
+          <a:fillRef idx="1">
+            <a:schemeClr val="accent1"/>
+          </a:fillRef>
+          <a:effectRef idx="0">
+            <a:schemeClr val="accent1"/>
+          </a:effectRef>
+          <a:fontRef idx="minor">
+            <a:schemeClr val="lt1"/>
+          </a:fontRef>
+        </p:style>
+        <p:txBody>
+          <a:bodyPr rtlCol="0" anchor="ctr"/>
+          <a:lstStyle/>
+          <a:p>
+            <a:pPr algn="ctr"/>
+            <a:endParaRPr lang="en-US"/>
+          </a:p>
+        </p:txBody>
+      </p:sp>
+      <p:sp>
+        <p:nvSpPr>
+          <p:cNvPr id="23" name="Freeform 22"/>
+          <p:cNvSpPr/>
+          <p:nvPr/>
+        </p:nvSpPr>
+        <p:spPr>
+          <a:xfrm rot="1829719" flipV="1">
+            <a:off x="5140899" y="3934171"/>
+            <a:ext cx="511787" cy="420451"/>
+          </a:xfrm>
+          <a:custGeom>
+            <a:avLst/>
+            <a:gdLst>
+              <a:gd name="connsiteX0" fmla="*/ 0 w 650240"/>
+              <a:gd name="connsiteY0" fmla="*/ 640080 h 640080"/>
+              <a:gd name="connsiteX1" fmla="*/ 650240 w 650240"/>
+              <a:gd name="connsiteY1" fmla="*/ 0 h 640080"/>
+              <a:gd name="connsiteX0" fmla="*/ 0 w 650240"/>
+              <a:gd name="connsiteY0" fmla="*/ 640080 h 640080"/>
+              <a:gd name="connsiteX1" fmla="*/ 650240 w 650240"/>
+              <a:gd name="connsiteY1" fmla="*/ 0 h 640080"/>
+              <a:gd name="connsiteX0" fmla="*/ 0 w 650240"/>
+              <a:gd name="connsiteY0" fmla="*/ 640080 h 640080"/>
+              <a:gd name="connsiteX1" fmla="*/ 650240 w 650240"/>
+              <a:gd name="connsiteY1" fmla="*/ 0 h 640080"/>
+              <a:gd name="connsiteX0" fmla="*/ 0 w 650240"/>
+              <a:gd name="connsiteY0" fmla="*/ 640080 h 640080"/>
+              <a:gd name="connsiteX1" fmla="*/ 650240 w 650240"/>
+              <a:gd name="connsiteY1" fmla="*/ 0 h 640080"/>
+              <a:gd name="connsiteX0" fmla="*/ 0 w 650240"/>
+              <a:gd name="connsiteY0" fmla="*/ 640080 h 640080"/>
+              <a:gd name="connsiteX1" fmla="*/ 650240 w 650240"/>
+              <a:gd name="connsiteY1" fmla="*/ 0 h 640080"/>
+              <a:gd name="connsiteX0" fmla="*/ 0 w 650653"/>
+              <a:gd name="connsiteY0" fmla="*/ 640080 h 640080"/>
+              <a:gd name="connsiteX1" fmla="*/ 650240 w 650653"/>
+              <a:gd name="connsiteY1" fmla="*/ 0 h 640080"/>
+              <a:gd name="connsiteX0" fmla="*/ 0 w 650646"/>
+              <a:gd name="connsiteY0" fmla="*/ 640080 h 640080"/>
+              <a:gd name="connsiteX1" fmla="*/ 650240 w 650646"/>
+              <a:gd name="connsiteY1" fmla="*/ 0 h 640080"/>
+              <a:gd name="connsiteX0" fmla="*/ 0 w 650240"/>
+              <a:gd name="connsiteY0" fmla="*/ 640080 h 640080"/>
+              <a:gd name="connsiteX1" fmla="*/ 650240 w 650240"/>
+              <a:gd name="connsiteY1" fmla="*/ 0 h 640080"/>
+              <a:gd name="connsiteX0" fmla="*/ 0 w 573079"/>
+              <a:gd name="connsiteY0" fmla="*/ 4561 h 200001"/>
+              <a:gd name="connsiteX1" fmla="*/ 573079 w 573079"/>
+              <a:gd name="connsiteY1" fmla="*/ 49149 h 200001"/>
+              <a:gd name="connsiteX0" fmla="*/ 0 w 412029"/>
+              <a:gd name="connsiteY0" fmla="*/ 325226 h 325226"/>
+              <a:gd name="connsiteX1" fmla="*/ 412029 w 412029"/>
+              <a:gd name="connsiteY1" fmla="*/ 0 h 325226"/>
+              <a:gd name="connsiteX0" fmla="*/ 0 w 501942"/>
+              <a:gd name="connsiteY0" fmla="*/ 325226 h 325226"/>
+              <a:gd name="connsiteX1" fmla="*/ 412029 w 501942"/>
+              <a:gd name="connsiteY1" fmla="*/ 0 h 325226"/>
+              <a:gd name="connsiteX0" fmla="*/ 0 w 484964"/>
+              <a:gd name="connsiteY0" fmla="*/ 325226 h 393922"/>
+              <a:gd name="connsiteX1" fmla="*/ 412029 w 484964"/>
+              <a:gd name="connsiteY1" fmla="*/ 0 h 393922"/>
+              <a:gd name="connsiteX0" fmla="*/ 0 w 445007"/>
+              <a:gd name="connsiteY0" fmla="*/ 338300 h 405387"/>
+              <a:gd name="connsiteX1" fmla="*/ 366930 w 445007"/>
+              <a:gd name="connsiteY1" fmla="*/ 0 h 405387"/>
+              <a:gd name="connsiteX0" fmla="*/ 0 w 367304"/>
+              <a:gd name="connsiteY0" fmla="*/ 338300 h 409429"/>
+              <a:gd name="connsiteX1" fmla="*/ 366930 w 367304"/>
+              <a:gd name="connsiteY1" fmla="*/ 0 h 409429"/>
+            </a:gdLst>
+            <a:ahLst/>
+            <a:cxnLst>
+              <a:cxn ang="0">
+                <a:pos x="connsiteX0" y="connsiteY0"/>
+              </a:cxn>
+              <a:cxn ang="0">
+                <a:pos x="connsiteX1" y="connsiteY1"/>
+              </a:cxn>
+            </a:cxnLst>
+            <a:rect l="l" t="t" r="r" b="b"/>
+            <a:pathLst>
+              <a:path w="367304" h="409429">
+                <a:moveTo>
+                  <a:pt x="0" y="338300"/>
+                </a:moveTo>
+                <a:cubicBezTo>
+                  <a:pt x="192091" y="556933"/>
+                  <a:pt x="376750" y="222112"/>
+                  <a:pt x="366930" y="0"/>
+                </a:cubicBezTo>
+              </a:path>
+            </a:pathLst>
+          </a:custGeom>
+          <a:noFill/>
+          <a:ln w="28575">
+            <a:solidFill>
+              <a:srgbClr val="FF0000"/>
+            </a:solidFill>
+          </a:ln>
+        </p:spPr>
+        <p:style>
+          <a:lnRef idx="2">
+            <a:schemeClr val="accent1">
+              <a:shade val="50000"/>
+            </a:schemeClr>
+          </a:lnRef>
+          <a:fillRef idx="1">
+            <a:schemeClr val="accent1"/>
+          </a:fillRef>
+          <a:effectRef idx="0">
+            <a:schemeClr val="accent1"/>
+          </a:effectRef>
+          <a:fontRef idx="minor">
+            <a:schemeClr val="lt1"/>
+          </a:fontRef>
+        </p:style>
+        <p:txBody>
+          <a:bodyPr rtlCol="0" anchor="ctr"/>
+          <a:lstStyle/>
+          <a:p>
+            <a:pPr algn="ctr"/>
+            <a:endParaRPr lang="en-US"/>
+          </a:p>
+        </p:txBody>
+      </p:sp>
+      <p:sp>
+        <p:nvSpPr>
+          <p:cNvPr id="24" name="Freeform 23"/>
+          <p:cNvSpPr/>
+          <p:nvPr/>
+        </p:nvSpPr>
+        <p:spPr>
+          <a:xfrm rot="13485896" flipV="1">
+            <a:off x="4480197" y="3751707"/>
+            <a:ext cx="446330" cy="439356"/>
+          </a:xfrm>
+          <a:custGeom>
+            <a:avLst/>
+            <a:gdLst>
+              <a:gd name="connsiteX0" fmla="*/ 0 w 650240"/>
+              <a:gd name="connsiteY0" fmla="*/ 640080 h 640080"/>
+              <a:gd name="connsiteX1" fmla="*/ 650240 w 650240"/>
+              <a:gd name="connsiteY1" fmla="*/ 0 h 640080"/>
+              <a:gd name="connsiteX0" fmla="*/ 0 w 650240"/>
+              <a:gd name="connsiteY0" fmla="*/ 640080 h 640080"/>
+              <a:gd name="connsiteX1" fmla="*/ 650240 w 650240"/>
+              <a:gd name="connsiteY1" fmla="*/ 0 h 640080"/>
+              <a:gd name="connsiteX0" fmla="*/ 0 w 650240"/>
+              <a:gd name="connsiteY0" fmla="*/ 640080 h 640080"/>
+              <a:gd name="connsiteX1" fmla="*/ 650240 w 650240"/>
+              <a:gd name="connsiteY1" fmla="*/ 0 h 640080"/>
+              <a:gd name="connsiteX0" fmla="*/ 0 w 650240"/>
+              <a:gd name="connsiteY0" fmla="*/ 640080 h 640080"/>
+              <a:gd name="connsiteX1" fmla="*/ 650240 w 650240"/>
+              <a:gd name="connsiteY1" fmla="*/ 0 h 640080"/>
+              <a:gd name="connsiteX0" fmla="*/ 0 w 650240"/>
+              <a:gd name="connsiteY0" fmla="*/ 640080 h 640080"/>
+              <a:gd name="connsiteX1" fmla="*/ 650240 w 650240"/>
+              <a:gd name="connsiteY1" fmla="*/ 0 h 640080"/>
+              <a:gd name="connsiteX0" fmla="*/ 0 w 650653"/>
+              <a:gd name="connsiteY0" fmla="*/ 640080 h 640080"/>
+              <a:gd name="connsiteX1" fmla="*/ 650240 w 650653"/>
+              <a:gd name="connsiteY1" fmla="*/ 0 h 640080"/>
+              <a:gd name="connsiteX0" fmla="*/ 0 w 650646"/>
+              <a:gd name="connsiteY0" fmla="*/ 640080 h 640080"/>
+              <a:gd name="connsiteX1" fmla="*/ 650240 w 650646"/>
+              <a:gd name="connsiteY1" fmla="*/ 0 h 640080"/>
+              <a:gd name="connsiteX0" fmla="*/ 0 w 650240"/>
+              <a:gd name="connsiteY0" fmla="*/ 640080 h 640080"/>
+              <a:gd name="connsiteX1" fmla="*/ 650240 w 650240"/>
+              <a:gd name="connsiteY1" fmla="*/ 0 h 640080"/>
+            </a:gdLst>
+            <a:ahLst/>
+            <a:cxnLst>
+              <a:cxn ang="0">
+                <a:pos x="connsiteX0" y="connsiteY0"/>
+              </a:cxn>
+              <a:cxn ang="0">
+                <a:pos x="connsiteX1" y="connsiteY1"/>
+              </a:cxn>
+            </a:cxnLst>
+            <a:rect l="l" t="t" r="r" b="b"/>
+            <a:pathLst>
+              <a:path w="650240" h="640080">
+                <a:moveTo>
+                  <a:pt x="0" y="640080"/>
+                </a:moveTo>
+                <a:cubicBezTo>
+                  <a:pt x="336752" y="583922"/>
+                  <a:pt x="579770" y="387592"/>
+                  <a:pt x="650240" y="0"/>
+                </a:cubicBezTo>
+              </a:path>
+            </a:pathLst>
+          </a:custGeom>
+          <a:noFill/>
+          <a:ln w="28575">
+            <a:solidFill>
+              <a:srgbClr val="FF0000"/>
+            </a:solidFill>
+          </a:ln>
+        </p:spPr>
+        <p:style>
+          <a:lnRef idx="2">
+            <a:schemeClr val="accent1">
+              <a:shade val="50000"/>
+            </a:schemeClr>
+          </a:lnRef>
+          <a:fillRef idx="1">
+            <a:schemeClr val="accent1"/>
+          </a:fillRef>
+          <a:effectRef idx="0">
+            <a:schemeClr val="accent1"/>
+          </a:effectRef>
+          <a:fontRef idx="minor">
+            <a:schemeClr val="lt1"/>
+          </a:fontRef>
+        </p:style>
+        <p:txBody>
+          <a:bodyPr rtlCol="0" anchor="ctr"/>
+          <a:lstStyle/>
+          <a:p>
+            <a:pPr algn="ctr"/>
+            <a:endParaRPr lang="en-US"/>
+          </a:p>
+        </p:txBody>
+      </p:sp>
+      <p:sp>
+        <p:nvSpPr>
+          <p:cNvPr id="25" name="Freeform 24"/>
+          <p:cNvSpPr/>
+          <p:nvPr/>
+        </p:nvSpPr>
+        <p:spPr>
+          <a:xfrm rot="4281812" flipV="1">
+            <a:off x="3859212" y="4436555"/>
+            <a:ext cx="236424" cy="1045667"/>
+          </a:xfrm>
+          <a:custGeom>
+            <a:avLst/>
+            <a:gdLst>
+              <a:gd name="connsiteX0" fmla="*/ 0 w 650240"/>
+              <a:gd name="connsiteY0" fmla="*/ 640080 h 640080"/>
+              <a:gd name="connsiteX1" fmla="*/ 650240 w 650240"/>
+              <a:gd name="connsiteY1" fmla="*/ 0 h 640080"/>
+              <a:gd name="connsiteX0" fmla="*/ 0 w 650240"/>
+              <a:gd name="connsiteY0" fmla="*/ 640080 h 640080"/>
+              <a:gd name="connsiteX1" fmla="*/ 650240 w 650240"/>
+              <a:gd name="connsiteY1" fmla="*/ 0 h 640080"/>
+              <a:gd name="connsiteX0" fmla="*/ 0 w 650240"/>
+              <a:gd name="connsiteY0" fmla="*/ 640080 h 640080"/>
+              <a:gd name="connsiteX1" fmla="*/ 650240 w 650240"/>
+              <a:gd name="connsiteY1" fmla="*/ 0 h 640080"/>
+              <a:gd name="connsiteX0" fmla="*/ 0 w 650240"/>
+              <a:gd name="connsiteY0" fmla="*/ 640080 h 640080"/>
+              <a:gd name="connsiteX1" fmla="*/ 650240 w 650240"/>
+              <a:gd name="connsiteY1" fmla="*/ 0 h 640080"/>
+              <a:gd name="connsiteX0" fmla="*/ 0 w 650240"/>
+              <a:gd name="connsiteY0" fmla="*/ 640080 h 640080"/>
+              <a:gd name="connsiteX1" fmla="*/ 650240 w 650240"/>
+              <a:gd name="connsiteY1" fmla="*/ 0 h 640080"/>
+              <a:gd name="connsiteX0" fmla="*/ 0 w 650653"/>
+              <a:gd name="connsiteY0" fmla="*/ 640080 h 640080"/>
+              <a:gd name="connsiteX1" fmla="*/ 650240 w 650653"/>
+              <a:gd name="connsiteY1" fmla="*/ 0 h 640080"/>
+              <a:gd name="connsiteX0" fmla="*/ 0 w 650646"/>
+              <a:gd name="connsiteY0" fmla="*/ 640080 h 640080"/>
+              <a:gd name="connsiteX1" fmla="*/ 650240 w 650646"/>
+              <a:gd name="connsiteY1" fmla="*/ 0 h 640080"/>
+              <a:gd name="connsiteX0" fmla="*/ 0 w 650240"/>
+              <a:gd name="connsiteY0" fmla="*/ 640080 h 640080"/>
+              <a:gd name="connsiteX1" fmla="*/ 650240 w 650240"/>
+              <a:gd name="connsiteY1" fmla="*/ 0 h 640080"/>
+              <a:gd name="connsiteX0" fmla="*/ 0 w 503232"/>
+              <a:gd name="connsiteY0" fmla="*/ 1330335 h 1330335"/>
+              <a:gd name="connsiteX1" fmla="*/ 503232 w 503232"/>
+              <a:gd name="connsiteY1" fmla="*/ 0 h 1330335"/>
+              <a:gd name="connsiteX0" fmla="*/ 0 w 656787"/>
+              <a:gd name="connsiteY0" fmla="*/ 1330335 h 1330335"/>
+              <a:gd name="connsiteX1" fmla="*/ 503232 w 656787"/>
+              <a:gd name="connsiteY1" fmla="*/ 0 h 1330335"/>
+            </a:gdLst>
+            <a:ahLst/>
+            <a:cxnLst>
+              <a:cxn ang="0">
+                <a:pos x="connsiteX0" y="connsiteY0"/>
+              </a:cxn>
+              <a:cxn ang="0">
+                <a:pos x="connsiteX1" y="connsiteY1"/>
+              </a:cxn>
+            </a:cxnLst>
+            <a:rect l="l" t="t" r="r" b="b"/>
+            <a:pathLst>
+              <a:path w="656787" h="1330335">
+                <a:moveTo>
+                  <a:pt x="0" y="1330335"/>
+                </a:moveTo>
+                <a:cubicBezTo>
+                  <a:pt x="336752" y="1274177"/>
+                  <a:pt x="941342" y="655686"/>
+                  <a:pt x="503232" y="0"/>
+                </a:cubicBezTo>
+              </a:path>
+            </a:pathLst>
+          </a:custGeom>
+          <a:noFill/>
+          <a:ln w="28575">
+            <a:solidFill>
+              <a:srgbClr val="FF0000"/>
+            </a:solidFill>
+          </a:ln>
+        </p:spPr>
+        <p:style>
+          <a:lnRef idx="2">
+            <a:schemeClr val="accent1">
+              <a:shade val="50000"/>
+            </a:schemeClr>
+          </a:lnRef>
+          <a:fillRef idx="1">
+            <a:schemeClr val="accent1"/>
+          </a:fillRef>
+          <a:effectRef idx="0">
+            <a:schemeClr val="accent1"/>
+          </a:effectRef>
+          <a:fontRef idx="minor">
+            <a:schemeClr val="lt1"/>
+          </a:fontRef>
+        </p:style>
+        <p:txBody>
+          <a:bodyPr rtlCol="0" anchor="ctr"/>
+          <a:lstStyle/>
+          <a:p>
+            <a:pPr algn="ctr"/>
+            <a:endParaRPr lang="en-US"/>
+          </a:p>
+        </p:txBody>
+      </p:sp>
+      <p:sp>
+        <p:nvSpPr>
+          <p:cNvPr id="9" name="Oval 8"/>
+          <p:cNvSpPr/>
+          <p:nvPr/>
+        </p:nvSpPr>
+        <p:spPr>
+          <a:xfrm>
+            <a:off x="5175831" y="3820700"/>
+            <a:ext cx="99067" cy="99067"/>
+          </a:xfrm>
+          <a:prstGeom prst="ellipse">
+            <a:avLst/>
+          </a:prstGeom>
+          <a:solidFill>
+            <a:schemeClr val="bg1"/>
+          </a:solidFill>
+          <a:ln w="28575">
+            <a:solidFill>
+              <a:srgbClr val="FF0000"/>
+            </a:solidFill>
+          </a:ln>
+        </p:spPr>
+        <p:style>
+          <a:lnRef idx="2">
+            <a:schemeClr val="accent1">
+              <a:shade val="50000"/>
+            </a:schemeClr>
+          </a:lnRef>
+          <a:fillRef idx="1">
+            <a:schemeClr val="accent1"/>
+          </a:fillRef>
+          <a:effectRef idx="0">
+            <a:schemeClr val="accent1"/>
+          </a:effectRef>
+          <a:fontRef idx="minor">
+            <a:schemeClr val="lt1"/>
+          </a:fontRef>
+        </p:style>
+        <p:txBody>
+          <a:bodyPr rtlCol="0" anchor="ctr"/>
+          <a:lstStyle/>
+          <a:p>
+            <a:pPr algn="ctr"/>
+            <a:endParaRPr lang="en-US"/>
+          </a:p>
+        </p:txBody>
+      </p:sp>
+      <p:sp>
+        <p:nvSpPr>
+          <p:cNvPr id="27" name="Oval 26"/>
+          <p:cNvSpPr/>
+          <p:nvPr/>
+        </p:nvSpPr>
+        <p:spPr>
+          <a:xfrm>
+            <a:off x="4672462" y="4223638"/>
+            <a:ext cx="99067" cy="99067"/>
+          </a:xfrm>
+          <a:prstGeom prst="ellipse">
+            <a:avLst/>
+          </a:prstGeom>
+          <a:solidFill>
+            <a:schemeClr val="bg1"/>
+          </a:solidFill>
+          <a:ln w="28575">
+            <a:solidFill>
+              <a:srgbClr val="FF0000"/>
+            </a:solidFill>
+          </a:ln>
+        </p:spPr>
+        <p:style>
+          <a:lnRef idx="2">
+            <a:schemeClr val="accent1">
+              <a:shade val="50000"/>
+            </a:schemeClr>
+          </a:lnRef>
+          <a:fillRef idx="1">
+            <a:schemeClr val="accent1"/>
+          </a:fillRef>
+          <a:effectRef idx="0">
+            <a:schemeClr val="accent1"/>
+          </a:effectRef>
+          <a:fontRef idx="minor">
+            <a:schemeClr val="lt1"/>
+          </a:fontRef>
+        </p:style>
+        <p:txBody>
+          <a:bodyPr rtlCol="0" anchor="ctr"/>
+          <a:lstStyle/>
+          <a:p>
+            <a:pPr algn="ctr"/>
+            <a:endParaRPr lang="en-US"/>
+          </a:p>
+        </p:txBody>
+      </p:sp>
+      <p:sp>
+        <p:nvSpPr>
+          <p:cNvPr id="28" name="Oval 27"/>
+          <p:cNvSpPr/>
+          <p:nvPr/>
+        </p:nvSpPr>
+        <p:spPr>
+          <a:xfrm>
+            <a:off x="4653828" y="3608726"/>
+            <a:ext cx="99067" cy="99067"/>
+          </a:xfrm>
+          <a:prstGeom prst="ellipse">
+            <a:avLst/>
+          </a:prstGeom>
+          <a:solidFill>
+            <a:schemeClr val="bg1"/>
+          </a:solidFill>
+          <a:ln w="28575">
+            <a:solidFill>
+              <a:schemeClr val="tx1"/>
+            </a:solidFill>
+          </a:ln>
+        </p:spPr>
+        <p:style>
+          <a:lnRef idx="2">
+            <a:schemeClr val="accent1">
+              <a:shade val="50000"/>
+            </a:schemeClr>
+          </a:lnRef>
+          <a:fillRef idx="1">
+            <a:schemeClr val="accent1"/>
+          </a:fillRef>
+          <a:effectRef idx="0">
+            <a:schemeClr val="accent1"/>
+          </a:effectRef>
+          <a:fontRef idx="minor">
+            <a:schemeClr val="lt1"/>
+          </a:fontRef>
+        </p:style>
+        <p:txBody>
+          <a:bodyPr rtlCol="0" anchor="ctr"/>
+          <a:lstStyle/>
+          <a:p>
+            <a:pPr algn="ctr"/>
+            <a:endParaRPr lang="en-US"/>
+          </a:p>
+        </p:txBody>
+      </p:sp>
+      <p:sp>
+        <p:nvSpPr>
+          <p:cNvPr id="29" name="Oval 28"/>
+          <p:cNvSpPr/>
+          <p:nvPr/>
+        </p:nvSpPr>
+        <p:spPr>
+          <a:xfrm>
+            <a:off x="4228558" y="4174055"/>
+            <a:ext cx="99067" cy="99067"/>
+          </a:xfrm>
+          <a:prstGeom prst="ellipse">
+            <a:avLst/>
+          </a:prstGeom>
+          <a:solidFill>
+            <a:schemeClr val="bg1"/>
+          </a:solidFill>
+          <a:ln w="28575">
+            <a:solidFill>
+              <a:srgbClr val="FF0000"/>
+            </a:solidFill>
+          </a:ln>
+        </p:spPr>
+        <p:style>
+          <a:lnRef idx="2">
+            <a:schemeClr val="accent1">
+              <a:shade val="50000"/>
+            </a:schemeClr>
+          </a:lnRef>
+          <a:fillRef idx="1">
+            <a:schemeClr val="accent1"/>
+          </a:fillRef>
+          <a:effectRef idx="0">
+            <a:schemeClr val="accent1"/>
+          </a:effectRef>
+          <a:fontRef idx="minor">
+            <a:schemeClr val="lt1"/>
+          </a:fontRef>
+        </p:style>
+        <p:txBody>
+          <a:bodyPr rtlCol="0" anchor="ctr"/>
+          <a:lstStyle/>
+          <a:p>
+            <a:pPr algn="ctr"/>
+            <a:endParaRPr lang="en-US"/>
+          </a:p>
+        </p:txBody>
+      </p:sp>
+      <p:sp>
+        <p:nvSpPr>
+          <p:cNvPr id="30" name="Oval 29"/>
+          <p:cNvSpPr/>
+          <p:nvPr/>
+        </p:nvSpPr>
+        <p:spPr>
+          <a:xfrm>
+            <a:off x="3803109" y="4538510"/>
+            <a:ext cx="99067" cy="99067"/>
+          </a:xfrm>
+          <a:prstGeom prst="ellipse">
+            <a:avLst/>
+          </a:prstGeom>
+          <a:solidFill>
+            <a:schemeClr val="bg1"/>
+          </a:solidFill>
+          <a:ln w="28575">
+            <a:solidFill>
+              <a:srgbClr val="FF0000"/>
+            </a:solidFill>
+          </a:ln>
+        </p:spPr>
+        <p:style>
+          <a:lnRef idx="2">
+            <a:schemeClr val="accent1">
+              <a:shade val="50000"/>
+            </a:schemeClr>
+          </a:lnRef>
+          <a:fillRef idx="1">
+            <a:schemeClr val="accent1"/>
+          </a:fillRef>
+          <a:effectRef idx="0">
+            <a:schemeClr val="accent1"/>
+          </a:effectRef>
+          <a:fontRef idx="minor">
+            <a:schemeClr val="lt1"/>
+          </a:fontRef>
+        </p:style>
+        <p:txBody>
+          <a:bodyPr rtlCol="0" anchor="ctr"/>
+          <a:lstStyle/>
+          <a:p>
+            <a:pPr algn="ctr"/>
+            <a:endParaRPr lang="en-US"/>
+          </a:p>
+        </p:txBody>
+      </p:sp>
+      <p:sp>
+        <p:nvSpPr>
+          <p:cNvPr id="31" name="Oval 30"/>
+          <p:cNvSpPr/>
+          <p:nvPr/>
+        </p:nvSpPr>
+        <p:spPr>
+          <a:xfrm>
+            <a:off x="3370020" y="3971385"/>
+            <a:ext cx="99067" cy="99067"/>
+          </a:xfrm>
+          <a:prstGeom prst="ellipse">
+            <a:avLst/>
+          </a:prstGeom>
+          <a:solidFill>
+            <a:schemeClr val="bg1"/>
+          </a:solidFill>
+          <a:ln w="28575">
+            <a:solidFill>
+              <a:srgbClr val="FF0000"/>
+            </a:solidFill>
+          </a:ln>
+        </p:spPr>
+        <p:style>
+          <a:lnRef idx="2">
+            <a:schemeClr val="accent1">
+              <a:shade val="50000"/>
+            </a:schemeClr>
+          </a:lnRef>
+          <a:fillRef idx="1">
+            <a:schemeClr val="accent1"/>
+          </a:fillRef>
+          <a:effectRef idx="0">
+            <a:schemeClr val="accent1"/>
+          </a:effectRef>
+          <a:fontRef idx="minor">
+            <a:schemeClr val="lt1"/>
+          </a:fontRef>
+        </p:style>
+        <p:txBody>
+          <a:bodyPr rtlCol="0" anchor="ctr"/>
+          <a:lstStyle/>
+          <a:p>
+            <a:pPr algn="ctr"/>
+            <a:endParaRPr lang="en-US"/>
+          </a:p>
+        </p:txBody>
+      </p:sp>
+      <p:sp>
+        <p:nvSpPr>
+          <p:cNvPr id="32" name="Oval 31"/>
+          <p:cNvSpPr/>
+          <p:nvPr/>
+        </p:nvSpPr>
+        <p:spPr>
+          <a:xfrm>
+            <a:off x="3393496" y="5119345"/>
+            <a:ext cx="99067" cy="99067"/>
+          </a:xfrm>
+          <a:prstGeom prst="ellipse">
+            <a:avLst/>
+          </a:prstGeom>
+          <a:solidFill>
+            <a:schemeClr val="bg1"/>
+          </a:solidFill>
+          <a:ln w="28575">
+            <a:solidFill>
+              <a:srgbClr val="FF0000"/>
+            </a:solidFill>
+          </a:ln>
+        </p:spPr>
+        <p:style>
+          <a:lnRef idx="2">
+            <a:schemeClr val="accent1">
+              <a:shade val="50000"/>
+            </a:schemeClr>
+          </a:lnRef>
+          <a:fillRef idx="1">
+            <a:schemeClr val="accent1"/>
+          </a:fillRef>
+          <a:effectRef idx="0">
+            <a:schemeClr val="accent1"/>
+          </a:effectRef>
+          <a:fontRef idx="minor">
+            <a:schemeClr val="lt1"/>
+          </a:fontRef>
+        </p:style>
+        <p:txBody>
+          <a:bodyPr rtlCol="0" anchor="ctr"/>
+          <a:lstStyle/>
+          <a:p>
+            <a:pPr algn="ctr"/>
+            <a:endParaRPr lang="en-US"/>
+          </a:p>
+        </p:txBody>
+      </p:sp>
+      <p:sp>
+        <p:nvSpPr>
+          <p:cNvPr id="33" name="Oval 32"/>
+          <p:cNvSpPr/>
+          <p:nvPr/>
+        </p:nvSpPr>
+        <p:spPr>
+          <a:xfrm>
+            <a:off x="4381084" y="4604246"/>
+            <a:ext cx="99067" cy="99067"/>
+          </a:xfrm>
+          <a:prstGeom prst="ellipse">
+            <a:avLst/>
+          </a:prstGeom>
+          <a:solidFill>
+            <a:schemeClr val="bg1"/>
+          </a:solidFill>
+          <a:ln w="28575">
+            <a:solidFill>
+              <a:srgbClr val="FF0000"/>
+            </a:solidFill>
+          </a:ln>
+        </p:spPr>
+        <p:style>
+          <a:lnRef idx="2">
+            <a:schemeClr val="accent1">
+              <a:shade val="50000"/>
+            </a:schemeClr>
+          </a:lnRef>
+          <a:fillRef idx="1">
+            <a:schemeClr val="accent1"/>
+          </a:fillRef>
+          <a:effectRef idx="0">
+            <a:schemeClr val="accent1"/>
+          </a:effectRef>
+          <a:fontRef idx="minor">
+            <a:schemeClr val="lt1"/>
+          </a:fontRef>
+        </p:style>
+        <p:txBody>
+          <a:bodyPr rtlCol="0" anchor="ctr"/>
+          <a:lstStyle/>
+          <a:p>
+            <a:pPr algn="ctr"/>
+            <a:endParaRPr lang="en-US"/>
+          </a:p>
+        </p:txBody>
+      </p:sp>
+      <p:sp>
+        <p:nvSpPr>
+          <p:cNvPr id="34" name="Oval 33"/>
+          <p:cNvSpPr/>
+          <p:nvPr/>
+        </p:nvSpPr>
+        <p:spPr>
+          <a:xfrm>
+            <a:off x="4260496" y="5402897"/>
+            <a:ext cx="99067" cy="99067"/>
+          </a:xfrm>
+          <a:prstGeom prst="ellipse">
+            <a:avLst/>
+          </a:prstGeom>
+          <a:solidFill>
+            <a:schemeClr val="bg1"/>
+          </a:solidFill>
+          <a:ln w="28575">
+            <a:solidFill>
+              <a:srgbClr val="FF0000"/>
+            </a:solidFill>
+          </a:ln>
+        </p:spPr>
+        <p:style>
+          <a:lnRef idx="2">
+            <a:schemeClr val="accent1">
+              <a:shade val="50000"/>
+            </a:schemeClr>
+          </a:lnRef>
+          <a:fillRef idx="1">
+            <a:schemeClr val="accent1"/>
+          </a:fillRef>
+          <a:effectRef idx="0">
+            <a:schemeClr val="accent1"/>
+          </a:effectRef>
+          <a:fontRef idx="minor">
+            <a:schemeClr val="lt1"/>
+          </a:fontRef>
+        </p:style>
+        <p:txBody>
+          <a:bodyPr rtlCol="0" anchor="ctr"/>
+          <a:lstStyle/>
+          <a:p>
+            <a:pPr algn="ctr"/>
+            <a:endParaRPr lang="en-US"/>
+          </a:p>
+        </p:txBody>
+      </p:sp>
+      <p:sp>
+        <p:nvSpPr>
+          <p:cNvPr id="35" name="Oval 34"/>
+          <p:cNvSpPr/>
+          <p:nvPr/>
+        </p:nvSpPr>
+        <p:spPr>
+          <a:xfrm>
+            <a:off x="5474903" y="4407085"/>
+            <a:ext cx="99067" cy="99067"/>
+          </a:xfrm>
+          <a:prstGeom prst="ellipse">
+            <a:avLst/>
+          </a:prstGeom>
+          <a:solidFill>
+            <a:schemeClr val="bg1"/>
+          </a:solidFill>
+          <a:ln w="28575">
+            <a:solidFill>
+              <a:srgbClr val="FF0000"/>
+            </a:solidFill>
+          </a:ln>
+        </p:spPr>
+        <p:style>
+          <a:lnRef idx="2">
+            <a:schemeClr val="accent1">
+              <a:shade val="50000"/>
+            </a:schemeClr>
+          </a:lnRef>
+          <a:fillRef idx="1">
+            <a:schemeClr val="accent1"/>
+          </a:fillRef>
+          <a:effectRef idx="0">
+            <a:schemeClr val="accent1"/>
+          </a:effectRef>
+          <a:fontRef idx="minor">
+            <a:schemeClr val="lt1"/>
+          </a:fontRef>
+        </p:style>
+        <p:txBody>
+          <a:bodyPr rtlCol="0" anchor="ctr"/>
+          <a:lstStyle/>
+          <a:p>
+            <a:pPr algn="ctr"/>
+            <a:endParaRPr lang="en-US"/>
+          </a:p>
+        </p:txBody>
+      </p:sp>
+      <p:sp>
+        <p:nvSpPr>
+          <p:cNvPr id="36" name="Oval 35"/>
+          <p:cNvSpPr/>
+          <p:nvPr/>
+        </p:nvSpPr>
+        <p:spPr>
+          <a:xfrm>
+            <a:off x="3443030" y="4723305"/>
+            <a:ext cx="99067" cy="99067"/>
+          </a:xfrm>
+          <a:prstGeom prst="ellipse">
+            <a:avLst/>
+          </a:prstGeom>
+          <a:solidFill>
+            <a:schemeClr val="bg1"/>
+          </a:solidFill>
+          <a:ln w="28575">
+            <a:solidFill>
+              <a:srgbClr val="FF0000"/>
+            </a:solidFill>
+          </a:ln>
+        </p:spPr>
+        <p:style>
+          <a:lnRef idx="2">
+            <a:schemeClr val="accent1">
+              <a:shade val="50000"/>
+            </a:schemeClr>
+          </a:lnRef>
+          <a:fillRef idx="1">
+            <a:schemeClr val="accent1"/>
+          </a:fillRef>
+          <a:effectRef idx="0">
+            <a:schemeClr val="accent1"/>
+          </a:effectRef>
+          <a:fontRef idx="minor">
+            <a:schemeClr val="lt1"/>
+          </a:fontRef>
+        </p:style>
+        <p:txBody>
+          <a:bodyPr rtlCol="0" anchor="ctr"/>
+          <a:lstStyle/>
+          <a:p>
+            <a:pPr algn="ctr"/>
+            <a:endParaRPr lang="en-US"/>
+          </a:p>
+        </p:txBody>
+      </p:sp>
+      <p:sp>
+        <p:nvSpPr>
+          <p:cNvPr id="37" name="Oval 36"/>
+          <p:cNvSpPr/>
+          <p:nvPr/>
+        </p:nvSpPr>
+        <p:spPr>
+          <a:xfrm>
+            <a:off x="3525700" y="5955367"/>
+            <a:ext cx="99067" cy="99067"/>
+          </a:xfrm>
+          <a:prstGeom prst="ellipse">
+            <a:avLst/>
+          </a:prstGeom>
+          <a:solidFill>
+            <a:schemeClr val="bg1"/>
+          </a:solidFill>
+          <a:ln w="28575">
+            <a:solidFill>
+              <a:srgbClr val="FF0000"/>
+            </a:solidFill>
+          </a:ln>
+        </p:spPr>
+        <p:style>
+          <a:lnRef idx="2">
+            <a:schemeClr val="accent1">
+              <a:shade val="50000"/>
+            </a:schemeClr>
+          </a:lnRef>
+          <a:fillRef idx="1">
+            <a:schemeClr val="accent1"/>
+          </a:fillRef>
+          <a:effectRef idx="0">
+            <a:schemeClr val="accent1"/>
+          </a:effectRef>
+          <a:fontRef idx="minor">
+            <a:schemeClr val="lt1"/>
+          </a:fontRef>
+        </p:style>
+        <p:txBody>
+          <a:bodyPr rtlCol="0" anchor="ctr"/>
+          <a:lstStyle/>
+          <a:p>
+            <a:pPr algn="ctr"/>
+            <a:endParaRPr lang="en-US"/>
+          </a:p>
+        </p:txBody>
+      </p:sp>
+      <p:sp>
+        <p:nvSpPr>
+          <p:cNvPr id="38" name="Freeform 37"/>
+          <p:cNvSpPr/>
+          <p:nvPr/>
+        </p:nvSpPr>
+        <p:spPr>
+          <a:xfrm rot="18098252" flipV="1">
+            <a:off x="5628383" y="4117983"/>
+            <a:ext cx="446330" cy="439356"/>
+          </a:xfrm>
+          <a:custGeom>
+            <a:avLst/>
+            <a:gdLst>
+              <a:gd name="connsiteX0" fmla="*/ 0 w 650240"/>
+              <a:gd name="connsiteY0" fmla="*/ 640080 h 640080"/>
+              <a:gd name="connsiteX1" fmla="*/ 650240 w 650240"/>
+              <a:gd name="connsiteY1" fmla="*/ 0 h 640080"/>
+              <a:gd name="connsiteX0" fmla="*/ 0 w 650240"/>
+              <a:gd name="connsiteY0" fmla="*/ 640080 h 640080"/>
+              <a:gd name="connsiteX1" fmla="*/ 650240 w 650240"/>
+              <a:gd name="connsiteY1" fmla="*/ 0 h 640080"/>
+              <a:gd name="connsiteX0" fmla="*/ 0 w 650240"/>
+              <a:gd name="connsiteY0" fmla="*/ 640080 h 640080"/>
+              <a:gd name="connsiteX1" fmla="*/ 650240 w 650240"/>
+              <a:gd name="connsiteY1" fmla="*/ 0 h 640080"/>
+              <a:gd name="connsiteX0" fmla="*/ 0 w 650240"/>
+              <a:gd name="connsiteY0" fmla="*/ 640080 h 640080"/>
+              <a:gd name="connsiteX1" fmla="*/ 650240 w 650240"/>
+              <a:gd name="connsiteY1" fmla="*/ 0 h 640080"/>
+              <a:gd name="connsiteX0" fmla="*/ 0 w 650240"/>
+              <a:gd name="connsiteY0" fmla="*/ 640080 h 640080"/>
+              <a:gd name="connsiteX1" fmla="*/ 650240 w 650240"/>
+              <a:gd name="connsiteY1" fmla="*/ 0 h 640080"/>
+              <a:gd name="connsiteX0" fmla="*/ 0 w 650653"/>
+              <a:gd name="connsiteY0" fmla="*/ 640080 h 640080"/>
+              <a:gd name="connsiteX1" fmla="*/ 650240 w 650653"/>
+              <a:gd name="connsiteY1" fmla="*/ 0 h 640080"/>
+              <a:gd name="connsiteX0" fmla="*/ 0 w 650646"/>
+              <a:gd name="connsiteY0" fmla="*/ 640080 h 640080"/>
+              <a:gd name="connsiteX1" fmla="*/ 650240 w 650646"/>
+              <a:gd name="connsiteY1" fmla="*/ 0 h 640080"/>
+              <a:gd name="connsiteX0" fmla="*/ 0 w 650240"/>
+              <a:gd name="connsiteY0" fmla="*/ 640080 h 640080"/>
+              <a:gd name="connsiteX1" fmla="*/ 650240 w 650240"/>
+              <a:gd name="connsiteY1" fmla="*/ 0 h 640080"/>
+            </a:gdLst>
+            <a:ahLst/>
+            <a:cxnLst>
+              <a:cxn ang="0">
+                <a:pos x="connsiteX0" y="connsiteY0"/>
+              </a:cxn>
+              <a:cxn ang="0">
+                <a:pos x="connsiteX1" y="connsiteY1"/>
+              </a:cxn>
+            </a:cxnLst>
+            <a:rect l="l" t="t" r="r" b="b"/>
+            <a:pathLst>
+              <a:path w="650240" h="640080">
+                <a:moveTo>
+                  <a:pt x="0" y="640080"/>
+                </a:moveTo>
+                <a:cubicBezTo>
+                  <a:pt x="336752" y="583922"/>
+                  <a:pt x="579770" y="387592"/>
+                  <a:pt x="650240" y="0"/>
+                </a:cubicBezTo>
+              </a:path>
+            </a:pathLst>
+          </a:custGeom>
+          <a:noFill/>
+          <a:ln w="28575">
+            <a:solidFill>
+              <a:srgbClr val="FF0000"/>
+            </a:solidFill>
+          </a:ln>
+        </p:spPr>
+        <p:style>
+          <a:lnRef idx="2">
+            <a:schemeClr val="accent1">
+              <a:shade val="50000"/>
+            </a:schemeClr>
+          </a:lnRef>
+          <a:fillRef idx="1">
+            <a:schemeClr val="accent1"/>
+          </a:fillRef>
+          <a:effectRef idx="0">
+            <a:schemeClr val="accent1"/>
+          </a:effectRef>
+          <a:fontRef idx="minor">
+            <a:schemeClr val="lt1"/>
+          </a:fontRef>
+        </p:style>
+        <p:txBody>
+          <a:bodyPr rtlCol="0" anchor="ctr"/>
+          <a:lstStyle/>
+          <a:p>
+            <a:pPr algn="ctr"/>
+            <a:endParaRPr lang="en-US"/>
+          </a:p>
+        </p:txBody>
+      </p:sp>
+      <p:sp>
+        <p:nvSpPr>
+          <p:cNvPr id="42" name="Oval 41"/>
+          <p:cNvSpPr/>
+          <p:nvPr/>
+        </p:nvSpPr>
+        <p:spPr>
+          <a:xfrm>
+            <a:off x="6106105" y="1931154"/>
+            <a:ext cx="99067" cy="99067"/>
+          </a:xfrm>
+          <a:prstGeom prst="ellipse">
+            <a:avLst/>
+          </a:prstGeom>
+          <a:solidFill>
+            <a:schemeClr val="bg1"/>
+          </a:solidFill>
+          <a:ln w="28575">
+            <a:noFill/>
+            <a:prstDash val="sysDot"/>
+          </a:ln>
+        </p:spPr>
+        <p:style>
+          <a:lnRef idx="2">
+            <a:schemeClr val="accent1">
+              <a:shade val="50000"/>
+            </a:schemeClr>
+          </a:lnRef>
+          <a:fillRef idx="1">
+            <a:schemeClr val="accent1"/>
+          </a:fillRef>
+          <a:effectRef idx="0">
+            <a:schemeClr val="accent1"/>
+          </a:effectRef>
+          <a:fontRef idx="minor">
+            <a:schemeClr val="lt1"/>
+          </a:fontRef>
+        </p:style>
+        <p:txBody>
+          <a:bodyPr rtlCol="0" anchor="ctr"/>
+          <a:lstStyle/>
+          <a:p>
+            <a:pPr algn="ctr"/>
+            <a:endParaRPr lang="en-US"/>
+          </a:p>
+        </p:txBody>
+      </p:sp>
+      <p:sp>
+        <p:nvSpPr>
+          <p:cNvPr id="52" name="Oval 51"/>
+          <p:cNvSpPr/>
+          <p:nvPr/>
+        </p:nvSpPr>
+        <p:spPr>
+          <a:xfrm>
+            <a:off x="6603945" y="2148257"/>
+            <a:ext cx="99067" cy="99067"/>
+          </a:xfrm>
+          <a:prstGeom prst="ellipse">
+            <a:avLst/>
+          </a:prstGeom>
+          <a:solidFill>
+            <a:schemeClr val="bg1"/>
+          </a:solidFill>
+          <a:ln w="28575">
+            <a:solidFill>
+              <a:schemeClr val="bg1"/>
+            </a:solidFill>
+            <a:prstDash val="sysDot"/>
+          </a:ln>
+        </p:spPr>
+        <p:style>
+          <a:lnRef idx="2">
+            <a:schemeClr val="accent1">
+              <a:shade val="50000"/>
+            </a:schemeClr>
+          </a:lnRef>
+          <a:fillRef idx="1">
+            <a:schemeClr val="accent1"/>
+          </a:fillRef>
+          <a:effectRef idx="0">
+            <a:schemeClr val="accent1"/>
+          </a:effectRef>
+          <a:fontRef idx="minor">
+            <a:schemeClr val="lt1"/>
+          </a:fontRef>
+        </p:style>
+        <p:txBody>
+          <a:bodyPr rtlCol="0" anchor="ctr"/>
+          <a:lstStyle/>
+          <a:p>
+            <a:pPr algn="ctr"/>
+            <a:endParaRPr lang="en-US"/>
+          </a:p>
+        </p:txBody>
+      </p:sp>
+      <p:sp>
+        <p:nvSpPr>
+          <p:cNvPr id="53" name="Oval 52"/>
+          <p:cNvSpPr/>
+          <p:nvPr/>
+        </p:nvSpPr>
+        <p:spPr>
+          <a:xfrm>
+            <a:off x="6049435" y="1404080"/>
+            <a:ext cx="212408" cy="212404"/>
+          </a:xfrm>
+          <a:prstGeom prst="ellipse">
+            <a:avLst/>
+          </a:prstGeom>
+          <a:solidFill>
+            <a:schemeClr val="bg1"/>
+          </a:solidFill>
+          <a:ln w="28575">
+            <a:noFill/>
+            <a:prstDash val="sysDot"/>
+          </a:ln>
+        </p:spPr>
+        <p:style>
+          <a:lnRef idx="2">
+            <a:schemeClr val="accent1">
+              <a:shade val="50000"/>
+            </a:schemeClr>
+          </a:lnRef>
+          <a:fillRef idx="1">
+            <a:schemeClr val="accent1"/>
+          </a:fillRef>
+          <a:effectRef idx="0">
+            <a:schemeClr val="accent1"/>
+          </a:effectRef>
+          <a:fontRef idx="minor">
+            <a:schemeClr val="lt1"/>
+          </a:fontRef>
+        </p:style>
+        <p:txBody>
+          <a:bodyPr rtlCol="0" anchor="ctr"/>
+          <a:lstStyle/>
+          <a:p>
+            <a:pPr algn="ctr"/>
+            <a:endParaRPr lang="en-US"/>
+          </a:p>
+        </p:txBody>
+      </p:sp>
+      <p:sp>
+        <p:nvSpPr>
+          <p:cNvPr id="54" name="Oval 53"/>
+          <p:cNvSpPr/>
+          <p:nvPr/>
+        </p:nvSpPr>
+        <p:spPr>
+          <a:xfrm>
+            <a:off x="5463249" y="1832087"/>
+            <a:ext cx="99067" cy="99067"/>
+          </a:xfrm>
+          <a:prstGeom prst="ellipse">
+            <a:avLst/>
+          </a:prstGeom>
+          <a:solidFill>
+            <a:schemeClr val="bg1"/>
+          </a:solidFill>
+          <a:ln w="28575">
+            <a:solidFill>
+              <a:schemeClr val="bg1"/>
+            </a:solidFill>
+            <a:prstDash val="sysDot"/>
+          </a:ln>
+        </p:spPr>
+        <p:style>
+          <a:lnRef idx="2">
+            <a:schemeClr val="accent1">
+              <a:shade val="50000"/>
+            </a:schemeClr>
+          </a:lnRef>
+          <a:fillRef idx="1">
+            <a:schemeClr val="accent1"/>
+          </a:fillRef>
+          <a:effectRef idx="0">
+            <a:schemeClr val="accent1"/>
+          </a:effectRef>
+          <a:fontRef idx="minor">
+            <a:schemeClr val="lt1"/>
+          </a:fontRef>
+        </p:style>
+        <p:txBody>
+          <a:bodyPr rtlCol="0" anchor="ctr"/>
+          <a:lstStyle/>
+          <a:p>
+            <a:pPr algn="ctr"/>
+            <a:endParaRPr lang="en-US"/>
+          </a:p>
+        </p:txBody>
+      </p:sp>
+      <p:sp>
+        <p:nvSpPr>
+          <p:cNvPr id="56" name="Oval 55"/>
+          <p:cNvSpPr/>
+          <p:nvPr/>
+        </p:nvSpPr>
+        <p:spPr>
+          <a:xfrm>
+            <a:off x="6794762" y="1760473"/>
+            <a:ext cx="168234" cy="168230"/>
+          </a:xfrm>
+          <a:prstGeom prst="ellipse">
+            <a:avLst/>
+          </a:prstGeom>
+          <a:solidFill>
+            <a:schemeClr val="bg1"/>
+          </a:solidFill>
+          <a:ln w="28575">
+            <a:noFill/>
+            <a:prstDash val="sysDot"/>
+          </a:ln>
+        </p:spPr>
+        <p:style>
+          <a:lnRef idx="2">
+            <a:schemeClr val="accent1">
+              <a:shade val="50000"/>
+            </a:schemeClr>
+          </a:lnRef>
+          <a:fillRef idx="1">
+            <a:schemeClr val="accent1"/>
+          </a:fillRef>
+          <a:effectRef idx="0">
+            <a:schemeClr val="accent1"/>
+          </a:effectRef>
+          <a:fontRef idx="minor">
+            <a:schemeClr val="lt1"/>
+          </a:fontRef>
+        </p:style>
+        <p:txBody>
+          <a:bodyPr rtlCol="0" anchor="ctr"/>
+          <a:lstStyle/>
+          <a:p>
+            <a:pPr algn="ctr"/>
+            <a:endParaRPr lang="en-US"/>
+          </a:p>
+        </p:txBody>
+      </p:sp>
+      <p:sp>
+        <p:nvSpPr>
+          <p:cNvPr id="57" name="Oval 56"/>
+          <p:cNvSpPr/>
+          <p:nvPr/>
+        </p:nvSpPr>
+        <p:spPr>
+          <a:xfrm>
+            <a:off x="6461975" y="1735039"/>
+            <a:ext cx="99067" cy="99067"/>
+          </a:xfrm>
+          <a:prstGeom prst="ellipse">
+            <a:avLst/>
+          </a:prstGeom>
+          <a:solidFill>
+            <a:schemeClr val="bg1"/>
+          </a:solidFill>
+          <a:ln w="28575">
+            <a:noFill/>
+            <a:prstDash val="sysDot"/>
+          </a:ln>
+        </p:spPr>
+        <p:style>
+          <a:lnRef idx="2">
+            <a:schemeClr val="accent1">
+              <a:shade val="50000"/>
+            </a:schemeClr>
+          </a:lnRef>
+          <a:fillRef idx="1">
+            <a:schemeClr val="accent1"/>
+          </a:fillRef>
+          <a:effectRef idx="0">
+            <a:schemeClr val="accent1"/>
+          </a:effectRef>
+          <a:fontRef idx="minor">
+            <a:schemeClr val="lt1"/>
+          </a:fontRef>
+        </p:style>
+        <p:txBody>
+          <a:bodyPr rtlCol="0" anchor="ctr"/>
+          <a:lstStyle/>
+          <a:p>
+            <a:pPr algn="ctr"/>
+            <a:endParaRPr lang="en-US"/>
+          </a:p>
+        </p:txBody>
+      </p:sp>
+      <p:sp>
+        <p:nvSpPr>
+          <p:cNvPr id="58" name="Oval 57"/>
+          <p:cNvSpPr/>
+          <p:nvPr/>
+        </p:nvSpPr>
+        <p:spPr>
+          <a:xfrm>
+            <a:off x="7117300" y="2105296"/>
+            <a:ext cx="99067" cy="99067"/>
+          </a:xfrm>
+          <a:prstGeom prst="ellipse">
+            <a:avLst/>
+          </a:prstGeom>
+          <a:solidFill>
+            <a:schemeClr val="bg1"/>
+          </a:solidFill>
+          <a:ln w="28575">
+            <a:solidFill>
+              <a:schemeClr val="bg1"/>
+            </a:solidFill>
+            <a:prstDash val="sysDot"/>
+          </a:ln>
+        </p:spPr>
+        <p:style>
+          <a:lnRef idx="2">
+            <a:schemeClr val="accent1">
+              <a:shade val="50000"/>
+            </a:schemeClr>
+          </a:lnRef>
+          <a:fillRef idx="1">
+            <a:schemeClr val="accent1"/>
+          </a:fillRef>
+          <a:effectRef idx="0">
+            <a:schemeClr val="accent1"/>
+          </a:effectRef>
+          <a:fontRef idx="minor">
+            <a:schemeClr val="lt1"/>
+          </a:fontRef>
+        </p:style>
+        <p:txBody>
+          <a:bodyPr rtlCol="0" anchor="ctr"/>
+          <a:lstStyle/>
+          <a:p>
+            <a:pPr algn="ctr"/>
+            <a:endParaRPr lang="en-US"/>
+          </a:p>
+        </p:txBody>
+      </p:sp>
+      <p:sp>
+        <p:nvSpPr>
+          <p:cNvPr id="59" name="Oval 58"/>
+          <p:cNvSpPr/>
+          <p:nvPr/>
+        </p:nvSpPr>
+        <p:spPr>
+          <a:xfrm>
+            <a:off x="7031159" y="1296887"/>
+            <a:ext cx="172282" cy="172278"/>
+          </a:xfrm>
+          <a:prstGeom prst="ellipse">
+            <a:avLst/>
+          </a:prstGeom>
+          <a:solidFill>
+            <a:schemeClr val="bg1"/>
+          </a:solidFill>
+          <a:ln w="28575">
+            <a:noFill/>
+            <a:prstDash val="sysDot"/>
+          </a:ln>
+        </p:spPr>
+        <p:style>
+          <a:lnRef idx="2">
+            <a:schemeClr val="accent1">
+              <a:shade val="50000"/>
+            </a:schemeClr>
+          </a:lnRef>
+          <a:fillRef idx="1">
+            <a:schemeClr val="accent1"/>
+          </a:fillRef>
+          <a:effectRef idx="0">
+            <a:schemeClr val="accent1"/>
+          </a:effectRef>
+          <a:fontRef idx="minor">
+            <a:schemeClr val="lt1"/>
+          </a:fontRef>
+        </p:style>
+        <p:txBody>
+          <a:bodyPr rtlCol="0" anchor="ctr"/>
+          <a:lstStyle/>
+          <a:p>
+            <a:pPr algn="ctr"/>
+            <a:endParaRPr lang="en-US"/>
+          </a:p>
+        </p:txBody>
+      </p:sp>
+      <p:sp>
+        <p:nvSpPr>
+          <p:cNvPr id="60" name="Oval 59"/>
+          <p:cNvSpPr/>
+          <p:nvPr/>
+        </p:nvSpPr>
+        <p:spPr>
+          <a:xfrm>
+            <a:off x="5347258" y="1305012"/>
+            <a:ext cx="99067" cy="99067"/>
+          </a:xfrm>
+          <a:prstGeom prst="ellipse">
+            <a:avLst/>
+          </a:prstGeom>
+          <a:solidFill>
+            <a:schemeClr val="bg1"/>
+          </a:solidFill>
+          <a:ln w="28575">
+            <a:solidFill>
+              <a:schemeClr val="bg1"/>
+            </a:solidFill>
+            <a:prstDash val="sysDot"/>
+          </a:ln>
+        </p:spPr>
+        <p:style>
+          <a:lnRef idx="2">
+            <a:schemeClr val="accent1">
+              <a:shade val="50000"/>
+            </a:schemeClr>
+          </a:lnRef>
+          <a:fillRef idx="1">
+            <a:schemeClr val="accent1"/>
+          </a:fillRef>
+          <a:effectRef idx="0">
+            <a:schemeClr val="accent1"/>
+          </a:effectRef>
+          <a:fontRef idx="minor">
+            <a:schemeClr val="lt1"/>
+          </a:fontRef>
+        </p:style>
+        <p:txBody>
+          <a:bodyPr rtlCol="0" anchor="ctr"/>
+          <a:lstStyle/>
+          <a:p>
+            <a:pPr algn="ctr"/>
+            <a:endParaRPr lang="en-US"/>
+          </a:p>
+        </p:txBody>
+      </p:sp>
+      <p:sp>
+        <p:nvSpPr>
+          <p:cNvPr id="64" name="Oval 63"/>
+          <p:cNvSpPr/>
+          <p:nvPr/>
+        </p:nvSpPr>
+        <p:spPr>
+          <a:xfrm>
+            <a:off x="5822156" y="862021"/>
+            <a:ext cx="212408" cy="212404"/>
+          </a:xfrm>
+          <a:prstGeom prst="ellipse">
+            <a:avLst/>
+          </a:prstGeom>
+          <a:solidFill>
+            <a:schemeClr val="bg1"/>
+          </a:solidFill>
+          <a:ln w="28575">
+            <a:noFill/>
+            <a:prstDash val="sysDot"/>
+          </a:ln>
+        </p:spPr>
+        <p:style>
+          <a:lnRef idx="2">
+            <a:schemeClr val="accent1">
+              <a:shade val="50000"/>
+            </a:schemeClr>
+          </a:lnRef>
+          <a:fillRef idx="1">
+            <a:schemeClr val="accent1"/>
+          </a:fillRef>
+          <a:effectRef idx="0">
+            <a:schemeClr val="accent1"/>
+          </a:effectRef>
+          <a:fontRef idx="minor">
+            <a:schemeClr val="lt1"/>
+          </a:fontRef>
+        </p:style>
+        <p:txBody>
+          <a:bodyPr rtlCol="0" anchor="ctr"/>
+          <a:lstStyle/>
+          <a:p>
+            <a:pPr algn="ctr"/>
+            <a:endParaRPr lang="en-US"/>
+          </a:p>
+        </p:txBody>
+      </p:sp>
+      <p:sp>
+        <p:nvSpPr>
+          <p:cNvPr id="65" name="Oval 64"/>
+          <p:cNvSpPr/>
+          <p:nvPr/>
+        </p:nvSpPr>
+        <p:spPr>
+          <a:xfrm>
+            <a:off x="6561042" y="1049522"/>
+            <a:ext cx="99067" cy="99067"/>
+          </a:xfrm>
+          <a:prstGeom prst="ellipse">
+            <a:avLst/>
+          </a:prstGeom>
+          <a:solidFill>
+            <a:schemeClr val="bg1"/>
+          </a:solidFill>
+          <a:ln w="28575">
+            <a:noFill/>
+            <a:prstDash val="sysDot"/>
+          </a:ln>
+        </p:spPr>
+        <p:style>
+          <a:lnRef idx="2">
+            <a:schemeClr val="accent1">
+              <a:shade val="50000"/>
+            </a:schemeClr>
+          </a:lnRef>
+          <a:fillRef idx="1">
+            <a:schemeClr val="accent1"/>
+          </a:fillRef>
+          <a:effectRef idx="0">
+            <a:schemeClr val="accent1"/>
+          </a:effectRef>
+          <a:fontRef idx="minor">
+            <a:schemeClr val="lt1"/>
+          </a:fontRef>
+        </p:style>
+        <p:txBody>
+          <a:bodyPr rtlCol="0" anchor="ctr"/>
+          <a:lstStyle/>
+          <a:p>
+            <a:pPr algn="ctr"/>
+            <a:endParaRPr lang="en-US"/>
+          </a:p>
+        </p:txBody>
+      </p:sp>
+      <p:sp>
+        <p:nvSpPr>
+          <p:cNvPr id="66" name="Oval 65"/>
+          <p:cNvSpPr/>
+          <p:nvPr/>
+        </p:nvSpPr>
+        <p:spPr>
+          <a:xfrm>
+            <a:off x="6231266" y="704461"/>
+            <a:ext cx="168234" cy="168230"/>
+          </a:xfrm>
+          <a:prstGeom prst="ellipse">
+            <a:avLst/>
+          </a:prstGeom>
+          <a:solidFill>
+            <a:schemeClr val="bg1"/>
+          </a:solidFill>
+          <a:ln w="28575">
+            <a:solidFill>
+              <a:schemeClr val="bg1"/>
+            </a:solidFill>
+            <a:prstDash val="sysDot"/>
+          </a:ln>
+        </p:spPr>
+        <p:style>
+          <a:lnRef idx="2">
+            <a:schemeClr val="accent1">
+              <a:shade val="50000"/>
+            </a:schemeClr>
+          </a:lnRef>
+          <a:fillRef idx="1">
+            <a:schemeClr val="accent1"/>
+          </a:fillRef>
+          <a:effectRef idx="0">
+            <a:schemeClr val="accent1"/>
+          </a:effectRef>
+          <a:fontRef idx="minor">
+            <a:schemeClr val="lt1"/>
+          </a:fontRef>
+        </p:style>
+        <p:txBody>
+          <a:bodyPr rtlCol="0" anchor="ctr"/>
+          <a:lstStyle/>
+          <a:p>
+            <a:pPr algn="ctr"/>
+            <a:endParaRPr lang="en-US"/>
+          </a:p>
+        </p:txBody>
+      </p:sp>
+      <p:sp>
+        <p:nvSpPr>
+          <p:cNvPr id="67" name="Oval 66"/>
+          <p:cNvSpPr/>
+          <p:nvPr/>
+        </p:nvSpPr>
+        <p:spPr>
+          <a:xfrm>
+            <a:off x="6827520" y="872691"/>
+            <a:ext cx="99067" cy="99067"/>
+          </a:xfrm>
+          <a:prstGeom prst="ellipse">
+            <a:avLst/>
+          </a:prstGeom>
+          <a:solidFill>
+            <a:schemeClr val="bg1"/>
+          </a:solidFill>
+          <a:ln w="28575">
+            <a:solidFill>
+              <a:schemeClr val="bg1"/>
+            </a:solidFill>
+            <a:prstDash val="sysDot"/>
+          </a:ln>
+        </p:spPr>
+        <p:style>
+          <a:lnRef idx="2">
+            <a:schemeClr val="accent1">
+              <a:shade val="50000"/>
+            </a:schemeClr>
+          </a:lnRef>
+          <a:fillRef idx="1">
+            <a:schemeClr val="accent1"/>
+          </a:fillRef>
+          <a:effectRef idx="0">
+            <a:schemeClr val="accent1"/>
+          </a:effectRef>
+          <a:fontRef idx="minor">
+            <a:schemeClr val="lt1"/>
+          </a:fontRef>
+        </p:style>
+        <p:txBody>
+          <a:bodyPr rtlCol="0" anchor="ctr"/>
+          <a:lstStyle/>
+          <a:p>
+            <a:pPr algn="ctr"/>
+            <a:endParaRPr lang="en-US"/>
+          </a:p>
+        </p:txBody>
+      </p:sp>
+      <p:sp>
+        <p:nvSpPr>
+          <p:cNvPr id="68" name="Oval 67"/>
+          <p:cNvSpPr/>
+          <p:nvPr/>
+        </p:nvSpPr>
+        <p:spPr>
+          <a:xfrm>
+            <a:off x="5604611" y="2291700"/>
+            <a:ext cx="168234" cy="168230"/>
+          </a:xfrm>
+          <a:prstGeom prst="ellipse">
+            <a:avLst/>
+          </a:prstGeom>
+          <a:solidFill>
+            <a:schemeClr val="bg1"/>
+          </a:solidFill>
+          <a:ln w="28575">
+            <a:solidFill>
+              <a:schemeClr val="bg1"/>
+            </a:solidFill>
+            <a:prstDash val="sysDot"/>
+          </a:ln>
+        </p:spPr>
+        <p:style>
+          <a:lnRef idx="2">
+            <a:schemeClr val="accent1">
+              <a:shade val="50000"/>
+            </a:schemeClr>
+          </a:lnRef>
+          <a:fillRef idx="1">
+            <a:schemeClr val="accent1"/>
+          </a:fillRef>
+          <a:effectRef idx="0">
+            <a:schemeClr val="accent1"/>
+          </a:effectRef>
+          <a:fontRef idx="minor">
+            <a:schemeClr val="lt1"/>
+          </a:fontRef>
+        </p:style>
+        <p:txBody>
+          <a:bodyPr rtlCol="0" anchor="ctr"/>
+          <a:lstStyle/>
+          <a:p>
+            <a:pPr algn="ctr"/>
+            <a:endParaRPr lang="en-US"/>
+          </a:p>
+        </p:txBody>
+      </p:sp>
+      <p:sp>
+        <p:nvSpPr>
+          <p:cNvPr id="69" name="Oval 68"/>
+          <p:cNvSpPr/>
+          <p:nvPr/>
+        </p:nvSpPr>
+        <p:spPr>
+          <a:xfrm>
+            <a:off x="5403555" y="704461"/>
+            <a:ext cx="99067" cy="99067"/>
+          </a:xfrm>
+          <a:prstGeom prst="ellipse">
+            <a:avLst/>
+          </a:prstGeom>
+          <a:solidFill>
+            <a:schemeClr val="bg1"/>
+          </a:solidFill>
+          <a:ln w="28575">
+            <a:solidFill>
+              <a:schemeClr val="bg1"/>
+            </a:solidFill>
+            <a:prstDash val="sysDot"/>
+          </a:ln>
+        </p:spPr>
+        <p:style>
+          <a:lnRef idx="2">
+            <a:schemeClr val="accent1">
+              <a:shade val="50000"/>
+            </a:schemeClr>
+          </a:lnRef>
+          <a:fillRef idx="1">
+            <a:schemeClr val="accent1"/>
+          </a:fillRef>
+          <a:effectRef idx="0">
+            <a:schemeClr val="accent1"/>
+          </a:effectRef>
+          <a:fontRef idx="minor">
+            <a:schemeClr val="lt1"/>
+          </a:fontRef>
+        </p:style>
+        <p:txBody>
+          <a:bodyPr rtlCol="0" anchor="ctr"/>
+          <a:lstStyle/>
+          <a:p>
+            <a:pPr algn="ctr"/>
+            <a:endParaRPr lang="en-US"/>
+          </a:p>
+        </p:txBody>
+      </p:sp>
+      <p:sp>
+        <p:nvSpPr>
+          <p:cNvPr id="70" name="Oval 69"/>
+          <p:cNvSpPr/>
+          <p:nvPr/>
+        </p:nvSpPr>
+        <p:spPr>
+          <a:xfrm>
+            <a:off x="6490310" y="1324927"/>
+            <a:ext cx="168234" cy="168230"/>
+          </a:xfrm>
+          <a:prstGeom prst="ellipse">
+            <a:avLst/>
+          </a:prstGeom>
+          <a:solidFill>
+            <a:schemeClr val="bg1"/>
+          </a:solidFill>
+          <a:ln w="28575">
+            <a:noFill/>
+            <a:prstDash val="sysDot"/>
+          </a:ln>
+        </p:spPr>
+        <p:style>
+          <a:lnRef idx="2">
+            <a:schemeClr val="accent1">
+              <a:shade val="50000"/>
+            </a:schemeClr>
+          </a:lnRef>
+          <a:fillRef idx="1">
+            <a:schemeClr val="accent1"/>
+          </a:fillRef>
+          <a:effectRef idx="0">
+            <a:schemeClr val="accent1"/>
+          </a:effectRef>
+          <a:fontRef idx="minor">
+            <a:schemeClr val="lt1"/>
+          </a:fontRef>
+        </p:style>
+        <p:txBody>
+          <a:bodyPr rtlCol="0" anchor="ctr"/>
+          <a:lstStyle/>
+          <a:p>
+            <a:pPr algn="ctr"/>
+            <a:endParaRPr lang="en-US"/>
+          </a:p>
+        </p:txBody>
+      </p:sp>
+      <p:sp>
+        <p:nvSpPr>
+          <p:cNvPr id="71" name="Oval 70"/>
+          <p:cNvSpPr/>
+          <p:nvPr/>
+        </p:nvSpPr>
+        <p:spPr>
+          <a:xfrm>
+            <a:off x="7461803" y="1148589"/>
+            <a:ext cx="99067" cy="99067"/>
+          </a:xfrm>
+          <a:prstGeom prst="ellipse">
+            <a:avLst/>
+          </a:prstGeom>
+          <a:solidFill>
+            <a:schemeClr val="bg1"/>
+          </a:solidFill>
+          <a:ln w="28575">
+            <a:solidFill>
+              <a:schemeClr val="bg1"/>
+            </a:solidFill>
+            <a:prstDash val="sysDot"/>
+          </a:ln>
+        </p:spPr>
+        <p:style>
+          <a:lnRef idx="2">
+            <a:schemeClr val="accent1">
+              <a:shade val="50000"/>
+            </a:schemeClr>
+          </a:lnRef>
+          <a:fillRef idx="1">
+            <a:schemeClr val="accent1"/>
+          </a:fillRef>
+          <a:effectRef idx="0">
+            <a:schemeClr val="accent1"/>
+          </a:effectRef>
+          <a:fontRef idx="minor">
+            <a:schemeClr val="lt1"/>
+          </a:fontRef>
+        </p:style>
+        <p:txBody>
+          <a:bodyPr rtlCol="0" anchor="ctr"/>
+          <a:lstStyle/>
+          <a:p>
+            <a:pPr algn="ctr"/>
+            <a:endParaRPr lang="en-US"/>
+          </a:p>
+        </p:txBody>
+      </p:sp>
+      <p:sp>
+        <p:nvSpPr>
+          <p:cNvPr id="72" name="Oval 71"/>
+          <p:cNvSpPr/>
+          <p:nvPr/>
+        </p:nvSpPr>
+        <p:spPr>
+          <a:xfrm>
+            <a:off x="7455047" y="1850216"/>
+            <a:ext cx="168234" cy="168230"/>
+          </a:xfrm>
+          <a:prstGeom prst="ellipse">
+            <a:avLst/>
+          </a:prstGeom>
+          <a:solidFill>
+            <a:schemeClr val="bg1"/>
+          </a:solidFill>
+          <a:ln w="28575">
+            <a:solidFill>
+              <a:schemeClr val="bg1"/>
+            </a:solidFill>
+            <a:prstDash val="sysDot"/>
+          </a:ln>
+        </p:spPr>
+        <p:style>
+          <a:lnRef idx="2">
+            <a:schemeClr val="accent1">
+              <a:shade val="50000"/>
+            </a:schemeClr>
+          </a:lnRef>
+          <a:fillRef idx="1">
+            <a:schemeClr val="accent1"/>
+          </a:fillRef>
+          <a:effectRef idx="0">
+            <a:schemeClr val="accent1"/>
+          </a:effectRef>
+          <a:fontRef idx="minor">
+            <a:schemeClr val="lt1"/>
+          </a:fontRef>
+        </p:style>
+        <p:txBody>
+          <a:bodyPr rtlCol="0" anchor="ctr"/>
+          <a:lstStyle/>
+          <a:p>
+            <a:pPr algn="ctr"/>
+            <a:endParaRPr lang="en-US"/>
+          </a:p>
+        </p:txBody>
+      </p:sp>
+      <p:sp>
+        <p:nvSpPr>
+          <p:cNvPr id="2064" name="TextBox 2063"/>
+          <p:cNvSpPr txBox="1"/>
+          <p:nvPr/>
+        </p:nvSpPr>
+        <p:spPr>
+          <a:xfrm>
+            <a:off x="5521612" y="2345694"/>
+            <a:ext cx="2081019" cy="646331"/>
+          </a:xfrm>
+          <a:prstGeom prst="rect">
+            <a:avLst/>
+          </a:prstGeom>
+          <a:noFill/>
+        </p:spPr>
+        <p:txBody>
+          <a:bodyPr wrap="none" rtlCol="0">
+            <a:spAutoFit/>
+          </a:bodyPr>
+          <a:lstStyle/>
+          <a:p>
+            <a:r>
+              <a:rPr lang="en-US" sz="3600" dirty="0" smtClean="0">
+                <a:solidFill>
+                  <a:srgbClr val="E74C3C"/>
+                </a:solidFill>
+                <a:latin typeface="Lato Black" panose="020F0A02020204030203" pitchFamily="34" charset="0"/>
+                <a:ea typeface="Roboto" pitchFamily="2" charset="0"/>
+              </a:rPr>
+              <a:t>Trip</a:t>
+            </a:r>
+            <a:r>
+              <a:rPr lang="en-US" sz="700" b="1" dirty="0" smtClean="0">
+                <a:solidFill>
+                  <a:srgbClr val="E74C3C"/>
+                </a:solidFill>
+                <a:latin typeface="Lato" panose="020F0502020204030203" pitchFamily="34" charset="0"/>
+                <a:ea typeface="Roboto" pitchFamily="2" charset="0"/>
+              </a:rPr>
+              <a:t> </a:t>
+            </a:r>
+            <a:r>
+              <a:rPr lang="en-US" sz="3600" dirty="0" smtClean="0">
+                <a:solidFill>
+                  <a:srgbClr val="E74C3C"/>
+                </a:solidFill>
+                <a:latin typeface="Lato" panose="020F0502020204030203" pitchFamily="34" charset="0"/>
+                <a:ea typeface="Roboto" pitchFamily="2" charset="0"/>
+              </a:rPr>
+              <a:t>Mind</a:t>
+            </a:r>
+            <a:endParaRPr lang="en-US" sz="3600" dirty="0">
+              <a:solidFill>
+                <a:srgbClr val="E74C3C"/>
+              </a:solidFill>
+              <a:latin typeface="Lato" panose="020F0502020204030203" pitchFamily="34" charset="0"/>
+              <a:ea typeface="Roboto" pitchFamily="2" charset="0"/>
+            </a:endParaRPr>
+          </a:p>
+        </p:txBody>
+      </p:sp>
+      <p:sp>
+        <p:nvSpPr>
+          <p:cNvPr id="81" name="Oval 80"/>
+          <p:cNvSpPr/>
+          <p:nvPr/>
+        </p:nvSpPr>
+        <p:spPr>
+          <a:xfrm>
+            <a:off x="5810100" y="1272791"/>
+            <a:ext cx="99067" cy="99067"/>
+          </a:xfrm>
+          <a:prstGeom prst="ellipse">
+            <a:avLst/>
+          </a:prstGeom>
+          <a:solidFill>
+            <a:schemeClr val="bg1"/>
+          </a:solidFill>
+          <a:ln w="28575">
+            <a:noFill/>
+            <a:prstDash val="sysDot"/>
+          </a:ln>
+        </p:spPr>
+        <p:style>
+          <a:lnRef idx="2">
+            <a:schemeClr val="accent1">
+              <a:shade val="50000"/>
+            </a:schemeClr>
+          </a:lnRef>
+          <a:fillRef idx="1">
+            <a:schemeClr val="accent1"/>
+          </a:fillRef>
+          <a:effectRef idx="0">
+            <a:schemeClr val="accent1"/>
+          </a:effectRef>
+          <a:fontRef idx="minor">
+            <a:schemeClr val="lt1"/>
+          </a:fontRef>
+        </p:style>
+        <p:txBody>
+          <a:bodyPr rtlCol="0" anchor="ctr"/>
+          <a:lstStyle/>
+          <a:p>
+            <a:pPr algn="ctr"/>
+            <a:endParaRPr lang="en-US"/>
+          </a:p>
+        </p:txBody>
+      </p:sp>
+      <p:sp>
+        <p:nvSpPr>
+          <p:cNvPr id="2070" name="Freeform 2069"/>
+          <p:cNvSpPr/>
+          <p:nvPr/>
+        </p:nvSpPr>
+        <p:spPr>
+          <a:xfrm>
+            <a:off x="5872480" y="1320800"/>
+            <a:ext cx="294640" cy="182880"/>
+          </a:xfrm>
+          <a:custGeom>
+            <a:avLst/>
+            <a:gdLst>
+              <a:gd name="connsiteX0" fmla="*/ 294640 w 294640"/>
+              <a:gd name="connsiteY0" fmla="*/ 182880 h 182880"/>
+              <a:gd name="connsiteX1" fmla="*/ 0 w 294640"/>
+              <a:gd name="connsiteY1" fmla="*/ 0 h 182880"/>
+            </a:gdLst>
+            <a:ahLst/>
+            <a:cxnLst>
+              <a:cxn ang="0">
+                <a:pos x="connsiteX0" y="connsiteY0"/>
+              </a:cxn>
+              <a:cxn ang="0">
+                <a:pos x="connsiteX1" y="connsiteY1"/>
+              </a:cxn>
+            </a:cxnLst>
+            <a:rect l="l" t="t" r="r" b="b"/>
+            <a:pathLst>
+              <a:path w="294640" h="182880">
+                <a:moveTo>
+                  <a:pt x="294640" y="182880"/>
+                </a:moveTo>
+                <a:lnTo>
+                  <a:pt x="0" y="0"/>
+                </a:lnTo>
+              </a:path>
+            </a:pathLst>
+          </a:custGeom>
+          <a:noFill/>
+          <a:ln w="28575">
+            <a:solidFill>
+              <a:schemeClr val="bg1"/>
+            </a:solidFill>
+            <a:prstDash val="sysDot"/>
+          </a:ln>
+        </p:spPr>
+        <p:style>
+          <a:lnRef idx="2">
+            <a:schemeClr val="accent1">
+              <a:shade val="50000"/>
+            </a:schemeClr>
+          </a:lnRef>
+          <a:fillRef idx="1">
+            <a:schemeClr val="accent1"/>
+          </a:fillRef>
+          <a:effectRef idx="0">
+            <a:schemeClr val="accent1"/>
+          </a:effectRef>
+          <a:fontRef idx="minor">
+            <a:schemeClr val="lt1"/>
+          </a:fontRef>
+        </p:style>
+        <p:txBody>
+          <a:bodyPr rtlCol="0" anchor="ctr"/>
+          <a:lstStyle/>
+          <a:p>
+            <a:pPr algn="ctr"/>
+            <a:endParaRPr lang="en-US"/>
+          </a:p>
+        </p:txBody>
+      </p:sp>
+      <p:sp>
+        <p:nvSpPr>
+          <p:cNvPr id="2071" name="Freeform 2070"/>
+          <p:cNvSpPr/>
+          <p:nvPr/>
+        </p:nvSpPr>
+        <p:spPr>
+          <a:xfrm>
+            <a:off x="6644640" y="1091978"/>
+            <a:ext cx="894080" cy="736821"/>
+          </a:xfrm>
+          <a:custGeom>
+            <a:avLst/>
+            <a:gdLst>
+              <a:gd name="connsiteX0" fmla="*/ 0 w 924560"/>
+              <a:gd name="connsiteY0" fmla="*/ 0 h 772160"/>
+              <a:gd name="connsiteX1" fmla="*/ 518160 w 924560"/>
+              <a:gd name="connsiteY1" fmla="*/ 304800 h 772160"/>
+              <a:gd name="connsiteX2" fmla="*/ 264160 w 924560"/>
+              <a:gd name="connsiteY2" fmla="*/ 772160 h 772160"/>
+              <a:gd name="connsiteX3" fmla="*/ 924560 w 924560"/>
+              <a:gd name="connsiteY3" fmla="*/ 477520 h 772160"/>
+              <a:gd name="connsiteX0" fmla="*/ 0 w 924560"/>
+              <a:gd name="connsiteY0" fmla="*/ 0 h 772160"/>
+              <a:gd name="connsiteX1" fmla="*/ 518160 w 924560"/>
+              <a:gd name="connsiteY1" fmla="*/ 304800 h 772160"/>
+              <a:gd name="connsiteX2" fmla="*/ 264160 w 924560"/>
+              <a:gd name="connsiteY2" fmla="*/ 772160 h 772160"/>
+              <a:gd name="connsiteX3" fmla="*/ 924560 w 924560"/>
+              <a:gd name="connsiteY3" fmla="*/ 477520 h 772160"/>
+              <a:gd name="connsiteX0" fmla="*/ 0 w 924560"/>
+              <a:gd name="connsiteY0" fmla="*/ 4523 h 776683"/>
+              <a:gd name="connsiteX1" fmla="*/ 518160 w 924560"/>
+              <a:gd name="connsiteY1" fmla="*/ 309323 h 776683"/>
+              <a:gd name="connsiteX2" fmla="*/ 264160 w 924560"/>
+              <a:gd name="connsiteY2" fmla="*/ 776683 h 776683"/>
+              <a:gd name="connsiteX3" fmla="*/ 924560 w 924560"/>
+              <a:gd name="connsiteY3" fmla="*/ 482043 h 776683"/>
+              <a:gd name="connsiteX0" fmla="*/ 0 w 894080"/>
+              <a:gd name="connsiteY0" fmla="*/ 5301 h 736821"/>
+              <a:gd name="connsiteX1" fmla="*/ 487680 w 894080"/>
+              <a:gd name="connsiteY1" fmla="*/ 269461 h 736821"/>
+              <a:gd name="connsiteX2" fmla="*/ 233680 w 894080"/>
+              <a:gd name="connsiteY2" fmla="*/ 736821 h 736821"/>
+              <a:gd name="connsiteX3" fmla="*/ 894080 w 894080"/>
+              <a:gd name="connsiteY3" fmla="*/ 442181 h 736821"/>
+              <a:gd name="connsiteX0" fmla="*/ 0 w 894080"/>
+              <a:gd name="connsiteY0" fmla="*/ 5301 h 736821"/>
+              <a:gd name="connsiteX1" fmla="*/ 487680 w 894080"/>
+              <a:gd name="connsiteY1" fmla="*/ 269461 h 736821"/>
+              <a:gd name="connsiteX2" fmla="*/ 233680 w 894080"/>
+              <a:gd name="connsiteY2" fmla="*/ 736821 h 736821"/>
+              <a:gd name="connsiteX3" fmla="*/ 894080 w 894080"/>
+              <a:gd name="connsiteY3" fmla="*/ 442181 h 736821"/>
+            </a:gdLst>
+            <a:ahLst/>
+            <a:cxnLst>
+              <a:cxn ang="0">
+                <a:pos x="connsiteX0" y="connsiteY0"/>
+              </a:cxn>
+              <a:cxn ang="0">
+                <a:pos x="connsiteX1" y="connsiteY1"/>
+              </a:cxn>
+              <a:cxn ang="0">
+                <a:pos x="connsiteX2" y="connsiteY2"/>
+              </a:cxn>
+              <a:cxn ang="0">
+                <a:pos x="connsiteX3" y="connsiteY3"/>
+              </a:cxn>
+            </a:cxnLst>
+            <a:rect l="l" t="t" r="r" b="b"/>
+            <a:pathLst>
+              <a:path w="894080" h="736821">
+                <a:moveTo>
+                  <a:pt x="0" y="5301"/>
+                </a:moveTo>
+                <a:cubicBezTo>
+                  <a:pt x="355600" y="-35339"/>
+                  <a:pt x="314960" y="167861"/>
+                  <a:pt x="487680" y="269461"/>
+                </a:cubicBezTo>
+                <a:cubicBezTo>
+                  <a:pt x="118533" y="404928"/>
+                  <a:pt x="318347" y="581034"/>
+                  <a:pt x="233680" y="736821"/>
+                </a:cubicBezTo>
+                <a:cubicBezTo>
+                  <a:pt x="585893" y="465888"/>
+                  <a:pt x="673947" y="540394"/>
+                  <a:pt x="894080" y="442181"/>
+                </a:cubicBezTo>
+              </a:path>
+            </a:pathLst>
+          </a:custGeom>
+          <a:noFill/>
+          <a:ln w="28575">
+            <a:solidFill>
+              <a:schemeClr val="bg1"/>
+            </a:solidFill>
+            <a:prstDash val="sysDot"/>
+          </a:ln>
+        </p:spPr>
+        <p:style>
+          <a:lnRef idx="2">
+            <a:schemeClr val="accent1">
+              <a:shade val="50000"/>
+            </a:schemeClr>
+          </a:lnRef>
+          <a:fillRef idx="1">
+            <a:schemeClr val="accent1"/>
+          </a:fillRef>
+          <a:effectRef idx="0">
+            <a:schemeClr val="accent1"/>
+          </a:effectRef>
+          <a:fontRef idx="minor">
+            <a:schemeClr val="lt1"/>
+          </a:fontRef>
+        </p:style>
+        <p:txBody>
+          <a:bodyPr rtlCol="0" anchor="ctr"/>
+          <a:lstStyle/>
+          <a:p>
+            <a:pPr algn="ctr"/>
+            <a:endParaRPr lang="en-US"/>
+          </a:p>
+        </p:txBody>
+      </p:sp>
+      <p:sp>
+        <p:nvSpPr>
+          <p:cNvPr id="2072" name="Freeform 2071"/>
+          <p:cNvSpPr/>
+          <p:nvPr/>
+        </p:nvSpPr>
+        <p:spPr>
+          <a:xfrm>
+            <a:off x="6136640" y="1381760"/>
+            <a:ext cx="436880" cy="91440"/>
+          </a:xfrm>
+          <a:custGeom>
+            <a:avLst/>
+            <a:gdLst>
+              <a:gd name="connsiteX0" fmla="*/ 0 w 436880"/>
+              <a:gd name="connsiteY0" fmla="*/ 91440 h 91440"/>
+              <a:gd name="connsiteX1" fmla="*/ 436880 w 436880"/>
+              <a:gd name="connsiteY1" fmla="*/ 0 h 91440"/>
+            </a:gdLst>
+            <a:ahLst/>
+            <a:cxnLst>
+              <a:cxn ang="0">
+                <a:pos x="connsiteX0" y="connsiteY0"/>
+              </a:cxn>
+              <a:cxn ang="0">
+                <a:pos x="connsiteX1" y="connsiteY1"/>
+              </a:cxn>
+            </a:cxnLst>
+            <a:rect l="l" t="t" r="r" b="b"/>
+            <a:pathLst>
+              <a:path w="436880" h="91440">
+                <a:moveTo>
+                  <a:pt x="0" y="91440"/>
+                </a:moveTo>
+                <a:lnTo>
+                  <a:pt x="436880" y="0"/>
+                </a:lnTo>
+              </a:path>
+            </a:pathLst>
+          </a:custGeom>
+          <a:noFill/>
+          <a:ln w="28575">
+            <a:solidFill>
+              <a:schemeClr val="bg1"/>
+            </a:solidFill>
+            <a:prstDash val="sysDot"/>
+          </a:ln>
+        </p:spPr>
+        <p:style>
+          <a:lnRef idx="2">
+            <a:schemeClr val="accent1">
+              <a:shade val="50000"/>
+            </a:schemeClr>
+          </a:lnRef>
+          <a:fillRef idx="1">
+            <a:schemeClr val="accent1"/>
+          </a:fillRef>
+          <a:effectRef idx="0">
+            <a:schemeClr val="accent1"/>
+          </a:effectRef>
+          <a:fontRef idx="minor">
+            <a:schemeClr val="lt1"/>
+          </a:fontRef>
+        </p:style>
+        <p:txBody>
+          <a:bodyPr rtlCol="0" anchor="ctr"/>
+          <a:lstStyle/>
+          <a:p>
+            <a:pPr algn="ctr"/>
+            <a:endParaRPr lang="en-US"/>
+          </a:p>
+        </p:txBody>
+      </p:sp>
+      <p:sp>
+        <p:nvSpPr>
+          <p:cNvPr id="2073" name="Freeform 2072"/>
+          <p:cNvSpPr/>
+          <p:nvPr/>
+        </p:nvSpPr>
+        <p:spPr>
+          <a:xfrm>
+            <a:off x="6039957" y="1503680"/>
+            <a:ext cx="463924" cy="467360"/>
+          </a:xfrm>
+          <a:custGeom>
+            <a:avLst/>
+            <a:gdLst>
+              <a:gd name="connsiteX0" fmla="*/ 345440 w 345440"/>
+              <a:gd name="connsiteY0" fmla="*/ 274320 h 467360"/>
+              <a:gd name="connsiteX1" fmla="*/ 40640 w 345440"/>
+              <a:gd name="connsiteY1" fmla="*/ 0 h 467360"/>
+              <a:gd name="connsiteX2" fmla="*/ 0 w 345440"/>
+              <a:gd name="connsiteY2" fmla="*/ 467360 h 467360"/>
+              <a:gd name="connsiteX0" fmla="*/ 345440 w 345440"/>
+              <a:gd name="connsiteY0" fmla="*/ 274320 h 467360"/>
+              <a:gd name="connsiteX1" fmla="*/ 40640 w 345440"/>
+              <a:gd name="connsiteY1" fmla="*/ 0 h 467360"/>
+              <a:gd name="connsiteX2" fmla="*/ 0 w 345440"/>
+              <a:gd name="connsiteY2" fmla="*/ 467360 h 467360"/>
+              <a:gd name="connsiteX0" fmla="*/ 345440 w 345440"/>
+              <a:gd name="connsiteY0" fmla="*/ 274320 h 467360"/>
+              <a:gd name="connsiteX1" fmla="*/ 40640 w 345440"/>
+              <a:gd name="connsiteY1" fmla="*/ 0 h 467360"/>
+              <a:gd name="connsiteX2" fmla="*/ 0 w 345440"/>
+              <a:gd name="connsiteY2" fmla="*/ 467360 h 467360"/>
+              <a:gd name="connsiteX0" fmla="*/ 345440 w 345440"/>
+              <a:gd name="connsiteY0" fmla="*/ 274320 h 467360"/>
+              <a:gd name="connsiteX1" fmla="*/ 40640 w 345440"/>
+              <a:gd name="connsiteY1" fmla="*/ 0 h 467360"/>
+              <a:gd name="connsiteX2" fmla="*/ 0 w 345440"/>
+              <a:gd name="connsiteY2" fmla="*/ 467360 h 467360"/>
+              <a:gd name="connsiteX0" fmla="*/ 345440 w 346922"/>
+              <a:gd name="connsiteY0" fmla="*/ 274320 h 467360"/>
+              <a:gd name="connsiteX1" fmla="*/ 40640 w 346922"/>
+              <a:gd name="connsiteY1" fmla="*/ 0 h 467360"/>
+              <a:gd name="connsiteX2" fmla="*/ 0 w 346922"/>
+              <a:gd name="connsiteY2" fmla="*/ 467360 h 467360"/>
+              <a:gd name="connsiteX0" fmla="*/ 421011 w 422493"/>
+              <a:gd name="connsiteY0" fmla="*/ 274320 h 467360"/>
+              <a:gd name="connsiteX1" fmla="*/ 116211 w 422493"/>
+              <a:gd name="connsiteY1" fmla="*/ 0 h 467360"/>
+              <a:gd name="connsiteX2" fmla="*/ 75571 w 422493"/>
+              <a:gd name="connsiteY2" fmla="*/ 467360 h 467360"/>
+              <a:gd name="connsiteX0" fmla="*/ 480516 w 481998"/>
+              <a:gd name="connsiteY0" fmla="*/ 274320 h 467360"/>
+              <a:gd name="connsiteX1" fmla="*/ 175716 w 481998"/>
+              <a:gd name="connsiteY1" fmla="*/ 0 h 467360"/>
+              <a:gd name="connsiteX2" fmla="*/ 135076 w 481998"/>
+              <a:gd name="connsiteY2" fmla="*/ 467360 h 467360"/>
+              <a:gd name="connsiteX0" fmla="*/ 462442 w 463924"/>
+              <a:gd name="connsiteY0" fmla="*/ 274320 h 467360"/>
+              <a:gd name="connsiteX1" fmla="*/ 157642 w 463924"/>
+              <a:gd name="connsiteY1" fmla="*/ 0 h 467360"/>
+              <a:gd name="connsiteX2" fmla="*/ 117002 w 463924"/>
+              <a:gd name="connsiteY2" fmla="*/ 467360 h 467360"/>
+            </a:gdLst>
+            <a:ahLst/>
+            <a:cxnLst>
+              <a:cxn ang="0">
+                <a:pos x="connsiteX0" y="connsiteY0"/>
+              </a:cxn>
+              <a:cxn ang="0">
+                <a:pos x="connsiteX1" y="connsiteY1"/>
+              </a:cxn>
+              <a:cxn ang="0">
+                <a:pos x="connsiteX2" y="connsiteY2"/>
+              </a:cxn>
+            </a:cxnLst>
+            <a:rect l="l" t="t" r="r" b="b"/>
+            <a:pathLst>
+              <a:path w="463924" h="467360">
+                <a:moveTo>
+                  <a:pt x="462442" y="274320"/>
+                </a:moveTo>
+                <a:cubicBezTo>
+                  <a:pt x="482762" y="101600"/>
+                  <a:pt x="289722" y="91440"/>
+                  <a:pt x="157642" y="0"/>
+                </a:cubicBezTo>
+                <a:cubicBezTo>
+                  <a:pt x="32335" y="145627"/>
+                  <a:pt x="-103131" y="281093"/>
+                  <a:pt x="117002" y="467360"/>
+                </a:cubicBezTo>
+              </a:path>
+            </a:pathLst>
+          </a:custGeom>
+          <a:noFill/>
+          <a:ln w="28575">
+            <a:solidFill>
+              <a:schemeClr val="bg1"/>
+            </a:solidFill>
+            <a:prstDash val="sysDot"/>
+          </a:ln>
+        </p:spPr>
+        <p:style>
+          <a:lnRef idx="2">
+            <a:schemeClr val="accent1">
+              <a:shade val="50000"/>
+            </a:schemeClr>
+          </a:lnRef>
+          <a:fillRef idx="1">
+            <a:schemeClr val="accent1"/>
+          </a:fillRef>
+          <a:effectRef idx="0">
+            <a:schemeClr val="accent1"/>
+          </a:effectRef>
+          <a:fontRef idx="minor">
+            <a:schemeClr val="lt1"/>
+          </a:fontRef>
+        </p:style>
+        <p:txBody>
+          <a:bodyPr rtlCol="0" anchor="ctr"/>
+          <a:lstStyle/>
+          <a:p>
+            <a:pPr algn="ctr"/>
+            <a:endParaRPr lang="en-US"/>
+          </a:p>
+        </p:txBody>
+      </p:sp>
+      <p:pic>
+        <p:nvPicPr>
+          <p:cNvPr id="88" name="Picture 87"/>
           <p:cNvPicPr>
             <a:picLocks noChangeAspect="1"/>
           </p:cNvPicPr>
           <p:nvPr/>
         </p:nvPicPr>
-        <p:blipFill rotWithShape="1">
-          <a:blip r:embed="rId2"/>
-          <a:srcRect t="9456" r="38500" b="8524"/>
-          <a:stretch/>
+        <p:blipFill>
+          <a:blip r:embed="rId4"/>
+          <a:stretch>
+            <a:fillRect/>
+          </a:stretch>
         </p:blipFill>
         <p:spPr>
           <a:xfrm>
-            <a:off x="-3048000" y="-548641"/>
-            <a:ext cx="11247120" cy="8046721"/>
+            <a:off x="8266990" y="3232952"/>
+            <a:ext cx="4282068" cy="3079772"/>
           </a:xfrm>
           <a:prstGeom prst="rect">
             <a:avLst/>

</xml_diff>

<commit_message>
fixing bug where not catching if loaded too fast or too slow
</commit_message>
<xml_diff>
--- a/graphics/Presentation1.pptx
+++ b/graphics/Presentation1.pptx
@@ -8,7 +8,8 @@
     <p:sldId id="258" r:id="rId2"/>
     <p:sldId id="259" r:id="rId3"/>
     <p:sldId id="256" r:id="rId4"/>
-    <p:sldId id="257" r:id="rId5"/>
+    <p:sldId id="261" r:id="rId5"/>
+    <p:sldId id="260" r:id="rId6"/>
   </p:sldIdLst>
   <p:sldSz cx="12192000" cy="6858000"/>
   <p:notesSz cx="6858000" cy="9144000"/>
@@ -5864,595 +5865,48 @@
           <a:chExt cx="0" cy="0"/>
         </a:xfrm>
       </p:grpSpPr>
-      <p:sp>
-        <p:nvSpPr>
-          <p:cNvPr id="13" name="Freeform 12"/>
+      <p:pic>
+        <p:nvPicPr>
+          <p:cNvPr id="37" name="Picture 36"/>
+          <p:cNvPicPr>
+            <a:picLocks noChangeAspect="1"/>
+          </p:cNvPicPr>
+          <p:nvPr/>
+        </p:nvPicPr>
+        <p:blipFill>
+          <a:blip r:embed="rId2"/>
+          <a:stretch>
+            <a:fillRect/>
+          </a:stretch>
+        </p:blipFill>
+        <p:spPr>
+          <a:xfrm>
+            <a:off x="-504766" y="-1682806"/>
+            <a:ext cx="12830175" cy="9772650"/>
+          </a:xfrm>
+          <a:prstGeom prst="rect">
+            <a:avLst/>
+          </a:prstGeom>
+        </p:spPr>
+      </p:pic>
+      <p:sp>
+        <p:nvSpPr>
+          <p:cNvPr id="2" name="Rectangle 1"/>
           <p:cNvSpPr/>
           <p:nvPr/>
         </p:nvSpPr>
         <p:spPr>
           <a:xfrm>
-            <a:off x="5612730" y="907471"/>
-            <a:ext cx="1834550" cy="1398610"/>
+            <a:off x="2428240" y="711200"/>
+            <a:ext cx="6817360" cy="2682240"/>
           </a:xfrm>
-          <a:custGeom>
+          <a:prstGeom prst="rect">
             <a:avLst/>
-            <a:gdLst>
-              <a:gd name="connsiteX0" fmla="*/ 609600 w 2885440"/>
-              <a:gd name="connsiteY0" fmla="*/ 2194560 h 2194560"/>
-              <a:gd name="connsiteX1" fmla="*/ 629920 w 2885440"/>
-              <a:gd name="connsiteY1" fmla="*/ 1788160 h 2194560"/>
-              <a:gd name="connsiteX2" fmla="*/ 0 w 2885440"/>
-              <a:gd name="connsiteY2" fmla="*/ 1117600 h 2194560"/>
-              <a:gd name="connsiteX3" fmla="*/ 1249680 w 2885440"/>
-              <a:gd name="connsiteY3" fmla="*/ 0 h 2194560"/>
-              <a:gd name="connsiteX4" fmla="*/ 2824480 w 2885440"/>
-              <a:gd name="connsiteY4" fmla="*/ 873760 h 2194560"/>
-              <a:gd name="connsiteX5" fmla="*/ 2885440 w 2885440"/>
-              <a:gd name="connsiteY5" fmla="*/ 944880 h 2194560"/>
-              <a:gd name="connsiteX6" fmla="*/ 1757680 w 2885440"/>
-              <a:gd name="connsiteY6" fmla="*/ 1737360 h 2194560"/>
-              <a:gd name="connsiteX7" fmla="*/ 1320800 w 2885440"/>
-              <a:gd name="connsiteY7" fmla="*/ 1666240 h 2194560"/>
-              <a:gd name="connsiteX8" fmla="*/ 609600 w 2885440"/>
-              <a:gd name="connsiteY8" fmla="*/ 2194560 h 2194560"/>
-              <a:gd name="connsiteX0" fmla="*/ 620973 w 2896813"/>
-              <a:gd name="connsiteY0" fmla="*/ 2194560 h 2194560"/>
-              <a:gd name="connsiteX1" fmla="*/ 641293 w 2896813"/>
-              <a:gd name="connsiteY1" fmla="*/ 1788160 h 2194560"/>
-              <a:gd name="connsiteX2" fmla="*/ 11373 w 2896813"/>
-              <a:gd name="connsiteY2" fmla="*/ 1117600 h 2194560"/>
-              <a:gd name="connsiteX3" fmla="*/ 1261053 w 2896813"/>
-              <a:gd name="connsiteY3" fmla="*/ 0 h 2194560"/>
-              <a:gd name="connsiteX4" fmla="*/ 2835853 w 2896813"/>
-              <a:gd name="connsiteY4" fmla="*/ 873760 h 2194560"/>
-              <a:gd name="connsiteX5" fmla="*/ 2896813 w 2896813"/>
-              <a:gd name="connsiteY5" fmla="*/ 944880 h 2194560"/>
-              <a:gd name="connsiteX6" fmla="*/ 1769053 w 2896813"/>
-              <a:gd name="connsiteY6" fmla="*/ 1737360 h 2194560"/>
-              <a:gd name="connsiteX7" fmla="*/ 1332173 w 2896813"/>
-              <a:gd name="connsiteY7" fmla="*/ 1666240 h 2194560"/>
-              <a:gd name="connsiteX8" fmla="*/ 620973 w 2896813"/>
-              <a:gd name="connsiteY8" fmla="*/ 2194560 h 2194560"/>
-              <a:gd name="connsiteX0" fmla="*/ 620973 w 2896813"/>
-              <a:gd name="connsiteY0" fmla="*/ 2242785 h 2242785"/>
-              <a:gd name="connsiteX1" fmla="*/ 641293 w 2896813"/>
-              <a:gd name="connsiteY1" fmla="*/ 1836385 h 2242785"/>
-              <a:gd name="connsiteX2" fmla="*/ 11373 w 2896813"/>
-              <a:gd name="connsiteY2" fmla="*/ 1165825 h 2242785"/>
-              <a:gd name="connsiteX3" fmla="*/ 1261053 w 2896813"/>
-              <a:gd name="connsiteY3" fmla="*/ 48225 h 2242785"/>
-              <a:gd name="connsiteX4" fmla="*/ 2835853 w 2896813"/>
-              <a:gd name="connsiteY4" fmla="*/ 921985 h 2242785"/>
-              <a:gd name="connsiteX5" fmla="*/ 2896813 w 2896813"/>
-              <a:gd name="connsiteY5" fmla="*/ 993105 h 2242785"/>
-              <a:gd name="connsiteX6" fmla="*/ 1769053 w 2896813"/>
-              <a:gd name="connsiteY6" fmla="*/ 1785585 h 2242785"/>
-              <a:gd name="connsiteX7" fmla="*/ 1332173 w 2896813"/>
-              <a:gd name="connsiteY7" fmla="*/ 1714465 h 2242785"/>
-              <a:gd name="connsiteX8" fmla="*/ 620973 w 2896813"/>
-              <a:gd name="connsiteY8" fmla="*/ 2242785 h 2242785"/>
-              <a:gd name="connsiteX0" fmla="*/ 620973 w 3136213"/>
-              <a:gd name="connsiteY0" fmla="*/ 2242785 h 2242785"/>
-              <a:gd name="connsiteX1" fmla="*/ 641293 w 3136213"/>
-              <a:gd name="connsiteY1" fmla="*/ 1836385 h 2242785"/>
-              <a:gd name="connsiteX2" fmla="*/ 11373 w 3136213"/>
-              <a:gd name="connsiteY2" fmla="*/ 1165825 h 2242785"/>
-              <a:gd name="connsiteX3" fmla="*/ 1261053 w 3136213"/>
-              <a:gd name="connsiteY3" fmla="*/ 48225 h 2242785"/>
-              <a:gd name="connsiteX4" fmla="*/ 2835853 w 3136213"/>
-              <a:gd name="connsiteY4" fmla="*/ 921985 h 2242785"/>
-              <a:gd name="connsiteX5" fmla="*/ 2896813 w 3136213"/>
-              <a:gd name="connsiteY5" fmla="*/ 993105 h 2242785"/>
-              <a:gd name="connsiteX6" fmla="*/ 1769053 w 3136213"/>
-              <a:gd name="connsiteY6" fmla="*/ 1785585 h 2242785"/>
-              <a:gd name="connsiteX7" fmla="*/ 1332173 w 3136213"/>
-              <a:gd name="connsiteY7" fmla="*/ 1714465 h 2242785"/>
-              <a:gd name="connsiteX8" fmla="*/ 620973 w 3136213"/>
-              <a:gd name="connsiteY8" fmla="*/ 2242785 h 2242785"/>
-              <a:gd name="connsiteX0" fmla="*/ 620973 w 2896813"/>
-              <a:gd name="connsiteY0" fmla="*/ 2242785 h 2242785"/>
-              <a:gd name="connsiteX1" fmla="*/ 641293 w 2896813"/>
-              <a:gd name="connsiteY1" fmla="*/ 1836385 h 2242785"/>
-              <a:gd name="connsiteX2" fmla="*/ 11373 w 2896813"/>
-              <a:gd name="connsiteY2" fmla="*/ 1165825 h 2242785"/>
-              <a:gd name="connsiteX3" fmla="*/ 1261053 w 2896813"/>
-              <a:gd name="connsiteY3" fmla="*/ 48225 h 2242785"/>
-              <a:gd name="connsiteX4" fmla="*/ 2896813 w 2896813"/>
-              <a:gd name="connsiteY4" fmla="*/ 993105 h 2242785"/>
-              <a:gd name="connsiteX5" fmla="*/ 1769053 w 2896813"/>
-              <a:gd name="connsiteY5" fmla="*/ 1785585 h 2242785"/>
-              <a:gd name="connsiteX6" fmla="*/ 1332173 w 2896813"/>
-              <a:gd name="connsiteY6" fmla="*/ 1714465 h 2242785"/>
-              <a:gd name="connsiteX7" fmla="*/ 620973 w 2896813"/>
-              <a:gd name="connsiteY7" fmla="*/ 2242785 h 2242785"/>
-              <a:gd name="connsiteX0" fmla="*/ 620973 w 3020934"/>
-              <a:gd name="connsiteY0" fmla="*/ 2242785 h 2242785"/>
-              <a:gd name="connsiteX1" fmla="*/ 641293 w 3020934"/>
-              <a:gd name="connsiteY1" fmla="*/ 1836385 h 2242785"/>
-              <a:gd name="connsiteX2" fmla="*/ 11373 w 3020934"/>
-              <a:gd name="connsiteY2" fmla="*/ 1165825 h 2242785"/>
-              <a:gd name="connsiteX3" fmla="*/ 1261053 w 3020934"/>
-              <a:gd name="connsiteY3" fmla="*/ 48225 h 2242785"/>
-              <a:gd name="connsiteX4" fmla="*/ 2896813 w 3020934"/>
-              <a:gd name="connsiteY4" fmla="*/ 993105 h 2242785"/>
-              <a:gd name="connsiteX5" fmla="*/ 1769053 w 3020934"/>
-              <a:gd name="connsiteY5" fmla="*/ 1785585 h 2242785"/>
-              <a:gd name="connsiteX6" fmla="*/ 1332173 w 3020934"/>
-              <a:gd name="connsiteY6" fmla="*/ 1714465 h 2242785"/>
-              <a:gd name="connsiteX7" fmla="*/ 620973 w 3020934"/>
-              <a:gd name="connsiteY7" fmla="*/ 2242785 h 2242785"/>
-              <a:gd name="connsiteX0" fmla="*/ 620973 w 2901590"/>
-              <a:gd name="connsiteY0" fmla="*/ 2242785 h 2242785"/>
-              <a:gd name="connsiteX1" fmla="*/ 641293 w 2901590"/>
-              <a:gd name="connsiteY1" fmla="*/ 1836385 h 2242785"/>
-              <a:gd name="connsiteX2" fmla="*/ 11373 w 2901590"/>
-              <a:gd name="connsiteY2" fmla="*/ 1165825 h 2242785"/>
-              <a:gd name="connsiteX3" fmla="*/ 1261053 w 2901590"/>
-              <a:gd name="connsiteY3" fmla="*/ 48225 h 2242785"/>
-              <a:gd name="connsiteX4" fmla="*/ 2896813 w 2901590"/>
-              <a:gd name="connsiteY4" fmla="*/ 993105 h 2242785"/>
-              <a:gd name="connsiteX5" fmla="*/ 1769053 w 2901590"/>
-              <a:gd name="connsiteY5" fmla="*/ 1785585 h 2242785"/>
-              <a:gd name="connsiteX6" fmla="*/ 1332173 w 2901590"/>
-              <a:gd name="connsiteY6" fmla="*/ 1714465 h 2242785"/>
-              <a:gd name="connsiteX7" fmla="*/ 620973 w 2901590"/>
-              <a:gd name="connsiteY7" fmla="*/ 2242785 h 2242785"/>
-              <a:gd name="connsiteX0" fmla="*/ 620973 w 2901590"/>
-              <a:gd name="connsiteY0" fmla="*/ 2242785 h 2242785"/>
-              <a:gd name="connsiteX1" fmla="*/ 641293 w 2901590"/>
-              <a:gd name="connsiteY1" fmla="*/ 1836385 h 2242785"/>
-              <a:gd name="connsiteX2" fmla="*/ 11373 w 2901590"/>
-              <a:gd name="connsiteY2" fmla="*/ 1165825 h 2242785"/>
-              <a:gd name="connsiteX3" fmla="*/ 1261053 w 2901590"/>
-              <a:gd name="connsiteY3" fmla="*/ 48225 h 2242785"/>
-              <a:gd name="connsiteX4" fmla="*/ 2896813 w 2901590"/>
-              <a:gd name="connsiteY4" fmla="*/ 993105 h 2242785"/>
-              <a:gd name="connsiteX5" fmla="*/ 1769053 w 2901590"/>
-              <a:gd name="connsiteY5" fmla="*/ 1785585 h 2242785"/>
-              <a:gd name="connsiteX6" fmla="*/ 1332173 w 2901590"/>
-              <a:gd name="connsiteY6" fmla="*/ 1714465 h 2242785"/>
-              <a:gd name="connsiteX7" fmla="*/ 620973 w 2901590"/>
-              <a:gd name="connsiteY7" fmla="*/ 2242785 h 2242785"/>
-              <a:gd name="connsiteX0" fmla="*/ 620973 w 3020934"/>
-              <a:gd name="connsiteY0" fmla="*/ 2242785 h 2242785"/>
-              <a:gd name="connsiteX1" fmla="*/ 641293 w 3020934"/>
-              <a:gd name="connsiteY1" fmla="*/ 1836385 h 2242785"/>
-              <a:gd name="connsiteX2" fmla="*/ 11373 w 3020934"/>
-              <a:gd name="connsiteY2" fmla="*/ 1165825 h 2242785"/>
-              <a:gd name="connsiteX3" fmla="*/ 1261053 w 3020934"/>
-              <a:gd name="connsiteY3" fmla="*/ 48225 h 2242785"/>
-              <a:gd name="connsiteX4" fmla="*/ 2896813 w 3020934"/>
-              <a:gd name="connsiteY4" fmla="*/ 993105 h 2242785"/>
-              <a:gd name="connsiteX5" fmla="*/ 1769053 w 3020934"/>
-              <a:gd name="connsiteY5" fmla="*/ 1785585 h 2242785"/>
-              <a:gd name="connsiteX6" fmla="*/ 1332173 w 3020934"/>
-              <a:gd name="connsiteY6" fmla="*/ 1714465 h 2242785"/>
-              <a:gd name="connsiteX7" fmla="*/ 620973 w 3020934"/>
-              <a:gd name="connsiteY7" fmla="*/ 2242785 h 2242785"/>
-              <a:gd name="connsiteX0" fmla="*/ 620973 w 2905181"/>
-              <a:gd name="connsiteY0" fmla="*/ 2242785 h 2242785"/>
-              <a:gd name="connsiteX1" fmla="*/ 641293 w 2905181"/>
-              <a:gd name="connsiteY1" fmla="*/ 1836385 h 2242785"/>
-              <a:gd name="connsiteX2" fmla="*/ 11373 w 2905181"/>
-              <a:gd name="connsiteY2" fmla="*/ 1165825 h 2242785"/>
-              <a:gd name="connsiteX3" fmla="*/ 1261053 w 2905181"/>
-              <a:gd name="connsiteY3" fmla="*/ 48225 h 2242785"/>
-              <a:gd name="connsiteX4" fmla="*/ 2896813 w 2905181"/>
-              <a:gd name="connsiteY4" fmla="*/ 993105 h 2242785"/>
-              <a:gd name="connsiteX5" fmla="*/ 1769053 w 2905181"/>
-              <a:gd name="connsiteY5" fmla="*/ 1785585 h 2242785"/>
-              <a:gd name="connsiteX6" fmla="*/ 1332173 w 2905181"/>
-              <a:gd name="connsiteY6" fmla="*/ 1714465 h 2242785"/>
-              <a:gd name="connsiteX7" fmla="*/ 620973 w 2905181"/>
-              <a:gd name="connsiteY7" fmla="*/ 2242785 h 2242785"/>
-              <a:gd name="connsiteX0" fmla="*/ 620973 w 2905181"/>
-              <a:gd name="connsiteY0" fmla="*/ 2221232 h 2221232"/>
-              <a:gd name="connsiteX1" fmla="*/ 641293 w 2905181"/>
-              <a:gd name="connsiteY1" fmla="*/ 1814832 h 2221232"/>
-              <a:gd name="connsiteX2" fmla="*/ 11373 w 2905181"/>
-              <a:gd name="connsiteY2" fmla="*/ 1144272 h 2221232"/>
-              <a:gd name="connsiteX3" fmla="*/ 1261053 w 2905181"/>
-              <a:gd name="connsiteY3" fmla="*/ 26672 h 2221232"/>
-              <a:gd name="connsiteX4" fmla="*/ 2896813 w 2905181"/>
-              <a:gd name="connsiteY4" fmla="*/ 971552 h 2221232"/>
-              <a:gd name="connsiteX5" fmla="*/ 1769053 w 2905181"/>
-              <a:gd name="connsiteY5" fmla="*/ 1764032 h 2221232"/>
-              <a:gd name="connsiteX6" fmla="*/ 1332173 w 2905181"/>
-              <a:gd name="connsiteY6" fmla="*/ 1692912 h 2221232"/>
-              <a:gd name="connsiteX7" fmla="*/ 620973 w 2905181"/>
-              <a:gd name="connsiteY7" fmla="*/ 2221232 h 2221232"/>
-              <a:gd name="connsiteX0" fmla="*/ 640021 w 2924229"/>
-              <a:gd name="connsiteY0" fmla="*/ 2221232 h 2221232"/>
-              <a:gd name="connsiteX1" fmla="*/ 660341 w 2924229"/>
-              <a:gd name="connsiteY1" fmla="*/ 1814832 h 2221232"/>
-              <a:gd name="connsiteX2" fmla="*/ 30421 w 2924229"/>
-              <a:gd name="connsiteY2" fmla="*/ 1144272 h 2221232"/>
-              <a:gd name="connsiteX3" fmla="*/ 1280101 w 2924229"/>
-              <a:gd name="connsiteY3" fmla="*/ 26672 h 2221232"/>
-              <a:gd name="connsiteX4" fmla="*/ 2915861 w 2924229"/>
-              <a:gd name="connsiteY4" fmla="*/ 971552 h 2221232"/>
-              <a:gd name="connsiteX5" fmla="*/ 1788101 w 2924229"/>
-              <a:gd name="connsiteY5" fmla="*/ 1764032 h 2221232"/>
-              <a:gd name="connsiteX6" fmla="*/ 1351221 w 2924229"/>
-              <a:gd name="connsiteY6" fmla="*/ 1692912 h 2221232"/>
-              <a:gd name="connsiteX7" fmla="*/ 640021 w 2924229"/>
-              <a:gd name="connsiteY7" fmla="*/ 2221232 h 2221232"/>
-              <a:gd name="connsiteX0" fmla="*/ 589221 w 2924229"/>
-              <a:gd name="connsiteY0" fmla="*/ 2292352 h 2292352"/>
-              <a:gd name="connsiteX1" fmla="*/ 660341 w 2924229"/>
-              <a:gd name="connsiteY1" fmla="*/ 1814832 h 2292352"/>
-              <a:gd name="connsiteX2" fmla="*/ 30421 w 2924229"/>
-              <a:gd name="connsiteY2" fmla="*/ 1144272 h 2292352"/>
-              <a:gd name="connsiteX3" fmla="*/ 1280101 w 2924229"/>
-              <a:gd name="connsiteY3" fmla="*/ 26672 h 2292352"/>
-              <a:gd name="connsiteX4" fmla="*/ 2915861 w 2924229"/>
-              <a:gd name="connsiteY4" fmla="*/ 971552 h 2292352"/>
-              <a:gd name="connsiteX5" fmla="*/ 1788101 w 2924229"/>
-              <a:gd name="connsiteY5" fmla="*/ 1764032 h 2292352"/>
-              <a:gd name="connsiteX6" fmla="*/ 1351221 w 2924229"/>
-              <a:gd name="connsiteY6" fmla="*/ 1692912 h 2292352"/>
-              <a:gd name="connsiteX7" fmla="*/ 589221 w 2924229"/>
-              <a:gd name="connsiteY7" fmla="*/ 2292352 h 2292352"/>
-              <a:gd name="connsiteX0" fmla="*/ 589221 w 2924229"/>
-              <a:gd name="connsiteY0" fmla="*/ 2292352 h 2292352"/>
-              <a:gd name="connsiteX1" fmla="*/ 660341 w 2924229"/>
-              <a:gd name="connsiteY1" fmla="*/ 1814832 h 2292352"/>
-              <a:gd name="connsiteX2" fmla="*/ 30421 w 2924229"/>
-              <a:gd name="connsiteY2" fmla="*/ 1144272 h 2292352"/>
-              <a:gd name="connsiteX3" fmla="*/ 1280101 w 2924229"/>
-              <a:gd name="connsiteY3" fmla="*/ 26672 h 2292352"/>
-              <a:gd name="connsiteX4" fmla="*/ 2915861 w 2924229"/>
-              <a:gd name="connsiteY4" fmla="*/ 971552 h 2292352"/>
-              <a:gd name="connsiteX5" fmla="*/ 1788101 w 2924229"/>
-              <a:gd name="connsiteY5" fmla="*/ 1764032 h 2292352"/>
-              <a:gd name="connsiteX6" fmla="*/ 1351221 w 2924229"/>
-              <a:gd name="connsiteY6" fmla="*/ 1692912 h 2292352"/>
-              <a:gd name="connsiteX7" fmla="*/ 589221 w 2924229"/>
-              <a:gd name="connsiteY7" fmla="*/ 2292352 h 2292352"/>
-              <a:gd name="connsiteX0" fmla="*/ 589221 w 2924229"/>
-              <a:gd name="connsiteY0" fmla="*/ 2292352 h 2293313"/>
-              <a:gd name="connsiteX1" fmla="*/ 660341 w 2924229"/>
-              <a:gd name="connsiteY1" fmla="*/ 1814832 h 2293313"/>
-              <a:gd name="connsiteX2" fmla="*/ 30421 w 2924229"/>
-              <a:gd name="connsiteY2" fmla="*/ 1144272 h 2293313"/>
-              <a:gd name="connsiteX3" fmla="*/ 1280101 w 2924229"/>
-              <a:gd name="connsiteY3" fmla="*/ 26672 h 2293313"/>
-              <a:gd name="connsiteX4" fmla="*/ 2915861 w 2924229"/>
-              <a:gd name="connsiteY4" fmla="*/ 971552 h 2293313"/>
-              <a:gd name="connsiteX5" fmla="*/ 1788101 w 2924229"/>
-              <a:gd name="connsiteY5" fmla="*/ 1764032 h 2293313"/>
-              <a:gd name="connsiteX6" fmla="*/ 1351221 w 2924229"/>
-              <a:gd name="connsiteY6" fmla="*/ 1692912 h 2293313"/>
-              <a:gd name="connsiteX7" fmla="*/ 589221 w 2924229"/>
-              <a:gd name="connsiteY7" fmla="*/ 2292352 h 2293313"/>
-              <a:gd name="connsiteX0" fmla="*/ 589221 w 2924281"/>
-              <a:gd name="connsiteY0" fmla="*/ 2292352 h 2293313"/>
-              <a:gd name="connsiteX1" fmla="*/ 660341 w 2924281"/>
-              <a:gd name="connsiteY1" fmla="*/ 1814832 h 2293313"/>
-              <a:gd name="connsiteX2" fmla="*/ 30421 w 2924281"/>
-              <a:gd name="connsiteY2" fmla="*/ 1144272 h 2293313"/>
-              <a:gd name="connsiteX3" fmla="*/ 1280101 w 2924281"/>
-              <a:gd name="connsiteY3" fmla="*/ 26672 h 2293313"/>
-              <a:gd name="connsiteX4" fmla="*/ 2915861 w 2924281"/>
-              <a:gd name="connsiteY4" fmla="*/ 971552 h 2293313"/>
-              <a:gd name="connsiteX5" fmla="*/ 1788101 w 2924281"/>
-              <a:gd name="connsiteY5" fmla="*/ 1764032 h 2293313"/>
-              <a:gd name="connsiteX6" fmla="*/ 1310581 w 2924281"/>
-              <a:gd name="connsiteY6" fmla="*/ 1723392 h 2293313"/>
-              <a:gd name="connsiteX7" fmla="*/ 589221 w 2924281"/>
-              <a:gd name="connsiteY7" fmla="*/ 2292352 h 2293313"/>
-              <a:gd name="connsiteX0" fmla="*/ 589221 w 2924281"/>
-              <a:gd name="connsiteY0" fmla="*/ 2292352 h 2293313"/>
-              <a:gd name="connsiteX1" fmla="*/ 660341 w 2924281"/>
-              <a:gd name="connsiteY1" fmla="*/ 1814832 h 2293313"/>
-              <a:gd name="connsiteX2" fmla="*/ 30421 w 2924281"/>
-              <a:gd name="connsiteY2" fmla="*/ 1144272 h 2293313"/>
-              <a:gd name="connsiteX3" fmla="*/ 1280101 w 2924281"/>
-              <a:gd name="connsiteY3" fmla="*/ 26672 h 2293313"/>
-              <a:gd name="connsiteX4" fmla="*/ 2915861 w 2924281"/>
-              <a:gd name="connsiteY4" fmla="*/ 971552 h 2293313"/>
-              <a:gd name="connsiteX5" fmla="*/ 1788101 w 2924281"/>
-              <a:gd name="connsiteY5" fmla="*/ 1764032 h 2293313"/>
-              <a:gd name="connsiteX6" fmla="*/ 1310581 w 2924281"/>
-              <a:gd name="connsiteY6" fmla="*/ 1723392 h 2293313"/>
-              <a:gd name="connsiteX7" fmla="*/ 589221 w 2924281"/>
-              <a:gd name="connsiteY7" fmla="*/ 2292352 h 2293313"/>
-              <a:gd name="connsiteX0" fmla="*/ 589221 w 2937136"/>
-              <a:gd name="connsiteY0" fmla="*/ 2275012 h 2275973"/>
-              <a:gd name="connsiteX1" fmla="*/ 660341 w 2937136"/>
-              <a:gd name="connsiteY1" fmla="*/ 1797492 h 2275973"/>
-              <a:gd name="connsiteX2" fmla="*/ 30421 w 2937136"/>
-              <a:gd name="connsiteY2" fmla="*/ 1126932 h 2275973"/>
-              <a:gd name="connsiteX3" fmla="*/ 1280101 w 2937136"/>
-              <a:gd name="connsiteY3" fmla="*/ 9332 h 2275973"/>
-              <a:gd name="connsiteX4" fmla="*/ 2915861 w 2937136"/>
-              <a:gd name="connsiteY4" fmla="*/ 954212 h 2275973"/>
-              <a:gd name="connsiteX5" fmla="*/ 2153861 w 2937136"/>
-              <a:gd name="connsiteY5" fmla="*/ 1756852 h 2275973"/>
-              <a:gd name="connsiteX6" fmla="*/ 1310581 w 2937136"/>
-              <a:gd name="connsiteY6" fmla="*/ 1706052 h 2275973"/>
-              <a:gd name="connsiteX7" fmla="*/ 589221 w 2937136"/>
-              <a:gd name="connsiteY7" fmla="*/ 2275012 h 2275973"/>
-              <a:gd name="connsiteX0" fmla="*/ 589221 w 2915876"/>
-              <a:gd name="connsiteY0" fmla="*/ 2274921 h 2275882"/>
-              <a:gd name="connsiteX1" fmla="*/ 660341 w 2915876"/>
-              <a:gd name="connsiteY1" fmla="*/ 1797401 h 2275882"/>
-              <a:gd name="connsiteX2" fmla="*/ 30421 w 2915876"/>
-              <a:gd name="connsiteY2" fmla="*/ 1126841 h 2275882"/>
-              <a:gd name="connsiteX3" fmla="*/ 1280101 w 2915876"/>
-              <a:gd name="connsiteY3" fmla="*/ 9241 h 2275882"/>
-              <a:gd name="connsiteX4" fmla="*/ 2915861 w 2915876"/>
-              <a:gd name="connsiteY4" fmla="*/ 954121 h 2275882"/>
-              <a:gd name="connsiteX5" fmla="*/ 1310581 w 2915876"/>
-              <a:gd name="connsiteY5" fmla="*/ 1705961 h 2275882"/>
-              <a:gd name="connsiteX6" fmla="*/ 589221 w 2915876"/>
-              <a:gd name="connsiteY6" fmla="*/ 2274921 h 2275882"/>
-              <a:gd name="connsiteX0" fmla="*/ 589221 w 2915907"/>
-              <a:gd name="connsiteY0" fmla="*/ 2274921 h 2275882"/>
-              <a:gd name="connsiteX1" fmla="*/ 660341 w 2915907"/>
-              <a:gd name="connsiteY1" fmla="*/ 1797401 h 2275882"/>
-              <a:gd name="connsiteX2" fmla="*/ 30421 w 2915907"/>
-              <a:gd name="connsiteY2" fmla="*/ 1126841 h 2275882"/>
-              <a:gd name="connsiteX3" fmla="*/ 1280101 w 2915907"/>
-              <a:gd name="connsiteY3" fmla="*/ 9241 h 2275882"/>
-              <a:gd name="connsiteX4" fmla="*/ 2915861 w 2915907"/>
-              <a:gd name="connsiteY4" fmla="*/ 954121 h 2275882"/>
-              <a:gd name="connsiteX5" fmla="*/ 1310581 w 2915907"/>
-              <a:gd name="connsiteY5" fmla="*/ 1705961 h 2275882"/>
-              <a:gd name="connsiteX6" fmla="*/ 589221 w 2915907"/>
-              <a:gd name="connsiteY6" fmla="*/ 2274921 h 2275882"/>
-              <a:gd name="connsiteX0" fmla="*/ 589221 w 2923626"/>
-              <a:gd name="connsiteY0" fmla="*/ 2278914 h 2279875"/>
-              <a:gd name="connsiteX1" fmla="*/ 660341 w 2923626"/>
-              <a:gd name="connsiteY1" fmla="*/ 1801394 h 2279875"/>
-              <a:gd name="connsiteX2" fmla="*/ 30421 w 2923626"/>
-              <a:gd name="connsiteY2" fmla="*/ 1130834 h 2279875"/>
-              <a:gd name="connsiteX3" fmla="*/ 1280101 w 2923626"/>
-              <a:gd name="connsiteY3" fmla="*/ 13234 h 2279875"/>
-              <a:gd name="connsiteX4" fmla="*/ 2915861 w 2923626"/>
-              <a:gd name="connsiteY4" fmla="*/ 958114 h 2279875"/>
-              <a:gd name="connsiteX5" fmla="*/ 1310581 w 2923626"/>
-              <a:gd name="connsiteY5" fmla="*/ 1709954 h 2279875"/>
-              <a:gd name="connsiteX6" fmla="*/ 589221 w 2923626"/>
-              <a:gd name="connsiteY6" fmla="*/ 2278914 h 2279875"/>
-              <a:gd name="connsiteX0" fmla="*/ 589221 w 2918996"/>
-              <a:gd name="connsiteY0" fmla="*/ 2276579 h 2277540"/>
-              <a:gd name="connsiteX1" fmla="*/ 660341 w 2918996"/>
-              <a:gd name="connsiteY1" fmla="*/ 1799059 h 2277540"/>
-              <a:gd name="connsiteX2" fmla="*/ 30421 w 2918996"/>
-              <a:gd name="connsiteY2" fmla="*/ 1128499 h 2277540"/>
-              <a:gd name="connsiteX3" fmla="*/ 1280101 w 2918996"/>
-              <a:gd name="connsiteY3" fmla="*/ 10899 h 2277540"/>
-              <a:gd name="connsiteX4" fmla="*/ 2915861 w 2918996"/>
-              <a:gd name="connsiteY4" fmla="*/ 955779 h 2277540"/>
-              <a:gd name="connsiteX5" fmla="*/ 1310581 w 2918996"/>
-              <a:gd name="connsiteY5" fmla="*/ 1707619 h 2277540"/>
-              <a:gd name="connsiteX6" fmla="*/ 589221 w 2918996"/>
-              <a:gd name="connsiteY6" fmla="*/ 2276579 h 2277540"/>
-              <a:gd name="connsiteX0" fmla="*/ 589221 w 2918996"/>
-              <a:gd name="connsiteY0" fmla="*/ 2276147 h 2277108"/>
-              <a:gd name="connsiteX1" fmla="*/ 660341 w 2918996"/>
-              <a:gd name="connsiteY1" fmla="*/ 1798627 h 2277108"/>
-              <a:gd name="connsiteX2" fmla="*/ 30421 w 2918996"/>
-              <a:gd name="connsiteY2" fmla="*/ 1128067 h 2277108"/>
-              <a:gd name="connsiteX3" fmla="*/ 1280101 w 2918996"/>
-              <a:gd name="connsiteY3" fmla="*/ 10467 h 2277108"/>
-              <a:gd name="connsiteX4" fmla="*/ 2915861 w 2918996"/>
-              <a:gd name="connsiteY4" fmla="*/ 955347 h 2277108"/>
-              <a:gd name="connsiteX5" fmla="*/ 1310581 w 2918996"/>
-              <a:gd name="connsiteY5" fmla="*/ 1707187 h 2277108"/>
-              <a:gd name="connsiteX6" fmla="*/ 589221 w 2918996"/>
-              <a:gd name="connsiteY6" fmla="*/ 2276147 h 2277108"/>
-              <a:gd name="connsiteX0" fmla="*/ 589221 w 2918996"/>
-              <a:gd name="connsiteY0" fmla="*/ 2276147 h 2276147"/>
-              <a:gd name="connsiteX1" fmla="*/ 660341 w 2918996"/>
-              <a:gd name="connsiteY1" fmla="*/ 1798627 h 2276147"/>
-              <a:gd name="connsiteX2" fmla="*/ 30421 w 2918996"/>
-              <a:gd name="connsiteY2" fmla="*/ 1128067 h 2276147"/>
-              <a:gd name="connsiteX3" fmla="*/ 1280101 w 2918996"/>
-              <a:gd name="connsiteY3" fmla="*/ 10467 h 2276147"/>
-              <a:gd name="connsiteX4" fmla="*/ 2915861 w 2918996"/>
-              <a:gd name="connsiteY4" fmla="*/ 955347 h 2276147"/>
-              <a:gd name="connsiteX5" fmla="*/ 1310581 w 2918996"/>
-              <a:gd name="connsiteY5" fmla="*/ 1707187 h 2276147"/>
-              <a:gd name="connsiteX6" fmla="*/ 589221 w 2918996"/>
-              <a:gd name="connsiteY6" fmla="*/ 2276147 h 2276147"/>
-              <a:gd name="connsiteX0" fmla="*/ 518101 w 2918996"/>
-              <a:gd name="connsiteY0" fmla="*/ 2265987 h 2265987"/>
-              <a:gd name="connsiteX1" fmla="*/ 660341 w 2918996"/>
-              <a:gd name="connsiteY1" fmla="*/ 1798627 h 2265987"/>
-              <a:gd name="connsiteX2" fmla="*/ 30421 w 2918996"/>
-              <a:gd name="connsiteY2" fmla="*/ 1128067 h 2265987"/>
-              <a:gd name="connsiteX3" fmla="*/ 1280101 w 2918996"/>
-              <a:gd name="connsiteY3" fmla="*/ 10467 h 2265987"/>
-              <a:gd name="connsiteX4" fmla="*/ 2915861 w 2918996"/>
-              <a:gd name="connsiteY4" fmla="*/ 955347 h 2265987"/>
-              <a:gd name="connsiteX5" fmla="*/ 1310581 w 2918996"/>
-              <a:gd name="connsiteY5" fmla="*/ 1707187 h 2265987"/>
-              <a:gd name="connsiteX6" fmla="*/ 518101 w 2918996"/>
-              <a:gd name="connsiteY6" fmla="*/ 2265987 h 2265987"/>
-              <a:gd name="connsiteX0" fmla="*/ 518101 w 2918996"/>
-              <a:gd name="connsiteY0" fmla="*/ 2265987 h 2266204"/>
-              <a:gd name="connsiteX1" fmla="*/ 660341 w 2918996"/>
-              <a:gd name="connsiteY1" fmla="*/ 1798627 h 2266204"/>
-              <a:gd name="connsiteX2" fmla="*/ 30421 w 2918996"/>
-              <a:gd name="connsiteY2" fmla="*/ 1128067 h 2266204"/>
-              <a:gd name="connsiteX3" fmla="*/ 1280101 w 2918996"/>
-              <a:gd name="connsiteY3" fmla="*/ 10467 h 2266204"/>
-              <a:gd name="connsiteX4" fmla="*/ 2915861 w 2918996"/>
-              <a:gd name="connsiteY4" fmla="*/ 955347 h 2266204"/>
-              <a:gd name="connsiteX5" fmla="*/ 1310581 w 2918996"/>
-              <a:gd name="connsiteY5" fmla="*/ 1707187 h 2266204"/>
-              <a:gd name="connsiteX6" fmla="*/ 518101 w 2918996"/>
-              <a:gd name="connsiteY6" fmla="*/ 2265987 h 2266204"/>
-              <a:gd name="connsiteX0" fmla="*/ 394025 w 2794920"/>
-              <a:gd name="connsiteY0" fmla="*/ 2258136 h 2258353"/>
-              <a:gd name="connsiteX1" fmla="*/ 536265 w 2794920"/>
-              <a:gd name="connsiteY1" fmla="*/ 1790776 h 2258353"/>
-              <a:gd name="connsiteX2" fmla="*/ 18105 w 2794920"/>
-              <a:gd name="connsiteY2" fmla="*/ 1231976 h 2258353"/>
-              <a:gd name="connsiteX3" fmla="*/ 1156025 w 2794920"/>
-              <a:gd name="connsiteY3" fmla="*/ 2616 h 2258353"/>
-              <a:gd name="connsiteX4" fmla="*/ 2791785 w 2794920"/>
-              <a:gd name="connsiteY4" fmla="*/ 947496 h 2258353"/>
-              <a:gd name="connsiteX5" fmla="*/ 1186505 w 2794920"/>
-              <a:gd name="connsiteY5" fmla="*/ 1699336 h 2258353"/>
-              <a:gd name="connsiteX6" fmla="*/ 394025 w 2794920"/>
-              <a:gd name="connsiteY6" fmla="*/ 2258136 h 2258353"/>
-              <a:gd name="connsiteX0" fmla="*/ 494142 w 2895037"/>
-              <a:gd name="connsiteY0" fmla="*/ 2256537 h 2256754"/>
-              <a:gd name="connsiteX1" fmla="*/ 636382 w 2895037"/>
-              <a:gd name="connsiteY1" fmla="*/ 1789177 h 2256754"/>
-              <a:gd name="connsiteX2" fmla="*/ 16622 w 2895037"/>
-              <a:gd name="connsiteY2" fmla="*/ 1118617 h 2256754"/>
-              <a:gd name="connsiteX3" fmla="*/ 1256142 w 2895037"/>
-              <a:gd name="connsiteY3" fmla="*/ 1017 h 2256754"/>
-              <a:gd name="connsiteX4" fmla="*/ 2891902 w 2895037"/>
-              <a:gd name="connsiteY4" fmla="*/ 945897 h 2256754"/>
-              <a:gd name="connsiteX5" fmla="*/ 1286622 w 2895037"/>
-              <a:gd name="connsiteY5" fmla="*/ 1697737 h 2256754"/>
-              <a:gd name="connsiteX6" fmla="*/ 494142 w 2895037"/>
-              <a:gd name="connsiteY6" fmla="*/ 2256537 h 2256754"/>
-              <a:gd name="connsiteX0" fmla="*/ 500928 w 2901823"/>
-              <a:gd name="connsiteY0" fmla="*/ 2263922 h 2264139"/>
-              <a:gd name="connsiteX1" fmla="*/ 643168 w 2901823"/>
-              <a:gd name="connsiteY1" fmla="*/ 1796562 h 2264139"/>
-              <a:gd name="connsiteX2" fmla="*/ 23408 w 2901823"/>
-              <a:gd name="connsiteY2" fmla="*/ 1126002 h 2264139"/>
-              <a:gd name="connsiteX3" fmla="*/ 1262928 w 2901823"/>
-              <a:gd name="connsiteY3" fmla="*/ 8402 h 2264139"/>
-              <a:gd name="connsiteX4" fmla="*/ 2898688 w 2901823"/>
-              <a:gd name="connsiteY4" fmla="*/ 953282 h 2264139"/>
-              <a:gd name="connsiteX5" fmla="*/ 1293408 w 2901823"/>
-              <a:gd name="connsiteY5" fmla="*/ 1705122 h 2264139"/>
-              <a:gd name="connsiteX6" fmla="*/ 500928 w 2901823"/>
-              <a:gd name="connsiteY6" fmla="*/ 2263922 h 2264139"/>
-              <a:gd name="connsiteX0" fmla="*/ 501232 w 2902127"/>
-              <a:gd name="connsiteY0" fmla="*/ 2278543 h 2278760"/>
-              <a:gd name="connsiteX1" fmla="*/ 643472 w 2902127"/>
-              <a:gd name="connsiteY1" fmla="*/ 1811183 h 2278760"/>
-              <a:gd name="connsiteX2" fmla="*/ 23712 w 2902127"/>
-              <a:gd name="connsiteY2" fmla="*/ 1140623 h 2278760"/>
-              <a:gd name="connsiteX3" fmla="*/ 1263232 w 2902127"/>
-              <a:gd name="connsiteY3" fmla="*/ 23023 h 2278760"/>
-              <a:gd name="connsiteX4" fmla="*/ 2898992 w 2902127"/>
-              <a:gd name="connsiteY4" fmla="*/ 967903 h 2278760"/>
-              <a:gd name="connsiteX5" fmla="*/ 1293712 w 2902127"/>
-              <a:gd name="connsiteY5" fmla="*/ 1719743 h 2278760"/>
-              <a:gd name="connsiteX6" fmla="*/ 501232 w 2902127"/>
-              <a:gd name="connsiteY6" fmla="*/ 2278543 h 2278760"/>
-              <a:gd name="connsiteX0" fmla="*/ 494249 w 2935556"/>
-              <a:gd name="connsiteY0" fmla="*/ 2268783 h 2269000"/>
-              <a:gd name="connsiteX1" fmla="*/ 636489 w 2935556"/>
-              <a:gd name="connsiteY1" fmla="*/ 1801423 h 2269000"/>
-              <a:gd name="connsiteX2" fmla="*/ 16729 w 2935556"/>
-              <a:gd name="connsiteY2" fmla="*/ 1130863 h 2269000"/>
-              <a:gd name="connsiteX3" fmla="*/ 1256249 w 2935556"/>
-              <a:gd name="connsiteY3" fmla="*/ 13263 h 2269000"/>
-              <a:gd name="connsiteX4" fmla="*/ 2932649 w 2935556"/>
-              <a:gd name="connsiteY4" fmla="*/ 633023 h 2269000"/>
-              <a:gd name="connsiteX5" fmla="*/ 1286729 w 2935556"/>
-              <a:gd name="connsiteY5" fmla="*/ 1709983 h 2269000"/>
-              <a:gd name="connsiteX6" fmla="*/ 494249 w 2935556"/>
-              <a:gd name="connsiteY6" fmla="*/ 2268783 h 2269000"/>
-              <a:gd name="connsiteX0" fmla="*/ 494275 w 2945690"/>
-              <a:gd name="connsiteY0" fmla="*/ 2262674 h 2262891"/>
-              <a:gd name="connsiteX1" fmla="*/ 636515 w 2945690"/>
-              <a:gd name="connsiteY1" fmla="*/ 1795314 h 2262891"/>
-              <a:gd name="connsiteX2" fmla="*/ 16755 w 2945690"/>
-              <a:gd name="connsiteY2" fmla="*/ 1124754 h 2262891"/>
-              <a:gd name="connsiteX3" fmla="*/ 1256275 w 2945690"/>
-              <a:gd name="connsiteY3" fmla="*/ 7154 h 2262891"/>
-              <a:gd name="connsiteX4" fmla="*/ 2942835 w 2945690"/>
-              <a:gd name="connsiteY4" fmla="*/ 728514 h 2262891"/>
-              <a:gd name="connsiteX5" fmla="*/ 1286755 w 2945690"/>
-              <a:gd name="connsiteY5" fmla="*/ 1703874 h 2262891"/>
-              <a:gd name="connsiteX6" fmla="*/ 494275 w 2945690"/>
-              <a:gd name="connsiteY6" fmla="*/ 2262674 h 2262891"/>
-              <a:gd name="connsiteX0" fmla="*/ 494329 w 2965965"/>
-              <a:gd name="connsiteY0" fmla="*/ 2260953 h 2261170"/>
-              <a:gd name="connsiteX1" fmla="*/ 636569 w 2965965"/>
-              <a:gd name="connsiteY1" fmla="*/ 1793593 h 2261170"/>
-              <a:gd name="connsiteX2" fmla="*/ 16809 w 2965965"/>
-              <a:gd name="connsiteY2" fmla="*/ 1123033 h 2261170"/>
-              <a:gd name="connsiteX3" fmla="*/ 1256329 w 2965965"/>
-              <a:gd name="connsiteY3" fmla="*/ 5433 h 2261170"/>
-              <a:gd name="connsiteX4" fmla="*/ 2963209 w 2965965"/>
-              <a:gd name="connsiteY4" fmla="*/ 767433 h 2261170"/>
-              <a:gd name="connsiteX5" fmla="*/ 1286809 w 2965965"/>
-              <a:gd name="connsiteY5" fmla="*/ 1702153 h 2261170"/>
-              <a:gd name="connsiteX6" fmla="*/ 494329 w 2965965"/>
-              <a:gd name="connsiteY6" fmla="*/ 2260953 h 2261170"/>
-            </a:gdLst>
-            <a:ahLst/>
-            <a:cxnLst>
-              <a:cxn ang="0">
-                <a:pos x="connsiteX0" y="connsiteY0"/>
-              </a:cxn>
-              <a:cxn ang="0">
-                <a:pos x="connsiteX1" y="connsiteY1"/>
-              </a:cxn>
-              <a:cxn ang="0">
-                <a:pos x="connsiteX2" y="connsiteY2"/>
-              </a:cxn>
-              <a:cxn ang="0">
-                <a:pos x="connsiteX3" y="connsiteY3"/>
-              </a:cxn>
-              <a:cxn ang="0">
-                <a:pos x="connsiteX4" y="connsiteY4"/>
-              </a:cxn>
-              <a:cxn ang="0">
-                <a:pos x="connsiteX5" y="connsiteY5"/>
-              </a:cxn>
-              <a:cxn ang="0">
-                <a:pos x="connsiteX6" y="connsiteY6"/>
-              </a:cxn>
-            </a:cxnLst>
-            <a:rect l="l" t="t" r="r" b="b"/>
-            <a:pathLst>
-              <a:path w="2965965" h="2261170">
-                <a:moveTo>
-                  <a:pt x="494329" y="2260953"/>
-                </a:moveTo>
-                <a:cubicBezTo>
-                  <a:pt x="501102" y="2098393"/>
-                  <a:pt x="729702" y="1984940"/>
-                  <a:pt x="636569" y="1793593"/>
-                </a:cubicBezTo>
-                <a:cubicBezTo>
-                  <a:pt x="534969" y="1614100"/>
-                  <a:pt x="167516" y="1654740"/>
-                  <a:pt x="16809" y="1123033"/>
-                </a:cubicBezTo>
-                <a:cubicBezTo>
-                  <a:pt x="-133898" y="591326"/>
-                  <a:pt x="765262" y="64700"/>
-                  <a:pt x="1256329" y="5433"/>
-                </a:cubicBezTo>
-                <a:cubicBezTo>
-                  <a:pt x="1747396" y="-53834"/>
-                  <a:pt x="2917489" y="383046"/>
-                  <a:pt x="2963209" y="767433"/>
-                </a:cubicBezTo>
-                <a:cubicBezTo>
-                  <a:pt x="3008929" y="1151820"/>
-                  <a:pt x="2487382" y="2071300"/>
-                  <a:pt x="1286809" y="1702153"/>
-                </a:cubicBezTo>
-                <a:cubicBezTo>
-                  <a:pt x="899036" y="1922286"/>
-                  <a:pt x="690756" y="2271113"/>
-                  <a:pt x="494329" y="2260953"/>
-                </a:cubicBezTo>
-                <a:close/>
-              </a:path>
-            </a:pathLst>
-          </a:custGeom>
+          </a:prstGeom>
           <a:solidFill>
-            <a:srgbClr val="E74C3C"/>
+            <a:srgbClr val="EEF2F3"/>
           </a:solidFill>
-          <a:ln w="28575">
+          <a:ln>
             <a:noFill/>
           </a:ln>
         </p:spPr>
@@ -6477,92 +5931,51 @@
           <a:lstStyle/>
           <a:p>
             <a:pPr algn="ctr"/>
-            <a:endParaRPr lang="en-US"/>
-          </a:p>
-        </p:txBody>
-      </p:sp>
-      <p:sp>
-        <p:nvSpPr>
-          <p:cNvPr id="2067" name="Freeform 2066"/>
+            <a:endParaRPr lang="en-US" dirty="0"/>
+          </a:p>
+        </p:txBody>
+      </p:sp>
+      <p:pic>
+        <p:nvPicPr>
+          <p:cNvPr id="20" name="Picture 19"/>
+          <p:cNvPicPr>
+            <a:picLocks noChangeAspect="1"/>
+          </p:cNvPicPr>
+          <p:nvPr/>
+        </p:nvPicPr>
+        <p:blipFill>
+          <a:blip r:embed="rId3"/>
+          <a:stretch>
+            <a:fillRect/>
+          </a:stretch>
+        </p:blipFill>
+        <p:spPr>
+          <a:xfrm>
+            <a:off x="8266990" y="3232952"/>
+            <a:ext cx="4282068" cy="3079772"/>
+          </a:xfrm>
+          <a:prstGeom prst="rect">
+            <a:avLst/>
+          </a:prstGeom>
+        </p:spPr>
+      </p:pic>
+      <p:sp>
+        <p:nvSpPr>
+          <p:cNvPr id="21" name="Rectangle 20"/>
           <p:cNvSpPr/>
           <p:nvPr/>
         </p:nvSpPr>
         <p:spPr>
           <a:xfrm>
-            <a:off x="6085840" y="751840"/>
-            <a:ext cx="528320" cy="741680"/>
+            <a:off x="2661572" y="828258"/>
+            <a:ext cx="1900268" cy="1900268"/>
           </a:xfrm>
-          <a:custGeom>
+          <a:prstGeom prst="rect">
             <a:avLst/>
-            <a:gdLst>
-              <a:gd name="connsiteX0" fmla="*/ 233680 w 711200"/>
-              <a:gd name="connsiteY0" fmla="*/ 518160 h 518160"/>
-              <a:gd name="connsiteX1" fmla="*/ 711200 w 711200"/>
-              <a:gd name="connsiteY1" fmla="*/ 91440 h 518160"/>
-              <a:gd name="connsiteX2" fmla="*/ 0 w 711200"/>
-              <a:gd name="connsiteY2" fmla="*/ 0 h 518160"/>
-              <a:gd name="connsiteX0" fmla="*/ 50800 w 528320"/>
-              <a:gd name="connsiteY0" fmla="*/ 741680 h 741680"/>
-              <a:gd name="connsiteX1" fmla="*/ 528320 w 528320"/>
-              <a:gd name="connsiteY1" fmla="*/ 314960 h 741680"/>
-              <a:gd name="connsiteX2" fmla="*/ 0 w 528320"/>
-              <a:gd name="connsiteY2" fmla="*/ 0 h 741680"/>
-              <a:gd name="connsiteX0" fmla="*/ 50800 w 528320"/>
-              <a:gd name="connsiteY0" fmla="*/ 741680 h 741680"/>
-              <a:gd name="connsiteX1" fmla="*/ 528320 w 528320"/>
-              <a:gd name="connsiteY1" fmla="*/ 314960 h 741680"/>
-              <a:gd name="connsiteX2" fmla="*/ 0 w 528320"/>
-              <a:gd name="connsiteY2" fmla="*/ 0 h 741680"/>
-              <a:gd name="connsiteX0" fmla="*/ 50800 w 528320"/>
-              <a:gd name="connsiteY0" fmla="*/ 741680 h 741680"/>
-              <a:gd name="connsiteX1" fmla="*/ 528320 w 528320"/>
-              <a:gd name="connsiteY1" fmla="*/ 314960 h 741680"/>
-              <a:gd name="connsiteX2" fmla="*/ 0 w 528320"/>
-              <a:gd name="connsiteY2" fmla="*/ 0 h 741680"/>
-              <a:gd name="connsiteX0" fmla="*/ 50800 w 528320"/>
-              <a:gd name="connsiteY0" fmla="*/ 741680 h 741680"/>
-              <a:gd name="connsiteX1" fmla="*/ 528320 w 528320"/>
-              <a:gd name="connsiteY1" fmla="*/ 314960 h 741680"/>
-              <a:gd name="connsiteX2" fmla="*/ 0 w 528320"/>
-              <a:gd name="connsiteY2" fmla="*/ 0 h 741680"/>
-            </a:gdLst>
-            <a:ahLst/>
-            <a:cxnLst>
-              <a:cxn ang="0">
-                <a:pos x="connsiteX0" y="connsiteY0"/>
-              </a:cxn>
-              <a:cxn ang="0">
-                <a:pos x="connsiteX1" y="connsiteY1"/>
-              </a:cxn>
-              <a:cxn ang="0">
-                <a:pos x="connsiteX2" y="connsiteY2"/>
-              </a:cxn>
-            </a:cxnLst>
-            <a:rect l="l" t="t" r="r" b="b"/>
-            <a:pathLst>
-              <a:path w="528320" h="741680">
-                <a:moveTo>
-                  <a:pt x="50800" y="741680"/>
-                </a:moveTo>
-                <a:cubicBezTo>
-                  <a:pt x="118533" y="528320"/>
-                  <a:pt x="226907" y="375920"/>
-                  <a:pt x="528320" y="314960"/>
-                </a:cubicBezTo>
-                <a:cubicBezTo>
-                  <a:pt x="453813" y="88053"/>
-                  <a:pt x="176107" y="104987"/>
-                  <a:pt x="0" y="0"/>
-                </a:cubicBezTo>
-              </a:path>
-            </a:pathLst>
-          </a:custGeom>
+          </a:prstGeom>
           <a:noFill/>
-          <a:ln w="28575">
-            <a:solidFill>
-              <a:schemeClr val="bg1"/>
-            </a:solidFill>
-            <a:prstDash val="solid"/>
+          <a:ln>
+            <a:noFill/>
           </a:ln>
         </p:spPr>
         <p:style>
@@ -6592,68 +6005,178 @@
       </p:sp>
       <p:sp>
         <p:nvSpPr>
-          <p:cNvPr id="2059" name="Freeform 2058"/>
+          <p:cNvPr id="23" name="TextBox 22"/>
+          <p:cNvSpPr txBox="1"/>
+          <p:nvPr/>
+        </p:nvSpPr>
+        <p:spPr>
+          <a:xfrm>
+            <a:off x="2778412" y="2555015"/>
+            <a:ext cx="2081019" cy="646331"/>
+          </a:xfrm>
+          <a:prstGeom prst="rect">
+            <a:avLst/>
+          </a:prstGeom>
+          <a:noFill/>
+        </p:spPr>
+        <p:txBody>
+          <a:bodyPr wrap="none" rtlCol="0">
+            <a:spAutoFit/>
+          </a:bodyPr>
+          <a:lstStyle/>
+          <a:p>
+            <a:r>
+              <a:rPr lang="en-US" sz="3600" dirty="0" smtClean="0">
+                <a:solidFill>
+                  <a:srgbClr val="E74C3C"/>
+                </a:solidFill>
+                <a:latin typeface="Lato Black" panose="020F0A02020204030203" pitchFamily="34" charset="0"/>
+                <a:ea typeface="Roboto" pitchFamily="2" charset="0"/>
+              </a:rPr>
+              <a:t>Trip</a:t>
+            </a:r>
+            <a:r>
+              <a:rPr lang="en-US" sz="700" b="1" dirty="0" smtClean="0">
+                <a:solidFill>
+                  <a:srgbClr val="E74C3C"/>
+                </a:solidFill>
+                <a:latin typeface="Lato" panose="020F0502020204030203" pitchFamily="34" charset="0"/>
+                <a:ea typeface="Roboto" pitchFamily="2" charset="0"/>
+              </a:rPr>
+              <a:t> </a:t>
+            </a:r>
+            <a:r>
+              <a:rPr lang="en-US" sz="3600" dirty="0" smtClean="0">
+                <a:solidFill>
+                  <a:srgbClr val="E74C3C"/>
+                </a:solidFill>
+                <a:latin typeface="Lato" panose="020F0502020204030203" pitchFamily="34" charset="0"/>
+                <a:ea typeface="Roboto" pitchFamily="2" charset="0"/>
+              </a:rPr>
+              <a:t>Mind</a:t>
+            </a:r>
+            <a:endParaRPr lang="en-US" sz="3600" dirty="0">
+              <a:solidFill>
+                <a:srgbClr val="E74C3C"/>
+              </a:solidFill>
+              <a:latin typeface="Lato" panose="020F0502020204030203" pitchFamily="34" charset="0"/>
+              <a:ea typeface="Roboto" pitchFamily="2" charset="0"/>
+            </a:endParaRPr>
+          </a:p>
+        </p:txBody>
+      </p:sp>
+      <p:pic>
+        <p:nvPicPr>
+          <p:cNvPr id="49" name="Picture 48"/>
+          <p:cNvPicPr>
+            <a:picLocks noChangeAspect="1"/>
+          </p:cNvPicPr>
+          <p:nvPr/>
+        </p:nvPicPr>
+        <p:blipFill rotWithShape="1">
+          <a:blip r:embed="rId4"/>
+          <a:srcRect t="14863" r="4921" b="11425"/>
+          <a:stretch/>
+        </p:blipFill>
+        <p:spPr>
+          <a:xfrm>
+            <a:off x="2803812" y="1107518"/>
+            <a:ext cx="1907044" cy="1402080"/>
+          </a:xfrm>
+          <a:prstGeom prst="rect">
+            <a:avLst/>
+          </a:prstGeom>
+        </p:spPr>
+      </p:pic>
+      <p:sp>
+        <p:nvSpPr>
+          <p:cNvPr id="50" name="TextBox 49"/>
+          <p:cNvSpPr txBox="1"/>
+          <p:nvPr/>
+        </p:nvSpPr>
+        <p:spPr>
+          <a:xfrm>
+            <a:off x="5460018" y="1017969"/>
+            <a:ext cx="3300579" cy="954107"/>
+          </a:xfrm>
+          <a:prstGeom prst="rect">
+            <a:avLst/>
+          </a:prstGeom>
+          <a:noFill/>
+        </p:spPr>
+        <p:txBody>
+          <a:bodyPr wrap="square" rtlCol="0">
+            <a:spAutoFit/>
+          </a:bodyPr>
+          <a:lstStyle/>
+          <a:p>
+            <a:r>
+              <a:rPr lang="en-US" sz="2800" dirty="0" smtClean="0">
+                <a:solidFill>
+                  <a:srgbClr val="E74C3C"/>
+                </a:solidFill>
+                <a:latin typeface="Lato" panose="020F0502020204030203" pitchFamily="34" charset="0"/>
+                <a:ea typeface="Roboto" pitchFamily="2" charset="0"/>
+              </a:rPr>
+              <a:t>Keeps track of trip research for you. </a:t>
+            </a:r>
+            <a:endParaRPr lang="en-US" sz="2800" dirty="0">
+              <a:solidFill>
+                <a:srgbClr val="E74C3C"/>
+              </a:solidFill>
+              <a:latin typeface="Lato" panose="020F0502020204030203" pitchFamily="34" charset="0"/>
+              <a:ea typeface="Roboto" pitchFamily="2" charset="0"/>
+            </a:endParaRPr>
+          </a:p>
+        </p:txBody>
+      </p:sp>
+    </p:spTree>
+    <p:extLst>
+      <p:ext uri="{BB962C8B-B14F-4D97-AF65-F5344CB8AC3E}">
+        <p14:creationId xmlns:p14="http://schemas.microsoft.com/office/powerpoint/2010/main" val="803860799"/>
+      </p:ext>
+    </p:extLst>
+  </p:cSld>
+  <p:clrMapOvr>
+    <a:masterClrMapping/>
+  </p:clrMapOvr>
+</p:sld>
+</file>
+
+<file path=ppt/slides/slide5.xml><?xml version="1.0" encoding="utf-8"?>
+<p:sld xmlns:a="http://schemas.openxmlformats.org/drawingml/2006/main" xmlns:r="http://schemas.openxmlformats.org/officeDocument/2006/relationships" xmlns:p="http://schemas.openxmlformats.org/presentationml/2006/main">
+  <p:cSld>
+    <p:spTree>
+      <p:nvGrpSpPr>
+        <p:cNvPr id="1" name=""/>
+        <p:cNvGrpSpPr/>
+        <p:nvPr/>
+      </p:nvGrpSpPr>
+      <p:grpSpPr>
+        <a:xfrm>
+          <a:off x="0" y="0"/>
+          <a:ext cx="0" cy="0"/>
+          <a:chOff x="0" y="0"/>
+          <a:chExt cx="0" cy="0"/>
+        </a:xfrm>
+      </p:grpSpPr>
+      <p:sp>
+        <p:nvSpPr>
+          <p:cNvPr id="2074" name="Rectangle 2073"/>
           <p:cNvSpPr/>
           <p:nvPr/>
         </p:nvSpPr>
         <p:spPr>
           <a:xfrm>
-            <a:off x="5770880" y="1971040"/>
-            <a:ext cx="386080" cy="396240"/>
+            <a:off x="5547012" y="609095"/>
+            <a:ext cx="1900268" cy="1900268"/>
           </a:xfrm>
-          <a:custGeom>
+          <a:prstGeom prst="rect">
             <a:avLst/>
-            <a:gdLst>
-              <a:gd name="connsiteX0" fmla="*/ 0 w 457200"/>
-              <a:gd name="connsiteY0" fmla="*/ 416560 h 416560"/>
-              <a:gd name="connsiteX1" fmla="*/ 457200 w 457200"/>
-              <a:gd name="connsiteY1" fmla="*/ 0 h 416560"/>
-              <a:gd name="connsiteX0" fmla="*/ 0 w 264160"/>
-              <a:gd name="connsiteY0" fmla="*/ 497840 h 497840"/>
-              <a:gd name="connsiteX1" fmla="*/ 264160 w 264160"/>
-              <a:gd name="connsiteY1" fmla="*/ 0 h 497840"/>
-              <a:gd name="connsiteX0" fmla="*/ 0 w 264160"/>
-              <a:gd name="connsiteY0" fmla="*/ 497840 h 497840"/>
-              <a:gd name="connsiteX1" fmla="*/ 264160 w 264160"/>
-              <a:gd name="connsiteY1" fmla="*/ 0 h 497840"/>
-              <a:gd name="connsiteX0" fmla="*/ 0 w 386080"/>
-              <a:gd name="connsiteY0" fmla="*/ 396240 h 396240"/>
-              <a:gd name="connsiteX1" fmla="*/ 386080 w 386080"/>
-              <a:gd name="connsiteY1" fmla="*/ 0 h 396240"/>
-              <a:gd name="connsiteX0" fmla="*/ 0 w 386080"/>
-              <a:gd name="connsiteY0" fmla="*/ 396240 h 396240"/>
-              <a:gd name="connsiteX1" fmla="*/ 386080 w 386080"/>
-              <a:gd name="connsiteY1" fmla="*/ 0 h 396240"/>
-            </a:gdLst>
-            <a:ahLst/>
-            <a:cxnLst>
-              <a:cxn ang="0">
-                <a:pos x="connsiteX0" y="connsiteY0"/>
-              </a:cxn>
-              <a:cxn ang="0">
-                <a:pos x="connsiteX1" y="connsiteY1"/>
-              </a:cxn>
-            </a:cxnLst>
-            <a:rect l="l" t="t" r="r" b="b"/>
-            <a:pathLst>
-              <a:path w="386080" h="396240">
-                <a:moveTo>
-                  <a:pt x="0" y="396240"/>
-                </a:moveTo>
-                <a:cubicBezTo>
-                  <a:pt x="230293" y="311573"/>
-                  <a:pt x="298027" y="165947"/>
-                  <a:pt x="386080" y="0"/>
-                </a:cubicBezTo>
-              </a:path>
-            </a:pathLst>
-          </a:custGeom>
+          </a:prstGeom>
           <a:noFill/>
-          <a:ln w="28575">
-            <a:solidFill>
-              <a:schemeClr val="bg1"/>
-            </a:solidFill>
-            <a:prstDash val="solid"/>
+          <a:ln>
+            <a:noFill/>
           </a:ln>
         </p:spPr>
         <p:style>
@@ -6704,7 +6227,7 @@
         </p:blipFill>
         <p:spPr bwMode="auto">
           <a:xfrm>
-            <a:off x="-514985" y="-218123"/>
+            <a:off x="-239478" y="332298"/>
             <a:ext cx="4762500" cy="3086101"/>
           </a:xfrm>
           <a:prstGeom prst="rect">
@@ -8563,879 +8086,13 @@
       </p:sp>
       <p:sp>
         <p:nvSpPr>
-          <p:cNvPr id="42" name="Oval 41"/>
-          <p:cNvSpPr/>
-          <p:nvPr/>
-        </p:nvSpPr>
-        <p:spPr>
-          <a:xfrm>
-            <a:off x="6106105" y="1931154"/>
-            <a:ext cx="99067" cy="99067"/>
-          </a:xfrm>
-          <a:prstGeom prst="ellipse">
-            <a:avLst/>
-          </a:prstGeom>
-          <a:solidFill>
-            <a:schemeClr val="bg1"/>
-          </a:solidFill>
-          <a:ln w="28575">
-            <a:noFill/>
-            <a:prstDash val="sysDot"/>
-          </a:ln>
-        </p:spPr>
-        <p:style>
-          <a:lnRef idx="2">
-            <a:schemeClr val="accent1">
-              <a:shade val="50000"/>
-            </a:schemeClr>
-          </a:lnRef>
-          <a:fillRef idx="1">
-            <a:schemeClr val="accent1"/>
-          </a:fillRef>
-          <a:effectRef idx="0">
-            <a:schemeClr val="accent1"/>
-          </a:effectRef>
-          <a:fontRef idx="minor">
-            <a:schemeClr val="lt1"/>
-          </a:fontRef>
-        </p:style>
-        <p:txBody>
-          <a:bodyPr rtlCol="0" anchor="ctr"/>
-          <a:lstStyle/>
-          <a:p>
-            <a:pPr algn="ctr"/>
-            <a:endParaRPr lang="en-US"/>
-          </a:p>
-        </p:txBody>
-      </p:sp>
-      <p:sp>
-        <p:nvSpPr>
-          <p:cNvPr id="52" name="Oval 51"/>
-          <p:cNvSpPr/>
-          <p:nvPr/>
-        </p:nvSpPr>
-        <p:spPr>
-          <a:xfrm>
-            <a:off x="6603945" y="2148257"/>
-            <a:ext cx="99067" cy="99067"/>
-          </a:xfrm>
-          <a:prstGeom prst="ellipse">
-            <a:avLst/>
-          </a:prstGeom>
-          <a:solidFill>
-            <a:schemeClr val="bg1"/>
-          </a:solidFill>
-          <a:ln w="28575">
-            <a:solidFill>
-              <a:schemeClr val="bg1"/>
-            </a:solidFill>
-            <a:prstDash val="sysDot"/>
-          </a:ln>
-        </p:spPr>
-        <p:style>
-          <a:lnRef idx="2">
-            <a:schemeClr val="accent1">
-              <a:shade val="50000"/>
-            </a:schemeClr>
-          </a:lnRef>
-          <a:fillRef idx="1">
-            <a:schemeClr val="accent1"/>
-          </a:fillRef>
-          <a:effectRef idx="0">
-            <a:schemeClr val="accent1"/>
-          </a:effectRef>
-          <a:fontRef idx="minor">
-            <a:schemeClr val="lt1"/>
-          </a:fontRef>
-        </p:style>
-        <p:txBody>
-          <a:bodyPr rtlCol="0" anchor="ctr"/>
-          <a:lstStyle/>
-          <a:p>
-            <a:pPr algn="ctr"/>
-            <a:endParaRPr lang="en-US"/>
-          </a:p>
-        </p:txBody>
-      </p:sp>
-      <p:sp>
-        <p:nvSpPr>
-          <p:cNvPr id="53" name="Oval 52"/>
-          <p:cNvSpPr/>
-          <p:nvPr/>
-        </p:nvSpPr>
-        <p:spPr>
-          <a:xfrm>
-            <a:off x="6049435" y="1404080"/>
-            <a:ext cx="212408" cy="212404"/>
-          </a:xfrm>
-          <a:prstGeom prst="ellipse">
-            <a:avLst/>
-          </a:prstGeom>
-          <a:solidFill>
-            <a:schemeClr val="bg1"/>
-          </a:solidFill>
-          <a:ln w="28575">
-            <a:noFill/>
-            <a:prstDash val="sysDot"/>
-          </a:ln>
-        </p:spPr>
-        <p:style>
-          <a:lnRef idx="2">
-            <a:schemeClr val="accent1">
-              <a:shade val="50000"/>
-            </a:schemeClr>
-          </a:lnRef>
-          <a:fillRef idx="1">
-            <a:schemeClr val="accent1"/>
-          </a:fillRef>
-          <a:effectRef idx="0">
-            <a:schemeClr val="accent1"/>
-          </a:effectRef>
-          <a:fontRef idx="minor">
-            <a:schemeClr val="lt1"/>
-          </a:fontRef>
-        </p:style>
-        <p:txBody>
-          <a:bodyPr rtlCol="0" anchor="ctr"/>
-          <a:lstStyle/>
-          <a:p>
-            <a:pPr algn="ctr"/>
-            <a:endParaRPr lang="en-US"/>
-          </a:p>
-        </p:txBody>
-      </p:sp>
-      <p:sp>
-        <p:nvSpPr>
-          <p:cNvPr id="54" name="Oval 53"/>
-          <p:cNvSpPr/>
-          <p:nvPr/>
-        </p:nvSpPr>
-        <p:spPr>
-          <a:xfrm>
-            <a:off x="5463249" y="1832087"/>
-            <a:ext cx="99067" cy="99067"/>
-          </a:xfrm>
-          <a:prstGeom prst="ellipse">
-            <a:avLst/>
-          </a:prstGeom>
-          <a:solidFill>
-            <a:schemeClr val="bg1"/>
-          </a:solidFill>
-          <a:ln w="28575">
-            <a:solidFill>
-              <a:schemeClr val="bg1"/>
-            </a:solidFill>
-            <a:prstDash val="sysDot"/>
-          </a:ln>
-        </p:spPr>
-        <p:style>
-          <a:lnRef idx="2">
-            <a:schemeClr val="accent1">
-              <a:shade val="50000"/>
-            </a:schemeClr>
-          </a:lnRef>
-          <a:fillRef idx="1">
-            <a:schemeClr val="accent1"/>
-          </a:fillRef>
-          <a:effectRef idx="0">
-            <a:schemeClr val="accent1"/>
-          </a:effectRef>
-          <a:fontRef idx="minor">
-            <a:schemeClr val="lt1"/>
-          </a:fontRef>
-        </p:style>
-        <p:txBody>
-          <a:bodyPr rtlCol="0" anchor="ctr"/>
-          <a:lstStyle/>
-          <a:p>
-            <a:pPr algn="ctr"/>
-            <a:endParaRPr lang="en-US"/>
-          </a:p>
-        </p:txBody>
-      </p:sp>
-      <p:sp>
-        <p:nvSpPr>
-          <p:cNvPr id="56" name="Oval 55"/>
-          <p:cNvSpPr/>
-          <p:nvPr/>
-        </p:nvSpPr>
-        <p:spPr>
-          <a:xfrm>
-            <a:off x="6794762" y="1760473"/>
-            <a:ext cx="168234" cy="168230"/>
-          </a:xfrm>
-          <a:prstGeom prst="ellipse">
-            <a:avLst/>
-          </a:prstGeom>
-          <a:solidFill>
-            <a:schemeClr val="bg1"/>
-          </a:solidFill>
-          <a:ln w="28575">
-            <a:noFill/>
-            <a:prstDash val="sysDot"/>
-          </a:ln>
-        </p:spPr>
-        <p:style>
-          <a:lnRef idx="2">
-            <a:schemeClr val="accent1">
-              <a:shade val="50000"/>
-            </a:schemeClr>
-          </a:lnRef>
-          <a:fillRef idx="1">
-            <a:schemeClr val="accent1"/>
-          </a:fillRef>
-          <a:effectRef idx="0">
-            <a:schemeClr val="accent1"/>
-          </a:effectRef>
-          <a:fontRef idx="minor">
-            <a:schemeClr val="lt1"/>
-          </a:fontRef>
-        </p:style>
-        <p:txBody>
-          <a:bodyPr rtlCol="0" anchor="ctr"/>
-          <a:lstStyle/>
-          <a:p>
-            <a:pPr algn="ctr"/>
-            <a:endParaRPr lang="en-US"/>
-          </a:p>
-        </p:txBody>
-      </p:sp>
-      <p:sp>
-        <p:nvSpPr>
-          <p:cNvPr id="57" name="Oval 56"/>
-          <p:cNvSpPr/>
-          <p:nvPr/>
-        </p:nvSpPr>
-        <p:spPr>
-          <a:xfrm>
-            <a:off x="6461975" y="1735039"/>
-            <a:ext cx="99067" cy="99067"/>
-          </a:xfrm>
-          <a:prstGeom prst="ellipse">
-            <a:avLst/>
-          </a:prstGeom>
-          <a:solidFill>
-            <a:schemeClr val="bg1"/>
-          </a:solidFill>
-          <a:ln w="28575">
-            <a:noFill/>
-            <a:prstDash val="sysDot"/>
-          </a:ln>
-        </p:spPr>
-        <p:style>
-          <a:lnRef idx="2">
-            <a:schemeClr val="accent1">
-              <a:shade val="50000"/>
-            </a:schemeClr>
-          </a:lnRef>
-          <a:fillRef idx="1">
-            <a:schemeClr val="accent1"/>
-          </a:fillRef>
-          <a:effectRef idx="0">
-            <a:schemeClr val="accent1"/>
-          </a:effectRef>
-          <a:fontRef idx="minor">
-            <a:schemeClr val="lt1"/>
-          </a:fontRef>
-        </p:style>
-        <p:txBody>
-          <a:bodyPr rtlCol="0" anchor="ctr"/>
-          <a:lstStyle/>
-          <a:p>
-            <a:pPr algn="ctr"/>
-            <a:endParaRPr lang="en-US"/>
-          </a:p>
-        </p:txBody>
-      </p:sp>
-      <p:sp>
-        <p:nvSpPr>
-          <p:cNvPr id="58" name="Oval 57"/>
-          <p:cNvSpPr/>
-          <p:nvPr/>
-        </p:nvSpPr>
-        <p:spPr>
-          <a:xfrm>
-            <a:off x="7117300" y="2105296"/>
-            <a:ext cx="99067" cy="99067"/>
-          </a:xfrm>
-          <a:prstGeom prst="ellipse">
-            <a:avLst/>
-          </a:prstGeom>
-          <a:solidFill>
-            <a:schemeClr val="bg1"/>
-          </a:solidFill>
-          <a:ln w="28575">
-            <a:solidFill>
-              <a:schemeClr val="bg1"/>
-            </a:solidFill>
-            <a:prstDash val="sysDot"/>
-          </a:ln>
-        </p:spPr>
-        <p:style>
-          <a:lnRef idx="2">
-            <a:schemeClr val="accent1">
-              <a:shade val="50000"/>
-            </a:schemeClr>
-          </a:lnRef>
-          <a:fillRef idx="1">
-            <a:schemeClr val="accent1"/>
-          </a:fillRef>
-          <a:effectRef idx="0">
-            <a:schemeClr val="accent1"/>
-          </a:effectRef>
-          <a:fontRef idx="minor">
-            <a:schemeClr val="lt1"/>
-          </a:fontRef>
-        </p:style>
-        <p:txBody>
-          <a:bodyPr rtlCol="0" anchor="ctr"/>
-          <a:lstStyle/>
-          <a:p>
-            <a:pPr algn="ctr"/>
-            <a:endParaRPr lang="en-US"/>
-          </a:p>
-        </p:txBody>
-      </p:sp>
-      <p:sp>
-        <p:nvSpPr>
-          <p:cNvPr id="59" name="Oval 58"/>
-          <p:cNvSpPr/>
-          <p:nvPr/>
-        </p:nvSpPr>
-        <p:spPr>
-          <a:xfrm>
-            <a:off x="7031159" y="1296887"/>
-            <a:ext cx="172282" cy="172278"/>
-          </a:xfrm>
-          <a:prstGeom prst="ellipse">
-            <a:avLst/>
-          </a:prstGeom>
-          <a:solidFill>
-            <a:schemeClr val="bg1"/>
-          </a:solidFill>
-          <a:ln w="28575">
-            <a:noFill/>
-            <a:prstDash val="sysDot"/>
-          </a:ln>
-        </p:spPr>
-        <p:style>
-          <a:lnRef idx="2">
-            <a:schemeClr val="accent1">
-              <a:shade val="50000"/>
-            </a:schemeClr>
-          </a:lnRef>
-          <a:fillRef idx="1">
-            <a:schemeClr val="accent1"/>
-          </a:fillRef>
-          <a:effectRef idx="0">
-            <a:schemeClr val="accent1"/>
-          </a:effectRef>
-          <a:fontRef idx="minor">
-            <a:schemeClr val="lt1"/>
-          </a:fontRef>
-        </p:style>
-        <p:txBody>
-          <a:bodyPr rtlCol="0" anchor="ctr"/>
-          <a:lstStyle/>
-          <a:p>
-            <a:pPr algn="ctr"/>
-            <a:endParaRPr lang="en-US"/>
-          </a:p>
-        </p:txBody>
-      </p:sp>
-      <p:sp>
-        <p:nvSpPr>
-          <p:cNvPr id="60" name="Oval 59"/>
-          <p:cNvSpPr/>
-          <p:nvPr/>
-        </p:nvSpPr>
-        <p:spPr>
-          <a:xfrm>
-            <a:off x="5347258" y="1305012"/>
-            <a:ext cx="99067" cy="99067"/>
-          </a:xfrm>
-          <a:prstGeom prst="ellipse">
-            <a:avLst/>
-          </a:prstGeom>
-          <a:solidFill>
-            <a:schemeClr val="bg1"/>
-          </a:solidFill>
-          <a:ln w="28575">
-            <a:solidFill>
-              <a:schemeClr val="bg1"/>
-            </a:solidFill>
-            <a:prstDash val="sysDot"/>
-          </a:ln>
-        </p:spPr>
-        <p:style>
-          <a:lnRef idx="2">
-            <a:schemeClr val="accent1">
-              <a:shade val="50000"/>
-            </a:schemeClr>
-          </a:lnRef>
-          <a:fillRef idx="1">
-            <a:schemeClr val="accent1"/>
-          </a:fillRef>
-          <a:effectRef idx="0">
-            <a:schemeClr val="accent1"/>
-          </a:effectRef>
-          <a:fontRef idx="minor">
-            <a:schemeClr val="lt1"/>
-          </a:fontRef>
-        </p:style>
-        <p:txBody>
-          <a:bodyPr rtlCol="0" anchor="ctr"/>
-          <a:lstStyle/>
-          <a:p>
-            <a:pPr algn="ctr"/>
-            <a:endParaRPr lang="en-US"/>
-          </a:p>
-        </p:txBody>
-      </p:sp>
-      <p:sp>
-        <p:nvSpPr>
-          <p:cNvPr id="64" name="Oval 63"/>
-          <p:cNvSpPr/>
-          <p:nvPr/>
-        </p:nvSpPr>
-        <p:spPr>
-          <a:xfrm>
-            <a:off x="5822156" y="862021"/>
-            <a:ext cx="212408" cy="212404"/>
-          </a:xfrm>
-          <a:prstGeom prst="ellipse">
-            <a:avLst/>
-          </a:prstGeom>
-          <a:solidFill>
-            <a:schemeClr val="bg1"/>
-          </a:solidFill>
-          <a:ln w="28575">
-            <a:noFill/>
-            <a:prstDash val="sysDot"/>
-          </a:ln>
-        </p:spPr>
-        <p:style>
-          <a:lnRef idx="2">
-            <a:schemeClr val="accent1">
-              <a:shade val="50000"/>
-            </a:schemeClr>
-          </a:lnRef>
-          <a:fillRef idx="1">
-            <a:schemeClr val="accent1"/>
-          </a:fillRef>
-          <a:effectRef idx="0">
-            <a:schemeClr val="accent1"/>
-          </a:effectRef>
-          <a:fontRef idx="minor">
-            <a:schemeClr val="lt1"/>
-          </a:fontRef>
-        </p:style>
-        <p:txBody>
-          <a:bodyPr rtlCol="0" anchor="ctr"/>
-          <a:lstStyle/>
-          <a:p>
-            <a:pPr algn="ctr"/>
-            <a:endParaRPr lang="en-US"/>
-          </a:p>
-        </p:txBody>
-      </p:sp>
-      <p:sp>
-        <p:nvSpPr>
-          <p:cNvPr id="65" name="Oval 64"/>
-          <p:cNvSpPr/>
-          <p:nvPr/>
-        </p:nvSpPr>
-        <p:spPr>
-          <a:xfrm>
-            <a:off x="6561042" y="1049522"/>
-            <a:ext cx="99067" cy="99067"/>
-          </a:xfrm>
-          <a:prstGeom prst="ellipse">
-            <a:avLst/>
-          </a:prstGeom>
-          <a:solidFill>
-            <a:schemeClr val="bg1"/>
-          </a:solidFill>
-          <a:ln w="28575">
-            <a:noFill/>
-            <a:prstDash val="sysDot"/>
-          </a:ln>
-        </p:spPr>
-        <p:style>
-          <a:lnRef idx="2">
-            <a:schemeClr val="accent1">
-              <a:shade val="50000"/>
-            </a:schemeClr>
-          </a:lnRef>
-          <a:fillRef idx="1">
-            <a:schemeClr val="accent1"/>
-          </a:fillRef>
-          <a:effectRef idx="0">
-            <a:schemeClr val="accent1"/>
-          </a:effectRef>
-          <a:fontRef idx="minor">
-            <a:schemeClr val="lt1"/>
-          </a:fontRef>
-        </p:style>
-        <p:txBody>
-          <a:bodyPr rtlCol="0" anchor="ctr"/>
-          <a:lstStyle/>
-          <a:p>
-            <a:pPr algn="ctr"/>
-            <a:endParaRPr lang="en-US"/>
-          </a:p>
-        </p:txBody>
-      </p:sp>
-      <p:sp>
-        <p:nvSpPr>
-          <p:cNvPr id="66" name="Oval 65"/>
-          <p:cNvSpPr/>
-          <p:nvPr/>
-        </p:nvSpPr>
-        <p:spPr>
-          <a:xfrm>
-            <a:off x="6231266" y="704461"/>
-            <a:ext cx="168234" cy="168230"/>
-          </a:xfrm>
-          <a:prstGeom prst="ellipse">
-            <a:avLst/>
-          </a:prstGeom>
-          <a:solidFill>
-            <a:schemeClr val="bg1"/>
-          </a:solidFill>
-          <a:ln w="28575">
-            <a:solidFill>
-              <a:schemeClr val="bg1"/>
-            </a:solidFill>
-            <a:prstDash val="sysDot"/>
-          </a:ln>
-        </p:spPr>
-        <p:style>
-          <a:lnRef idx="2">
-            <a:schemeClr val="accent1">
-              <a:shade val="50000"/>
-            </a:schemeClr>
-          </a:lnRef>
-          <a:fillRef idx="1">
-            <a:schemeClr val="accent1"/>
-          </a:fillRef>
-          <a:effectRef idx="0">
-            <a:schemeClr val="accent1"/>
-          </a:effectRef>
-          <a:fontRef idx="minor">
-            <a:schemeClr val="lt1"/>
-          </a:fontRef>
-        </p:style>
-        <p:txBody>
-          <a:bodyPr rtlCol="0" anchor="ctr"/>
-          <a:lstStyle/>
-          <a:p>
-            <a:pPr algn="ctr"/>
-            <a:endParaRPr lang="en-US"/>
-          </a:p>
-        </p:txBody>
-      </p:sp>
-      <p:sp>
-        <p:nvSpPr>
-          <p:cNvPr id="67" name="Oval 66"/>
-          <p:cNvSpPr/>
-          <p:nvPr/>
-        </p:nvSpPr>
-        <p:spPr>
-          <a:xfrm>
-            <a:off x="6827520" y="872691"/>
-            <a:ext cx="99067" cy="99067"/>
-          </a:xfrm>
-          <a:prstGeom prst="ellipse">
-            <a:avLst/>
-          </a:prstGeom>
-          <a:solidFill>
-            <a:schemeClr val="bg1"/>
-          </a:solidFill>
-          <a:ln w="28575">
-            <a:solidFill>
-              <a:schemeClr val="bg1"/>
-            </a:solidFill>
-            <a:prstDash val="sysDot"/>
-          </a:ln>
-        </p:spPr>
-        <p:style>
-          <a:lnRef idx="2">
-            <a:schemeClr val="accent1">
-              <a:shade val="50000"/>
-            </a:schemeClr>
-          </a:lnRef>
-          <a:fillRef idx="1">
-            <a:schemeClr val="accent1"/>
-          </a:fillRef>
-          <a:effectRef idx="0">
-            <a:schemeClr val="accent1"/>
-          </a:effectRef>
-          <a:fontRef idx="minor">
-            <a:schemeClr val="lt1"/>
-          </a:fontRef>
-        </p:style>
-        <p:txBody>
-          <a:bodyPr rtlCol="0" anchor="ctr"/>
-          <a:lstStyle/>
-          <a:p>
-            <a:pPr algn="ctr"/>
-            <a:endParaRPr lang="en-US"/>
-          </a:p>
-        </p:txBody>
-      </p:sp>
-      <p:sp>
-        <p:nvSpPr>
-          <p:cNvPr id="68" name="Oval 67"/>
-          <p:cNvSpPr/>
-          <p:nvPr/>
-        </p:nvSpPr>
-        <p:spPr>
-          <a:xfrm>
-            <a:off x="5604611" y="2291700"/>
-            <a:ext cx="168234" cy="168230"/>
-          </a:xfrm>
-          <a:prstGeom prst="ellipse">
-            <a:avLst/>
-          </a:prstGeom>
-          <a:solidFill>
-            <a:schemeClr val="bg1"/>
-          </a:solidFill>
-          <a:ln w="28575">
-            <a:solidFill>
-              <a:schemeClr val="bg1"/>
-            </a:solidFill>
-            <a:prstDash val="sysDot"/>
-          </a:ln>
-        </p:spPr>
-        <p:style>
-          <a:lnRef idx="2">
-            <a:schemeClr val="accent1">
-              <a:shade val="50000"/>
-            </a:schemeClr>
-          </a:lnRef>
-          <a:fillRef idx="1">
-            <a:schemeClr val="accent1"/>
-          </a:fillRef>
-          <a:effectRef idx="0">
-            <a:schemeClr val="accent1"/>
-          </a:effectRef>
-          <a:fontRef idx="minor">
-            <a:schemeClr val="lt1"/>
-          </a:fontRef>
-        </p:style>
-        <p:txBody>
-          <a:bodyPr rtlCol="0" anchor="ctr"/>
-          <a:lstStyle/>
-          <a:p>
-            <a:pPr algn="ctr"/>
-            <a:endParaRPr lang="en-US"/>
-          </a:p>
-        </p:txBody>
-      </p:sp>
-      <p:sp>
-        <p:nvSpPr>
-          <p:cNvPr id="69" name="Oval 68"/>
-          <p:cNvSpPr/>
-          <p:nvPr/>
-        </p:nvSpPr>
-        <p:spPr>
-          <a:xfrm>
-            <a:off x="5403555" y="704461"/>
-            <a:ext cx="99067" cy="99067"/>
-          </a:xfrm>
-          <a:prstGeom prst="ellipse">
-            <a:avLst/>
-          </a:prstGeom>
-          <a:solidFill>
-            <a:schemeClr val="bg1"/>
-          </a:solidFill>
-          <a:ln w="28575">
-            <a:solidFill>
-              <a:schemeClr val="bg1"/>
-            </a:solidFill>
-            <a:prstDash val="sysDot"/>
-          </a:ln>
-        </p:spPr>
-        <p:style>
-          <a:lnRef idx="2">
-            <a:schemeClr val="accent1">
-              <a:shade val="50000"/>
-            </a:schemeClr>
-          </a:lnRef>
-          <a:fillRef idx="1">
-            <a:schemeClr val="accent1"/>
-          </a:fillRef>
-          <a:effectRef idx="0">
-            <a:schemeClr val="accent1"/>
-          </a:effectRef>
-          <a:fontRef idx="minor">
-            <a:schemeClr val="lt1"/>
-          </a:fontRef>
-        </p:style>
-        <p:txBody>
-          <a:bodyPr rtlCol="0" anchor="ctr"/>
-          <a:lstStyle/>
-          <a:p>
-            <a:pPr algn="ctr"/>
-            <a:endParaRPr lang="en-US"/>
-          </a:p>
-        </p:txBody>
-      </p:sp>
-      <p:sp>
-        <p:nvSpPr>
-          <p:cNvPr id="70" name="Oval 69"/>
-          <p:cNvSpPr/>
-          <p:nvPr/>
-        </p:nvSpPr>
-        <p:spPr>
-          <a:xfrm>
-            <a:off x="6490310" y="1324927"/>
-            <a:ext cx="168234" cy="168230"/>
-          </a:xfrm>
-          <a:prstGeom prst="ellipse">
-            <a:avLst/>
-          </a:prstGeom>
-          <a:solidFill>
-            <a:schemeClr val="bg1"/>
-          </a:solidFill>
-          <a:ln w="28575">
-            <a:noFill/>
-            <a:prstDash val="sysDot"/>
-          </a:ln>
-        </p:spPr>
-        <p:style>
-          <a:lnRef idx="2">
-            <a:schemeClr val="accent1">
-              <a:shade val="50000"/>
-            </a:schemeClr>
-          </a:lnRef>
-          <a:fillRef idx="1">
-            <a:schemeClr val="accent1"/>
-          </a:fillRef>
-          <a:effectRef idx="0">
-            <a:schemeClr val="accent1"/>
-          </a:effectRef>
-          <a:fontRef idx="minor">
-            <a:schemeClr val="lt1"/>
-          </a:fontRef>
-        </p:style>
-        <p:txBody>
-          <a:bodyPr rtlCol="0" anchor="ctr"/>
-          <a:lstStyle/>
-          <a:p>
-            <a:pPr algn="ctr"/>
-            <a:endParaRPr lang="en-US"/>
-          </a:p>
-        </p:txBody>
-      </p:sp>
-      <p:sp>
-        <p:nvSpPr>
-          <p:cNvPr id="71" name="Oval 70"/>
-          <p:cNvSpPr/>
-          <p:nvPr/>
-        </p:nvSpPr>
-        <p:spPr>
-          <a:xfrm>
-            <a:off x="7461803" y="1148589"/>
-            <a:ext cx="99067" cy="99067"/>
-          </a:xfrm>
-          <a:prstGeom prst="ellipse">
-            <a:avLst/>
-          </a:prstGeom>
-          <a:solidFill>
-            <a:schemeClr val="bg1"/>
-          </a:solidFill>
-          <a:ln w="28575">
-            <a:solidFill>
-              <a:schemeClr val="bg1"/>
-            </a:solidFill>
-            <a:prstDash val="sysDot"/>
-          </a:ln>
-        </p:spPr>
-        <p:style>
-          <a:lnRef idx="2">
-            <a:schemeClr val="accent1">
-              <a:shade val="50000"/>
-            </a:schemeClr>
-          </a:lnRef>
-          <a:fillRef idx="1">
-            <a:schemeClr val="accent1"/>
-          </a:fillRef>
-          <a:effectRef idx="0">
-            <a:schemeClr val="accent1"/>
-          </a:effectRef>
-          <a:fontRef idx="minor">
-            <a:schemeClr val="lt1"/>
-          </a:fontRef>
-        </p:style>
-        <p:txBody>
-          <a:bodyPr rtlCol="0" anchor="ctr"/>
-          <a:lstStyle/>
-          <a:p>
-            <a:pPr algn="ctr"/>
-            <a:endParaRPr lang="en-US"/>
-          </a:p>
-        </p:txBody>
-      </p:sp>
-      <p:sp>
-        <p:nvSpPr>
-          <p:cNvPr id="72" name="Oval 71"/>
-          <p:cNvSpPr/>
-          <p:nvPr/>
-        </p:nvSpPr>
-        <p:spPr>
-          <a:xfrm>
-            <a:off x="7455047" y="1850216"/>
-            <a:ext cx="168234" cy="168230"/>
-          </a:xfrm>
-          <a:prstGeom prst="ellipse">
-            <a:avLst/>
-          </a:prstGeom>
-          <a:solidFill>
-            <a:schemeClr val="bg1"/>
-          </a:solidFill>
-          <a:ln w="28575">
-            <a:solidFill>
-              <a:schemeClr val="bg1"/>
-            </a:solidFill>
-            <a:prstDash val="sysDot"/>
-          </a:ln>
-        </p:spPr>
-        <p:style>
-          <a:lnRef idx="2">
-            <a:schemeClr val="accent1">
-              <a:shade val="50000"/>
-            </a:schemeClr>
-          </a:lnRef>
-          <a:fillRef idx="1">
-            <a:schemeClr val="accent1"/>
-          </a:fillRef>
-          <a:effectRef idx="0">
-            <a:schemeClr val="accent1"/>
-          </a:effectRef>
-          <a:fontRef idx="minor">
-            <a:schemeClr val="lt1"/>
-          </a:fontRef>
-        </p:style>
-        <p:txBody>
-          <a:bodyPr rtlCol="0" anchor="ctr"/>
-          <a:lstStyle/>
-          <a:p>
-            <a:pPr algn="ctr"/>
-            <a:endParaRPr lang="en-US"/>
-          </a:p>
-        </p:txBody>
-      </p:sp>
-      <p:sp>
-        <p:nvSpPr>
           <p:cNvPr id="2064" name="TextBox 2063"/>
           <p:cNvSpPr txBox="1"/>
           <p:nvPr/>
         </p:nvSpPr>
         <p:spPr>
           <a:xfrm>
-            <a:off x="5521612" y="2345694"/>
+            <a:off x="5521612" y="2527946"/>
             <a:ext cx="2081019" cy="646331"/>
           </a:xfrm>
           <a:prstGeom prst="rect">
@@ -9489,453 +8146,1614 @@
           </a:p>
         </p:txBody>
       </p:sp>
-      <p:sp>
-        <p:nvSpPr>
-          <p:cNvPr id="81" name="Oval 80"/>
-          <p:cNvSpPr/>
+      <p:grpSp>
+        <p:nvGrpSpPr>
+          <p:cNvPr id="2075" name="Group 2074"/>
+          <p:cNvGrpSpPr/>
           <p:nvPr/>
-        </p:nvSpPr>
-        <p:spPr>
+        </p:nvGrpSpPr>
+        <p:grpSpPr>
           <a:xfrm>
-            <a:off x="5810100" y="1272791"/>
-            <a:ext cx="99067" cy="99067"/>
+            <a:off x="5612730" y="751840"/>
+            <a:ext cx="1925990" cy="1615440"/>
+            <a:chOff x="5612730" y="751840"/>
+            <a:chExt cx="1925990" cy="1615440"/>
           </a:xfrm>
-          <a:prstGeom prst="ellipse">
-            <a:avLst/>
-          </a:prstGeom>
-          <a:solidFill>
-            <a:schemeClr val="bg1"/>
-          </a:solidFill>
-          <a:ln w="28575">
+        </p:grpSpPr>
+        <p:sp>
+          <p:nvSpPr>
+            <p:cNvPr id="13" name="Freeform 12"/>
+            <p:cNvSpPr/>
+            <p:nvPr/>
+          </p:nvSpPr>
+          <p:spPr>
+            <a:xfrm>
+              <a:off x="5612730" y="907471"/>
+              <a:ext cx="1834550" cy="1398610"/>
+            </a:xfrm>
+            <a:custGeom>
+              <a:avLst/>
+              <a:gdLst>
+                <a:gd name="connsiteX0" fmla="*/ 609600 w 2885440"/>
+                <a:gd name="connsiteY0" fmla="*/ 2194560 h 2194560"/>
+                <a:gd name="connsiteX1" fmla="*/ 629920 w 2885440"/>
+                <a:gd name="connsiteY1" fmla="*/ 1788160 h 2194560"/>
+                <a:gd name="connsiteX2" fmla="*/ 0 w 2885440"/>
+                <a:gd name="connsiteY2" fmla="*/ 1117600 h 2194560"/>
+                <a:gd name="connsiteX3" fmla="*/ 1249680 w 2885440"/>
+                <a:gd name="connsiteY3" fmla="*/ 0 h 2194560"/>
+                <a:gd name="connsiteX4" fmla="*/ 2824480 w 2885440"/>
+                <a:gd name="connsiteY4" fmla="*/ 873760 h 2194560"/>
+                <a:gd name="connsiteX5" fmla="*/ 2885440 w 2885440"/>
+                <a:gd name="connsiteY5" fmla="*/ 944880 h 2194560"/>
+                <a:gd name="connsiteX6" fmla="*/ 1757680 w 2885440"/>
+                <a:gd name="connsiteY6" fmla="*/ 1737360 h 2194560"/>
+                <a:gd name="connsiteX7" fmla="*/ 1320800 w 2885440"/>
+                <a:gd name="connsiteY7" fmla="*/ 1666240 h 2194560"/>
+                <a:gd name="connsiteX8" fmla="*/ 609600 w 2885440"/>
+                <a:gd name="connsiteY8" fmla="*/ 2194560 h 2194560"/>
+                <a:gd name="connsiteX0" fmla="*/ 620973 w 2896813"/>
+                <a:gd name="connsiteY0" fmla="*/ 2194560 h 2194560"/>
+                <a:gd name="connsiteX1" fmla="*/ 641293 w 2896813"/>
+                <a:gd name="connsiteY1" fmla="*/ 1788160 h 2194560"/>
+                <a:gd name="connsiteX2" fmla="*/ 11373 w 2896813"/>
+                <a:gd name="connsiteY2" fmla="*/ 1117600 h 2194560"/>
+                <a:gd name="connsiteX3" fmla="*/ 1261053 w 2896813"/>
+                <a:gd name="connsiteY3" fmla="*/ 0 h 2194560"/>
+                <a:gd name="connsiteX4" fmla="*/ 2835853 w 2896813"/>
+                <a:gd name="connsiteY4" fmla="*/ 873760 h 2194560"/>
+                <a:gd name="connsiteX5" fmla="*/ 2896813 w 2896813"/>
+                <a:gd name="connsiteY5" fmla="*/ 944880 h 2194560"/>
+                <a:gd name="connsiteX6" fmla="*/ 1769053 w 2896813"/>
+                <a:gd name="connsiteY6" fmla="*/ 1737360 h 2194560"/>
+                <a:gd name="connsiteX7" fmla="*/ 1332173 w 2896813"/>
+                <a:gd name="connsiteY7" fmla="*/ 1666240 h 2194560"/>
+                <a:gd name="connsiteX8" fmla="*/ 620973 w 2896813"/>
+                <a:gd name="connsiteY8" fmla="*/ 2194560 h 2194560"/>
+                <a:gd name="connsiteX0" fmla="*/ 620973 w 2896813"/>
+                <a:gd name="connsiteY0" fmla="*/ 2242785 h 2242785"/>
+                <a:gd name="connsiteX1" fmla="*/ 641293 w 2896813"/>
+                <a:gd name="connsiteY1" fmla="*/ 1836385 h 2242785"/>
+                <a:gd name="connsiteX2" fmla="*/ 11373 w 2896813"/>
+                <a:gd name="connsiteY2" fmla="*/ 1165825 h 2242785"/>
+                <a:gd name="connsiteX3" fmla="*/ 1261053 w 2896813"/>
+                <a:gd name="connsiteY3" fmla="*/ 48225 h 2242785"/>
+                <a:gd name="connsiteX4" fmla="*/ 2835853 w 2896813"/>
+                <a:gd name="connsiteY4" fmla="*/ 921985 h 2242785"/>
+                <a:gd name="connsiteX5" fmla="*/ 2896813 w 2896813"/>
+                <a:gd name="connsiteY5" fmla="*/ 993105 h 2242785"/>
+                <a:gd name="connsiteX6" fmla="*/ 1769053 w 2896813"/>
+                <a:gd name="connsiteY6" fmla="*/ 1785585 h 2242785"/>
+                <a:gd name="connsiteX7" fmla="*/ 1332173 w 2896813"/>
+                <a:gd name="connsiteY7" fmla="*/ 1714465 h 2242785"/>
+                <a:gd name="connsiteX8" fmla="*/ 620973 w 2896813"/>
+                <a:gd name="connsiteY8" fmla="*/ 2242785 h 2242785"/>
+                <a:gd name="connsiteX0" fmla="*/ 620973 w 3136213"/>
+                <a:gd name="connsiteY0" fmla="*/ 2242785 h 2242785"/>
+                <a:gd name="connsiteX1" fmla="*/ 641293 w 3136213"/>
+                <a:gd name="connsiteY1" fmla="*/ 1836385 h 2242785"/>
+                <a:gd name="connsiteX2" fmla="*/ 11373 w 3136213"/>
+                <a:gd name="connsiteY2" fmla="*/ 1165825 h 2242785"/>
+                <a:gd name="connsiteX3" fmla="*/ 1261053 w 3136213"/>
+                <a:gd name="connsiteY3" fmla="*/ 48225 h 2242785"/>
+                <a:gd name="connsiteX4" fmla="*/ 2835853 w 3136213"/>
+                <a:gd name="connsiteY4" fmla="*/ 921985 h 2242785"/>
+                <a:gd name="connsiteX5" fmla="*/ 2896813 w 3136213"/>
+                <a:gd name="connsiteY5" fmla="*/ 993105 h 2242785"/>
+                <a:gd name="connsiteX6" fmla="*/ 1769053 w 3136213"/>
+                <a:gd name="connsiteY6" fmla="*/ 1785585 h 2242785"/>
+                <a:gd name="connsiteX7" fmla="*/ 1332173 w 3136213"/>
+                <a:gd name="connsiteY7" fmla="*/ 1714465 h 2242785"/>
+                <a:gd name="connsiteX8" fmla="*/ 620973 w 3136213"/>
+                <a:gd name="connsiteY8" fmla="*/ 2242785 h 2242785"/>
+                <a:gd name="connsiteX0" fmla="*/ 620973 w 2896813"/>
+                <a:gd name="connsiteY0" fmla="*/ 2242785 h 2242785"/>
+                <a:gd name="connsiteX1" fmla="*/ 641293 w 2896813"/>
+                <a:gd name="connsiteY1" fmla="*/ 1836385 h 2242785"/>
+                <a:gd name="connsiteX2" fmla="*/ 11373 w 2896813"/>
+                <a:gd name="connsiteY2" fmla="*/ 1165825 h 2242785"/>
+                <a:gd name="connsiteX3" fmla="*/ 1261053 w 2896813"/>
+                <a:gd name="connsiteY3" fmla="*/ 48225 h 2242785"/>
+                <a:gd name="connsiteX4" fmla="*/ 2896813 w 2896813"/>
+                <a:gd name="connsiteY4" fmla="*/ 993105 h 2242785"/>
+                <a:gd name="connsiteX5" fmla="*/ 1769053 w 2896813"/>
+                <a:gd name="connsiteY5" fmla="*/ 1785585 h 2242785"/>
+                <a:gd name="connsiteX6" fmla="*/ 1332173 w 2896813"/>
+                <a:gd name="connsiteY6" fmla="*/ 1714465 h 2242785"/>
+                <a:gd name="connsiteX7" fmla="*/ 620973 w 2896813"/>
+                <a:gd name="connsiteY7" fmla="*/ 2242785 h 2242785"/>
+                <a:gd name="connsiteX0" fmla="*/ 620973 w 3020934"/>
+                <a:gd name="connsiteY0" fmla="*/ 2242785 h 2242785"/>
+                <a:gd name="connsiteX1" fmla="*/ 641293 w 3020934"/>
+                <a:gd name="connsiteY1" fmla="*/ 1836385 h 2242785"/>
+                <a:gd name="connsiteX2" fmla="*/ 11373 w 3020934"/>
+                <a:gd name="connsiteY2" fmla="*/ 1165825 h 2242785"/>
+                <a:gd name="connsiteX3" fmla="*/ 1261053 w 3020934"/>
+                <a:gd name="connsiteY3" fmla="*/ 48225 h 2242785"/>
+                <a:gd name="connsiteX4" fmla="*/ 2896813 w 3020934"/>
+                <a:gd name="connsiteY4" fmla="*/ 993105 h 2242785"/>
+                <a:gd name="connsiteX5" fmla="*/ 1769053 w 3020934"/>
+                <a:gd name="connsiteY5" fmla="*/ 1785585 h 2242785"/>
+                <a:gd name="connsiteX6" fmla="*/ 1332173 w 3020934"/>
+                <a:gd name="connsiteY6" fmla="*/ 1714465 h 2242785"/>
+                <a:gd name="connsiteX7" fmla="*/ 620973 w 3020934"/>
+                <a:gd name="connsiteY7" fmla="*/ 2242785 h 2242785"/>
+                <a:gd name="connsiteX0" fmla="*/ 620973 w 2901590"/>
+                <a:gd name="connsiteY0" fmla="*/ 2242785 h 2242785"/>
+                <a:gd name="connsiteX1" fmla="*/ 641293 w 2901590"/>
+                <a:gd name="connsiteY1" fmla="*/ 1836385 h 2242785"/>
+                <a:gd name="connsiteX2" fmla="*/ 11373 w 2901590"/>
+                <a:gd name="connsiteY2" fmla="*/ 1165825 h 2242785"/>
+                <a:gd name="connsiteX3" fmla="*/ 1261053 w 2901590"/>
+                <a:gd name="connsiteY3" fmla="*/ 48225 h 2242785"/>
+                <a:gd name="connsiteX4" fmla="*/ 2896813 w 2901590"/>
+                <a:gd name="connsiteY4" fmla="*/ 993105 h 2242785"/>
+                <a:gd name="connsiteX5" fmla="*/ 1769053 w 2901590"/>
+                <a:gd name="connsiteY5" fmla="*/ 1785585 h 2242785"/>
+                <a:gd name="connsiteX6" fmla="*/ 1332173 w 2901590"/>
+                <a:gd name="connsiteY6" fmla="*/ 1714465 h 2242785"/>
+                <a:gd name="connsiteX7" fmla="*/ 620973 w 2901590"/>
+                <a:gd name="connsiteY7" fmla="*/ 2242785 h 2242785"/>
+                <a:gd name="connsiteX0" fmla="*/ 620973 w 2901590"/>
+                <a:gd name="connsiteY0" fmla="*/ 2242785 h 2242785"/>
+                <a:gd name="connsiteX1" fmla="*/ 641293 w 2901590"/>
+                <a:gd name="connsiteY1" fmla="*/ 1836385 h 2242785"/>
+                <a:gd name="connsiteX2" fmla="*/ 11373 w 2901590"/>
+                <a:gd name="connsiteY2" fmla="*/ 1165825 h 2242785"/>
+                <a:gd name="connsiteX3" fmla="*/ 1261053 w 2901590"/>
+                <a:gd name="connsiteY3" fmla="*/ 48225 h 2242785"/>
+                <a:gd name="connsiteX4" fmla="*/ 2896813 w 2901590"/>
+                <a:gd name="connsiteY4" fmla="*/ 993105 h 2242785"/>
+                <a:gd name="connsiteX5" fmla="*/ 1769053 w 2901590"/>
+                <a:gd name="connsiteY5" fmla="*/ 1785585 h 2242785"/>
+                <a:gd name="connsiteX6" fmla="*/ 1332173 w 2901590"/>
+                <a:gd name="connsiteY6" fmla="*/ 1714465 h 2242785"/>
+                <a:gd name="connsiteX7" fmla="*/ 620973 w 2901590"/>
+                <a:gd name="connsiteY7" fmla="*/ 2242785 h 2242785"/>
+                <a:gd name="connsiteX0" fmla="*/ 620973 w 3020934"/>
+                <a:gd name="connsiteY0" fmla="*/ 2242785 h 2242785"/>
+                <a:gd name="connsiteX1" fmla="*/ 641293 w 3020934"/>
+                <a:gd name="connsiteY1" fmla="*/ 1836385 h 2242785"/>
+                <a:gd name="connsiteX2" fmla="*/ 11373 w 3020934"/>
+                <a:gd name="connsiteY2" fmla="*/ 1165825 h 2242785"/>
+                <a:gd name="connsiteX3" fmla="*/ 1261053 w 3020934"/>
+                <a:gd name="connsiteY3" fmla="*/ 48225 h 2242785"/>
+                <a:gd name="connsiteX4" fmla="*/ 2896813 w 3020934"/>
+                <a:gd name="connsiteY4" fmla="*/ 993105 h 2242785"/>
+                <a:gd name="connsiteX5" fmla="*/ 1769053 w 3020934"/>
+                <a:gd name="connsiteY5" fmla="*/ 1785585 h 2242785"/>
+                <a:gd name="connsiteX6" fmla="*/ 1332173 w 3020934"/>
+                <a:gd name="connsiteY6" fmla="*/ 1714465 h 2242785"/>
+                <a:gd name="connsiteX7" fmla="*/ 620973 w 3020934"/>
+                <a:gd name="connsiteY7" fmla="*/ 2242785 h 2242785"/>
+                <a:gd name="connsiteX0" fmla="*/ 620973 w 2905181"/>
+                <a:gd name="connsiteY0" fmla="*/ 2242785 h 2242785"/>
+                <a:gd name="connsiteX1" fmla="*/ 641293 w 2905181"/>
+                <a:gd name="connsiteY1" fmla="*/ 1836385 h 2242785"/>
+                <a:gd name="connsiteX2" fmla="*/ 11373 w 2905181"/>
+                <a:gd name="connsiteY2" fmla="*/ 1165825 h 2242785"/>
+                <a:gd name="connsiteX3" fmla="*/ 1261053 w 2905181"/>
+                <a:gd name="connsiteY3" fmla="*/ 48225 h 2242785"/>
+                <a:gd name="connsiteX4" fmla="*/ 2896813 w 2905181"/>
+                <a:gd name="connsiteY4" fmla="*/ 993105 h 2242785"/>
+                <a:gd name="connsiteX5" fmla="*/ 1769053 w 2905181"/>
+                <a:gd name="connsiteY5" fmla="*/ 1785585 h 2242785"/>
+                <a:gd name="connsiteX6" fmla="*/ 1332173 w 2905181"/>
+                <a:gd name="connsiteY6" fmla="*/ 1714465 h 2242785"/>
+                <a:gd name="connsiteX7" fmla="*/ 620973 w 2905181"/>
+                <a:gd name="connsiteY7" fmla="*/ 2242785 h 2242785"/>
+                <a:gd name="connsiteX0" fmla="*/ 620973 w 2905181"/>
+                <a:gd name="connsiteY0" fmla="*/ 2221232 h 2221232"/>
+                <a:gd name="connsiteX1" fmla="*/ 641293 w 2905181"/>
+                <a:gd name="connsiteY1" fmla="*/ 1814832 h 2221232"/>
+                <a:gd name="connsiteX2" fmla="*/ 11373 w 2905181"/>
+                <a:gd name="connsiteY2" fmla="*/ 1144272 h 2221232"/>
+                <a:gd name="connsiteX3" fmla="*/ 1261053 w 2905181"/>
+                <a:gd name="connsiteY3" fmla="*/ 26672 h 2221232"/>
+                <a:gd name="connsiteX4" fmla="*/ 2896813 w 2905181"/>
+                <a:gd name="connsiteY4" fmla="*/ 971552 h 2221232"/>
+                <a:gd name="connsiteX5" fmla="*/ 1769053 w 2905181"/>
+                <a:gd name="connsiteY5" fmla="*/ 1764032 h 2221232"/>
+                <a:gd name="connsiteX6" fmla="*/ 1332173 w 2905181"/>
+                <a:gd name="connsiteY6" fmla="*/ 1692912 h 2221232"/>
+                <a:gd name="connsiteX7" fmla="*/ 620973 w 2905181"/>
+                <a:gd name="connsiteY7" fmla="*/ 2221232 h 2221232"/>
+                <a:gd name="connsiteX0" fmla="*/ 640021 w 2924229"/>
+                <a:gd name="connsiteY0" fmla="*/ 2221232 h 2221232"/>
+                <a:gd name="connsiteX1" fmla="*/ 660341 w 2924229"/>
+                <a:gd name="connsiteY1" fmla="*/ 1814832 h 2221232"/>
+                <a:gd name="connsiteX2" fmla="*/ 30421 w 2924229"/>
+                <a:gd name="connsiteY2" fmla="*/ 1144272 h 2221232"/>
+                <a:gd name="connsiteX3" fmla="*/ 1280101 w 2924229"/>
+                <a:gd name="connsiteY3" fmla="*/ 26672 h 2221232"/>
+                <a:gd name="connsiteX4" fmla="*/ 2915861 w 2924229"/>
+                <a:gd name="connsiteY4" fmla="*/ 971552 h 2221232"/>
+                <a:gd name="connsiteX5" fmla="*/ 1788101 w 2924229"/>
+                <a:gd name="connsiteY5" fmla="*/ 1764032 h 2221232"/>
+                <a:gd name="connsiteX6" fmla="*/ 1351221 w 2924229"/>
+                <a:gd name="connsiteY6" fmla="*/ 1692912 h 2221232"/>
+                <a:gd name="connsiteX7" fmla="*/ 640021 w 2924229"/>
+                <a:gd name="connsiteY7" fmla="*/ 2221232 h 2221232"/>
+                <a:gd name="connsiteX0" fmla="*/ 589221 w 2924229"/>
+                <a:gd name="connsiteY0" fmla="*/ 2292352 h 2292352"/>
+                <a:gd name="connsiteX1" fmla="*/ 660341 w 2924229"/>
+                <a:gd name="connsiteY1" fmla="*/ 1814832 h 2292352"/>
+                <a:gd name="connsiteX2" fmla="*/ 30421 w 2924229"/>
+                <a:gd name="connsiteY2" fmla="*/ 1144272 h 2292352"/>
+                <a:gd name="connsiteX3" fmla="*/ 1280101 w 2924229"/>
+                <a:gd name="connsiteY3" fmla="*/ 26672 h 2292352"/>
+                <a:gd name="connsiteX4" fmla="*/ 2915861 w 2924229"/>
+                <a:gd name="connsiteY4" fmla="*/ 971552 h 2292352"/>
+                <a:gd name="connsiteX5" fmla="*/ 1788101 w 2924229"/>
+                <a:gd name="connsiteY5" fmla="*/ 1764032 h 2292352"/>
+                <a:gd name="connsiteX6" fmla="*/ 1351221 w 2924229"/>
+                <a:gd name="connsiteY6" fmla="*/ 1692912 h 2292352"/>
+                <a:gd name="connsiteX7" fmla="*/ 589221 w 2924229"/>
+                <a:gd name="connsiteY7" fmla="*/ 2292352 h 2292352"/>
+                <a:gd name="connsiteX0" fmla="*/ 589221 w 2924229"/>
+                <a:gd name="connsiteY0" fmla="*/ 2292352 h 2292352"/>
+                <a:gd name="connsiteX1" fmla="*/ 660341 w 2924229"/>
+                <a:gd name="connsiteY1" fmla="*/ 1814832 h 2292352"/>
+                <a:gd name="connsiteX2" fmla="*/ 30421 w 2924229"/>
+                <a:gd name="connsiteY2" fmla="*/ 1144272 h 2292352"/>
+                <a:gd name="connsiteX3" fmla="*/ 1280101 w 2924229"/>
+                <a:gd name="connsiteY3" fmla="*/ 26672 h 2292352"/>
+                <a:gd name="connsiteX4" fmla="*/ 2915861 w 2924229"/>
+                <a:gd name="connsiteY4" fmla="*/ 971552 h 2292352"/>
+                <a:gd name="connsiteX5" fmla="*/ 1788101 w 2924229"/>
+                <a:gd name="connsiteY5" fmla="*/ 1764032 h 2292352"/>
+                <a:gd name="connsiteX6" fmla="*/ 1351221 w 2924229"/>
+                <a:gd name="connsiteY6" fmla="*/ 1692912 h 2292352"/>
+                <a:gd name="connsiteX7" fmla="*/ 589221 w 2924229"/>
+                <a:gd name="connsiteY7" fmla="*/ 2292352 h 2292352"/>
+                <a:gd name="connsiteX0" fmla="*/ 589221 w 2924229"/>
+                <a:gd name="connsiteY0" fmla="*/ 2292352 h 2293313"/>
+                <a:gd name="connsiteX1" fmla="*/ 660341 w 2924229"/>
+                <a:gd name="connsiteY1" fmla="*/ 1814832 h 2293313"/>
+                <a:gd name="connsiteX2" fmla="*/ 30421 w 2924229"/>
+                <a:gd name="connsiteY2" fmla="*/ 1144272 h 2293313"/>
+                <a:gd name="connsiteX3" fmla="*/ 1280101 w 2924229"/>
+                <a:gd name="connsiteY3" fmla="*/ 26672 h 2293313"/>
+                <a:gd name="connsiteX4" fmla="*/ 2915861 w 2924229"/>
+                <a:gd name="connsiteY4" fmla="*/ 971552 h 2293313"/>
+                <a:gd name="connsiteX5" fmla="*/ 1788101 w 2924229"/>
+                <a:gd name="connsiteY5" fmla="*/ 1764032 h 2293313"/>
+                <a:gd name="connsiteX6" fmla="*/ 1351221 w 2924229"/>
+                <a:gd name="connsiteY6" fmla="*/ 1692912 h 2293313"/>
+                <a:gd name="connsiteX7" fmla="*/ 589221 w 2924229"/>
+                <a:gd name="connsiteY7" fmla="*/ 2292352 h 2293313"/>
+                <a:gd name="connsiteX0" fmla="*/ 589221 w 2924281"/>
+                <a:gd name="connsiteY0" fmla="*/ 2292352 h 2293313"/>
+                <a:gd name="connsiteX1" fmla="*/ 660341 w 2924281"/>
+                <a:gd name="connsiteY1" fmla="*/ 1814832 h 2293313"/>
+                <a:gd name="connsiteX2" fmla="*/ 30421 w 2924281"/>
+                <a:gd name="connsiteY2" fmla="*/ 1144272 h 2293313"/>
+                <a:gd name="connsiteX3" fmla="*/ 1280101 w 2924281"/>
+                <a:gd name="connsiteY3" fmla="*/ 26672 h 2293313"/>
+                <a:gd name="connsiteX4" fmla="*/ 2915861 w 2924281"/>
+                <a:gd name="connsiteY4" fmla="*/ 971552 h 2293313"/>
+                <a:gd name="connsiteX5" fmla="*/ 1788101 w 2924281"/>
+                <a:gd name="connsiteY5" fmla="*/ 1764032 h 2293313"/>
+                <a:gd name="connsiteX6" fmla="*/ 1310581 w 2924281"/>
+                <a:gd name="connsiteY6" fmla="*/ 1723392 h 2293313"/>
+                <a:gd name="connsiteX7" fmla="*/ 589221 w 2924281"/>
+                <a:gd name="connsiteY7" fmla="*/ 2292352 h 2293313"/>
+                <a:gd name="connsiteX0" fmla="*/ 589221 w 2924281"/>
+                <a:gd name="connsiteY0" fmla="*/ 2292352 h 2293313"/>
+                <a:gd name="connsiteX1" fmla="*/ 660341 w 2924281"/>
+                <a:gd name="connsiteY1" fmla="*/ 1814832 h 2293313"/>
+                <a:gd name="connsiteX2" fmla="*/ 30421 w 2924281"/>
+                <a:gd name="connsiteY2" fmla="*/ 1144272 h 2293313"/>
+                <a:gd name="connsiteX3" fmla="*/ 1280101 w 2924281"/>
+                <a:gd name="connsiteY3" fmla="*/ 26672 h 2293313"/>
+                <a:gd name="connsiteX4" fmla="*/ 2915861 w 2924281"/>
+                <a:gd name="connsiteY4" fmla="*/ 971552 h 2293313"/>
+                <a:gd name="connsiteX5" fmla="*/ 1788101 w 2924281"/>
+                <a:gd name="connsiteY5" fmla="*/ 1764032 h 2293313"/>
+                <a:gd name="connsiteX6" fmla="*/ 1310581 w 2924281"/>
+                <a:gd name="connsiteY6" fmla="*/ 1723392 h 2293313"/>
+                <a:gd name="connsiteX7" fmla="*/ 589221 w 2924281"/>
+                <a:gd name="connsiteY7" fmla="*/ 2292352 h 2293313"/>
+                <a:gd name="connsiteX0" fmla="*/ 589221 w 2937136"/>
+                <a:gd name="connsiteY0" fmla="*/ 2275012 h 2275973"/>
+                <a:gd name="connsiteX1" fmla="*/ 660341 w 2937136"/>
+                <a:gd name="connsiteY1" fmla="*/ 1797492 h 2275973"/>
+                <a:gd name="connsiteX2" fmla="*/ 30421 w 2937136"/>
+                <a:gd name="connsiteY2" fmla="*/ 1126932 h 2275973"/>
+                <a:gd name="connsiteX3" fmla="*/ 1280101 w 2937136"/>
+                <a:gd name="connsiteY3" fmla="*/ 9332 h 2275973"/>
+                <a:gd name="connsiteX4" fmla="*/ 2915861 w 2937136"/>
+                <a:gd name="connsiteY4" fmla="*/ 954212 h 2275973"/>
+                <a:gd name="connsiteX5" fmla="*/ 2153861 w 2937136"/>
+                <a:gd name="connsiteY5" fmla="*/ 1756852 h 2275973"/>
+                <a:gd name="connsiteX6" fmla="*/ 1310581 w 2937136"/>
+                <a:gd name="connsiteY6" fmla="*/ 1706052 h 2275973"/>
+                <a:gd name="connsiteX7" fmla="*/ 589221 w 2937136"/>
+                <a:gd name="connsiteY7" fmla="*/ 2275012 h 2275973"/>
+                <a:gd name="connsiteX0" fmla="*/ 589221 w 2915876"/>
+                <a:gd name="connsiteY0" fmla="*/ 2274921 h 2275882"/>
+                <a:gd name="connsiteX1" fmla="*/ 660341 w 2915876"/>
+                <a:gd name="connsiteY1" fmla="*/ 1797401 h 2275882"/>
+                <a:gd name="connsiteX2" fmla="*/ 30421 w 2915876"/>
+                <a:gd name="connsiteY2" fmla="*/ 1126841 h 2275882"/>
+                <a:gd name="connsiteX3" fmla="*/ 1280101 w 2915876"/>
+                <a:gd name="connsiteY3" fmla="*/ 9241 h 2275882"/>
+                <a:gd name="connsiteX4" fmla="*/ 2915861 w 2915876"/>
+                <a:gd name="connsiteY4" fmla="*/ 954121 h 2275882"/>
+                <a:gd name="connsiteX5" fmla="*/ 1310581 w 2915876"/>
+                <a:gd name="connsiteY5" fmla="*/ 1705961 h 2275882"/>
+                <a:gd name="connsiteX6" fmla="*/ 589221 w 2915876"/>
+                <a:gd name="connsiteY6" fmla="*/ 2274921 h 2275882"/>
+                <a:gd name="connsiteX0" fmla="*/ 589221 w 2915907"/>
+                <a:gd name="connsiteY0" fmla="*/ 2274921 h 2275882"/>
+                <a:gd name="connsiteX1" fmla="*/ 660341 w 2915907"/>
+                <a:gd name="connsiteY1" fmla="*/ 1797401 h 2275882"/>
+                <a:gd name="connsiteX2" fmla="*/ 30421 w 2915907"/>
+                <a:gd name="connsiteY2" fmla="*/ 1126841 h 2275882"/>
+                <a:gd name="connsiteX3" fmla="*/ 1280101 w 2915907"/>
+                <a:gd name="connsiteY3" fmla="*/ 9241 h 2275882"/>
+                <a:gd name="connsiteX4" fmla="*/ 2915861 w 2915907"/>
+                <a:gd name="connsiteY4" fmla="*/ 954121 h 2275882"/>
+                <a:gd name="connsiteX5" fmla="*/ 1310581 w 2915907"/>
+                <a:gd name="connsiteY5" fmla="*/ 1705961 h 2275882"/>
+                <a:gd name="connsiteX6" fmla="*/ 589221 w 2915907"/>
+                <a:gd name="connsiteY6" fmla="*/ 2274921 h 2275882"/>
+                <a:gd name="connsiteX0" fmla="*/ 589221 w 2923626"/>
+                <a:gd name="connsiteY0" fmla="*/ 2278914 h 2279875"/>
+                <a:gd name="connsiteX1" fmla="*/ 660341 w 2923626"/>
+                <a:gd name="connsiteY1" fmla="*/ 1801394 h 2279875"/>
+                <a:gd name="connsiteX2" fmla="*/ 30421 w 2923626"/>
+                <a:gd name="connsiteY2" fmla="*/ 1130834 h 2279875"/>
+                <a:gd name="connsiteX3" fmla="*/ 1280101 w 2923626"/>
+                <a:gd name="connsiteY3" fmla="*/ 13234 h 2279875"/>
+                <a:gd name="connsiteX4" fmla="*/ 2915861 w 2923626"/>
+                <a:gd name="connsiteY4" fmla="*/ 958114 h 2279875"/>
+                <a:gd name="connsiteX5" fmla="*/ 1310581 w 2923626"/>
+                <a:gd name="connsiteY5" fmla="*/ 1709954 h 2279875"/>
+                <a:gd name="connsiteX6" fmla="*/ 589221 w 2923626"/>
+                <a:gd name="connsiteY6" fmla="*/ 2278914 h 2279875"/>
+                <a:gd name="connsiteX0" fmla="*/ 589221 w 2918996"/>
+                <a:gd name="connsiteY0" fmla="*/ 2276579 h 2277540"/>
+                <a:gd name="connsiteX1" fmla="*/ 660341 w 2918996"/>
+                <a:gd name="connsiteY1" fmla="*/ 1799059 h 2277540"/>
+                <a:gd name="connsiteX2" fmla="*/ 30421 w 2918996"/>
+                <a:gd name="connsiteY2" fmla="*/ 1128499 h 2277540"/>
+                <a:gd name="connsiteX3" fmla="*/ 1280101 w 2918996"/>
+                <a:gd name="connsiteY3" fmla="*/ 10899 h 2277540"/>
+                <a:gd name="connsiteX4" fmla="*/ 2915861 w 2918996"/>
+                <a:gd name="connsiteY4" fmla="*/ 955779 h 2277540"/>
+                <a:gd name="connsiteX5" fmla="*/ 1310581 w 2918996"/>
+                <a:gd name="connsiteY5" fmla="*/ 1707619 h 2277540"/>
+                <a:gd name="connsiteX6" fmla="*/ 589221 w 2918996"/>
+                <a:gd name="connsiteY6" fmla="*/ 2276579 h 2277540"/>
+                <a:gd name="connsiteX0" fmla="*/ 589221 w 2918996"/>
+                <a:gd name="connsiteY0" fmla="*/ 2276147 h 2277108"/>
+                <a:gd name="connsiteX1" fmla="*/ 660341 w 2918996"/>
+                <a:gd name="connsiteY1" fmla="*/ 1798627 h 2277108"/>
+                <a:gd name="connsiteX2" fmla="*/ 30421 w 2918996"/>
+                <a:gd name="connsiteY2" fmla="*/ 1128067 h 2277108"/>
+                <a:gd name="connsiteX3" fmla="*/ 1280101 w 2918996"/>
+                <a:gd name="connsiteY3" fmla="*/ 10467 h 2277108"/>
+                <a:gd name="connsiteX4" fmla="*/ 2915861 w 2918996"/>
+                <a:gd name="connsiteY4" fmla="*/ 955347 h 2277108"/>
+                <a:gd name="connsiteX5" fmla="*/ 1310581 w 2918996"/>
+                <a:gd name="connsiteY5" fmla="*/ 1707187 h 2277108"/>
+                <a:gd name="connsiteX6" fmla="*/ 589221 w 2918996"/>
+                <a:gd name="connsiteY6" fmla="*/ 2276147 h 2277108"/>
+                <a:gd name="connsiteX0" fmla="*/ 589221 w 2918996"/>
+                <a:gd name="connsiteY0" fmla="*/ 2276147 h 2276147"/>
+                <a:gd name="connsiteX1" fmla="*/ 660341 w 2918996"/>
+                <a:gd name="connsiteY1" fmla="*/ 1798627 h 2276147"/>
+                <a:gd name="connsiteX2" fmla="*/ 30421 w 2918996"/>
+                <a:gd name="connsiteY2" fmla="*/ 1128067 h 2276147"/>
+                <a:gd name="connsiteX3" fmla="*/ 1280101 w 2918996"/>
+                <a:gd name="connsiteY3" fmla="*/ 10467 h 2276147"/>
+                <a:gd name="connsiteX4" fmla="*/ 2915861 w 2918996"/>
+                <a:gd name="connsiteY4" fmla="*/ 955347 h 2276147"/>
+                <a:gd name="connsiteX5" fmla="*/ 1310581 w 2918996"/>
+                <a:gd name="connsiteY5" fmla="*/ 1707187 h 2276147"/>
+                <a:gd name="connsiteX6" fmla="*/ 589221 w 2918996"/>
+                <a:gd name="connsiteY6" fmla="*/ 2276147 h 2276147"/>
+                <a:gd name="connsiteX0" fmla="*/ 518101 w 2918996"/>
+                <a:gd name="connsiteY0" fmla="*/ 2265987 h 2265987"/>
+                <a:gd name="connsiteX1" fmla="*/ 660341 w 2918996"/>
+                <a:gd name="connsiteY1" fmla="*/ 1798627 h 2265987"/>
+                <a:gd name="connsiteX2" fmla="*/ 30421 w 2918996"/>
+                <a:gd name="connsiteY2" fmla="*/ 1128067 h 2265987"/>
+                <a:gd name="connsiteX3" fmla="*/ 1280101 w 2918996"/>
+                <a:gd name="connsiteY3" fmla="*/ 10467 h 2265987"/>
+                <a:gd name="connsiteX4" fmla="*/ 2915861 w 2918996"/>
+                <a:gd name="connsiteY4" fmla="*/ 955347 h 2265987"/>
+                <a:gd name="connsiteX5" fmla="*/ 1310581 w 2918996"/>
+                <a:gd name="connsiteY5" fmla="*/ 1707187 h 2265987"/>
+                <a:gd name="connsiteX6" fmla="*/ 518101 w 2918996"/>
+                <a:gd name="connsiteY6" fmla="*/ 2265987 h 2265987"/>
+                <a:gd name="connsiteX0" fmla="*/ 518101 w 2918996"/>
+                <a:gd name="connsiteY0" fmla="*/ 2265987 h 2266204"/>
+                <a:gd name="connsiteX1" fmla="*/ 660341 w 2918996"/>
+                <a:gd name="connsiteY1" fmla="*/ 1798627 h 2266204"/>
+                <a:gd name="connsiteX2" fmla="*/ 30421 w 2918996"/>
+                <a:gd name="connsiteY2" fmla="*/ 1128067 h 2266204"/>
+                <a:gd name="connsiteX3" fmla="*/ 1280101 w 2918996"/>
+                <a:gd name="connsiteY3" fmla="*/ 10467 h 2266204"/>
+                <a:gd name="connsiteX4" fmla="*/ 2915861 w 2918996"/>
+                <a:gd name="connsiteY4" fmla="*/ 955347 h 2266204"/>
+                <a:gd name="connsiteX5" fmla="*/ 1310581 w 2918996"/>
+                <a:gd name="connsiteY5" fmla="*/ 1707187 h 2266204"/>
+                <a:gd name="connsiteX6" fmla="*/ 518101 w 2918996"/>
+                <a:gd name="connsiteY6" fmla="*/ 2265987 h 2266204"/>
+                <a:gd name="connsiteX0" fmla="*/ 394025 w 2794920"/>
+                <a:gd name="connsiteY0" fmla="*/ 2258136 h 2258353"/>
+                <a:gd name="connsiteX1" fmla="*/ 536265 w 2794920"/>
+                <a:gd name="connsiteY1" fmla="*/ 1790776 h 2258353"/>
+                <a:gd name="connsiteX2" fmla="*/ 18105 w 2794920"/>
+                <a:gd name="connsiteY2" fmla="*/ 1231976 h 2258353"/>
+                <a:gd name="connsiteX3" fmla="*/ 1156025 w 2794920"/>
+                <a:gd name="connsiteY3" fmla="*/ 2616 h 2258353"/>
+                <a:gd name="connsiteX4" fmla="*/ 2791785 w 2794920"/>
+                <a:gd name="connsiteY4" fmla="*/ 947496 h 2258353"/>
+                <a:gd name="connsiteX5" fmla="*/ 1186505 w 2794920"/>
+                <a:gd name="connsiteY5" fmla="*/ 1699336 h 2258353"/>
+                <a:gd name="connsiteX6" fmla="*/ 394025 w 2794920"/>
+                <a:gd name="connsiteY6" fmla="*/ 2258136 h 2258353"/>
+                <a:gd name="connsiteX0" fmla="*/ 494142 w 2895037"/>
+                <a:gd name="connsiteY0" fmla="*/ 2256537 h 2256754"/>
+                <a:gd name="connsiteX1" fmla="*/ 636382 w 2895037"/>
+                <a:gd name="connsiteY1" fmla="*/ 1789177 h 2256754"/>
+                <a:gd name="connsiteX2" fmla="*/ 16622 w 2895037"/>
+                <a:gd name="connsiteY2" fmla="*/ 1118617 h 2256754"/>
+                <a:gd name="connsiteX3" fmla="*/ 1256142 w 2895037"/>
+                <a:gd name="connsiteY3" fmla="*/ 1017 h 2256754"/>
+                <a:gd name="connsiteX4" fmla="*/ 2891902 w 2895037"/>
+                <a:gd name="connsiteY4" fmla="*/ 945897 h 2256754"/>
+                <a:gd name="connsiteX5" fmla="*/ 1286622 w 2895037"/>
+                <a:gd name="connsiteY5" fmla="*/ 1697737 h 2256754"/>
+                <a:gd name="connsiteX6" fmla="*/ 494142 w 2895037"/>
+                <a:gd name="connsiteY6" fmla="*/ 2256537 h 2256754"/>
+                <a:gd name="connsiteX0" fmla="*/ 500928 w 2901823"/>
+                <a:gd name="connsiteY0" fmla="*/ 2263922 h 2264139"/>
+                <a:gd name="connsiteX1" fmla="*/ 643168 w 2901823"/>
+                <a:gd name="connsiteY1" fmla="*/ 1796562 h 2264139"/>
+                <a:gd name="connsiteX2" fmla="*/ 23408 w 2901823"/>
+                <a:gd name="connsiteY2" fmla="*/ 1126002 h 2264139"/>
+                <a:gd name="connsiteX3" fmla="*/ 1262928 w 2901823"/>
+                <a:gd name="connsiteY3" fmla="*/ 8402 h 2264139"/>
+                <a:gd name="connsiteX4" fmla="*/ 2898688 w 2901823"/>
+                <a:gd name="connsiteY4" fmla="*/ 953282 h 2264139"/>
+                <a:gd name="connsiteX5" fmla="*/ 1293408 w 2901823"/>
+                <a:gd name="connsiteY5" fmla="*/ 1705122 h 2264139"/>
+                <a:gd name="connsiteX6" fmla="*/ 500928 w 2901823"/>
+                <a:gd name="connsiteY6" fmla="*/ 2263922 h 2264139"/>
+                <a:gd name="connsiteX0" fmla="*/ 501232 w 2902127"/>
+                <a:gd name="connsiteY0" fmla="*/ 2278543 h 2278760"/>
+                <a:gd name="connsiteX1" fmla="*/ 643472 w 2902127"/>
+                <a:gd name="connsiteY1" fmla="*/ 1811183 h 2278760"/>
+                <a:gd name="connsiteX2" fmla="*/ 23712 w 2902127"/>
+                <a:gd name="connsiteY2" fmla="*/ 1140623 h 2278760"/>
+                <a:gd name="connsiteX3" fmla="*/ 1263232 w 2902127"/>
+                <a:gd name="connsiteY3" fmla="*/ 23023 h 2278760"/>
+                <a:gd name="connsiteX4" fmla="*/ 2898992 w 2902127"/>
+                <a:gd name="connsiteY4" fmla="*/ 967903 h 2278760"/>
+                <a:gd name="connsiteX5" fmla="*/ 1293712 w 2902127"/>
+                <a:gd name="connsiteY5" fmla="*/ 1719743 h 2278760"/>
+                <a:gd name="connsiteX6" fmla="*/ 501232 w 2902127"/>
+                <a:gd name="connsiteY6" fmla="*/ 2278543 h 2278760"/>
+                <a:gd name="connsiteX0" fmla="*/ 494249 w 2935556"/>
+                <a:gd name="connsiteY0" fmla="*/ 2268783 h 2269000"/>
+                <a:gd name="connsiteX1" fmla="*/ 636489 w 2935556"/>
+                <a:gd name="connsiteY1" fmla="*/ 1801423 h 2269000"/>
+                <a:gd name="connsiteX2" fmla="*/ 16729 w 2935556"/>
+                <a:gd name="connsiteY2" fmla="*/ 1130863 h 2269000"/>
+                <a:gd name="connsiteX3" fmla="*/ 1256249 w 2935556"/>
+                <a:gd name="connsiteY3" fmla="*/ 13263 h 2269000"/>
+                <a:gd name="connsiteX4" fmla="*/ 2932649 w 2935556"/>
+                <a:gd name="connsiteY4" fmla="*/ 633023 h 2269000"/>
+                <a:gd name="connsiteX5" fmla="*/ 1286729 w 2935556"/>
+                <a:gd name="connsiteY5" fmla="*/ 1709983 h 2269000"/>
+                <a:gd name="connsiteX6" fmla="*/ 494249 w 2935556"/>
+                <a:gd name="connsiteY6" fmla="*/ 2268783 h 2269000"/>
+                <a:gd name="connsiteX0" fmla="*/ 494275 w 2945690"/>
+                <a:gd name="connsiteY0" fmla="*/ 2262674 h 2262891"/>
+                <a:gd name="connsiteX1" fmla="*/ 636515 w 2945690"/>
+                <a:gd name="connsiteY1" fmla="*/ 1795314 h 2262891"/>
+                <a:gd name="connsiteX2" fmla="*/ 16755 w 2945690"/>
+                <a:gd name="connsiteY2" fmla="*/ 1124754 h 2262891"/>
+                <a:gd name="connsiteX3" fmla="*/ 1256275 w 2945690"/>
+                <a:gd name="connsiteY3" fmla="*/ 7154 h 2262891"/>
+                <a:gd name="connsiteX4" fmla="*/ 2942835 w 2945690"/>
+                <a:gd name="connsiteY4" fmla="*/ 728514 h 2262891"/>
+                <a:gd name="connsiteX5" fmla="*/ 1286755 w 2945690"/>
+                <a:gd name="connsiteY5" fmla="*/ 1703874 h 2262891"/>
+                <a:gd name="connsiteX6" fmla="*/ 494275 w 2945690"/>
+                <a:gd name="connsiteY6" fmla="*/ 2262674 h 2262891"/>
+                <a:gd name="connsiteX0" fmla="*/ 494329 w 2965965"/>
+                <a:gd name="connsiteY0" fmla="*/ 2260953 h 2261170"/>
+                <a:gd name="connsiteX1" fmla="*/ 636569 w 2965965"/>
+                <a:gd name="connsiteY1" fmla="*/ 1793593 h 2261170"/>
+                <a:gd name="connsiteX2" fmla="*/ 16809 w 2965965"/>
+                <a:gd name="connsiteY2" fmla="*/ 1123033 h 2261170"/>
+                <a:gd name="connsiteX3" fmla="*/ 1256329 w 2965965"/>
+                <a:gd name="connsiteY3" fmla="*/ 5433 h 2261170"/>
+                <a:gd name="connsiteX4" fmla="*/ 2963209 w 2965965"/>
+                <a:gd name="connsiteY4" fmla="*/ 767433 h 2261170"/>
+                <a:gd name="connsiteX5" fmla="*/ 1286809 w 2965965"/>
+                <a:gd name="connsiteY5" fmla="*/ 1702153 h 2261170"/>
+                <a:gd name="connsiteX6" fmla="*/ 494329 w 2965965"/>
+                <a:gd name="connsiteY6" fmla="*/ 2260953 h 2261170"/>
+              </a:gdLst>
+              <a:ahLst/>
+              <a:cxnLst>
+                <a:cxn ang="0">
+                  <a:pos x="connsiteX0" y="connsiteY0"/>
+                </a:cxn>
+                <a:cxn ang="0">
+                  <a:pos x="connsiteX1" y="connsiteY1"/>
+                </a:cxn>
+                <a:cxn ang="0">
+                  <a:pos x="connsiteX2" y="connsiteY2"/>
+                </a:cxn>
+                <a:cxn ang="0">
+                  <a:pos x="connsiteX3" y="connsiteY3"/>
+                </a:cxn>
+                <a:cxn ang="0">
+                  <a:pos x="connsiteX4" y="connsiteY4"/>
+                </a:cxn>
+                <a:cxn ang="0">
+                  <a:pos x="connsiteX5" y="connsiteY5"/>
+                </a:cxn>
+                <a:cxn ang="0">
+                  <a:pos x="connsiteX6" y="connsiteY6"/>
+                </a:cxn>
+              </a:cxnLst>
+              <a:rect l="l" t="t" r="r" b="b"/>
+              <a:pathLst>
+                <a:path w="2965965" h="2261170">
+                  <a:moveTo>
+                    <a:pt x="494329" y="2260953"/>
+                  </a:moveTo>
+                  <a:cubicBezTo>
+                    <a:pt x="501102" y="2098393"/>
+                    <a:pt x="729702" y="1984940"/>
+                    <a:pt x="636569" y="1793593"/>
+                  </a:cubicBezTo>
+                  <a:cubicBezTo>
+                    <a:pt x="534969" y="1614100"/>
+                    <a:pt x="167516" y="1654740"/>
+                    <a:pt x="16809" y="1123033"/>
+                  </a:cubicBezTo>
+                  <a:cubicBezTo>
+                    <a:pt x="-133898" y="591326"/>
+                    <a:pt x="765262" y="64700"/>
+                    <a:pt x="1256329" y="5433"/>
+                  </a:cubicBezTo>
+                  <a:cubicBezTo>
+                    <a:pt x="1747396" y="-53834"/>
+                    <a:pt x="2917489" y="383046"/>
+                    <a:pt x="2963209" y="767433"/>
+                  </a:cubicBezTo>
+                  <a:cubicBezTo>
+                    <a:pt x="3008929" y="1151820"/>
+                    <a:pt x="2487382" y="2071300"/>
+                    <a:pt x="1286809" y="1702153"/>
+                  </a:cubicBezTo>
+                  <a:cubicBezTo>
+                    <a:pt x="899036" y="1922286"/>
+                    <a:pt x="690756" y="2271113"/>
+                    <a:pt x="494329" y="2260953"/>
+                  </a:cubicBezTo>
+                  <a:close/>
+                </a:path>
+              </a:pathLst>
+            </a:custGeom>
+            <a:solidFill>
+              <a:srgbClr val="E74C3C"/>
+            </a:solidFill>
+            <a:ln w="28575">
+              <a:noFill/>
+            </a:ln>
+          </p:spPr>
+          <p:style>
+            <a:lnRef idx="2">
+              <a:schemeClr val="accent1">
+                <a:shade val="50000"/>
+              </a:schemeClr>
+            </a:lnRef>
+            <a:fillRef idx="1">
+              <a:schemeClr val="accent1"/>
+            </a:fillRef>
+            <a:effectRef idx="0">
+              <a:schemeClr val="accent1"/>
+            </a:effectRef>
+            <a:fontRef idx="minor">
+              <a:schemeClr val="lt1"/>
+            </a:fontRef>
+          </p:style>
+          <p:txBody>
+            <a:bodyPr rtlCol="0" anchor="ctr"/>
+            <a:lstStyle/>
+            <a:p>
+              <a:pPr algn="ctr"/>
+              <a:endParaRPr lang="en-US"/>
+            </a:p>
+          </p:txBody>
+        </p:sp>
+        <p:sp>
+          <p:nvSpPr>
+            <p:cNvPr id="2067" name="Freeform 2066"/>
+            <p:cNvSpPr/>
+            <p:nvPr/>
+          </p:nvSpPr>
+          <p:spPr>
+            <a:xfrm>
+              <a:off x="6085840" y="751840"/>
+              <a:ext cx="528320" cy="741680"/>
+            </a:xfrm>
+            <a:custGeom>
+              <a:avLst/>
+              <a:gdLst>
+                <a:gd name="connsiteX0" fmla="*/ 233680 w 711200"/>
+                <a:gd name="connsiteY0" fmla="*/ 518160 h 518160"/>
+                <a:gd name="connsiteX1" fmla="*/ 711200 w 711200"/>
+                <a:gd name="connsiteY1" fmla="*/ 91440 h 518160"/>
+                <a:gd name="connsiteX2" fmla="*/ 0 w 711200"/>
+                <a:gd name="connsiteY2" fmla="*/ 0 h 518160"/>
+                <a:gd name="connsiteX0" fmla="*/ 50800 w 528320"/>
+                <a:gd name="connsiteY0" fmla="*/ 741680 h 741680"/>
+                <a:gd name="connsiteX1" fmla="*/ 528320 w 528320"/>
+                <a:gd name="connsiteY1" fmla="*/ 314960 h 741680"/>
+                <a:gd name="connsiteX2" fmla="*/ 0 w 528320"/>
+                <a:gd name="connsiteY2" fmla="*/ 0 h 741680"/>
+                <a:gd name="connsiteX0" fmla="*/ 50800 w 528320"/>
+                <a:gd name="connsiteY0" fmla="*/ 741680 h 741680"/>
+                <a:gd name="connsiteX1" fmla="*/ 528320 w 528320"/>
+                <a:gd name="connsiteY1" fmla="*/ 314960 h 741680"/>
+                <a:gd name="connsiteX2" fmla="*/ 0 w 528320"/>
+                <a:gd name="connsiteY2" fmla="*/ 0 h 741680"/>
+                <a:gd name="connsiteX0" fmla="*/ 50800 w 528320"/>
+                <a:gd name="connsiteY0" fmla="*/ 741680 h 741680"/>
+                <a:gd name="connsiteX1" fmla="*/ 528320 w 528320"/>
+                <a:gd name="connsiteY1" fmla="*/ 314960 h 741680"/>
+                <a:gd name="connsiteX2" fmla="*/ 0 w 528320"/>
+                <a:gd name="connsiteY2" fmla="*/ 0 h 741680"/>
+                <a:gd name="connsiteX0" fmla="*/ 50800 w 528320"/>
+                <a:gd name="connsiteY0" fmla="*/ 741680 h 741680"/>
+                <a:gd name="connsiteX1" fmla="*/ 528320 w 528320"/>
+                <a:gd name="connsiteY1" fmla="*/ 314960 h 741680"/>
+                <a:gd name="connsiteX2" fmla="*/ 0 w 528320"/>
+                <a:gd name="connsiteY2" fmla="*/ 0 h 741680"/>
+              </a:gdLst>
+              <a:ahLst/>
+              <a:cxnLst>
+                <a:cxn ang="0">
+                  <a:pos x="connsiteX0" y="connsiteY0"/>
+                </a:cxn>
+                <a:cxn ang="0">
+                  <a:pos x="connsiteX1" y="connsiteY1"/>
+                </a:cxn>
+                <a:cxn ang="0">
+                  <a:pos x="connsiteX2" y="connsiteY2"/>
+                </a:cxn>
+              </a:cxnLst>
+              <a:rect l="l" t="t" r="r" b="b"/>
+              <a:pathLst>
+                <a:path w="528320" h="741680">
+                  <a:moveTo>
+                    <a:pt x="50800" y="741680"/>
+                  </a:moveTo>
+                  <a:cubicBezTo>
+                    <a:pt x="118533" y="528320"/>
+                    <a:pt x="226907" y="375920"/>
+                    <a:pt x="528320" y="314960"/>
+                  </a:cubicBezTo>
+                  <a:cubicBezTo>
+                    <a:pt x="453813" y="88053"/>
+                    <a:pt x="176107" y="104987"/>
+                    <a:pt x="0" y="0"/>
+                  </a:cubicBezTo>
+                </a:path>
+              </a:pathLst>
+            </a:custGeom>
             <a:noFill/>
-            <a:prstDash val="sysDot"/>
-          </a:ln>
-        </p:spPr>
-        <p:style>
-          <a:lnRef idx="2">
-            <a:schemeClr val="accent1">
-              <a:shade val="50000"/>
-            </a:schemeClr>
-          </a:lnRef>
-          <a:fillRef idx="1">
-            <a:schemeClr val="accent1"/>
-          </a:fillRef>
-          <a:effectRef idx="0">
-            <a:schemeClr val="accent1"/>
-          </a:effectRef>
-          <a:fontRef idx="minor">
-            <a:schemeClr val="lt1"/>
-          </a:fontRef>
-        </p:style>
-        <p:txBody>
-          <a:bodyPr rtlCol="0" anchor="ctr"/>
-          <a:lstStyle/>
-          <a:p>
-            <a:pPr algn="ctr"/>
-            <a:endParaRPr lang="en-US"/>
-          </a:p>
-        </p:txBody>
-      </p:sp>
-      <p:sp>
-        <p:nvSpPr>
-          <p:cNvPr id="2070" name="Freeform 2069"/>
-          <p:cNvSpPr/>
-          <p:nvPr/>
-        </p:nvSpPr>
-        <p:spPr>
-          <a:xfrm>
-            <a:off x="5872480" y="1320800"/>
-            <a:ext cx="294640" cy="182880"/>
-          </a:xfrm>
-          <a:custGeom>
-            <a:avLst/>
-            <a:gdLst>
-              <a:gd name="connsiteX0" fmla="*/ 294640 w 294640"/>
-              <a:gd name="connsiteY0" fmla="*/ 182880 h 182880"/>
-              <a:gd name="connsiteX1" fmla="*/ 0 w 294640"/>
-              <a:gd name="connsiteY1" fmla="*/ 0 h 182880"/>
-            </a:gdLst>
-            <a:ahLst/>
-            <a:cxnLst>
-              <a:cxn ang="0">
-                <a:pos x="connsiteX0" y="connsiteY0"/>
-              </a:cxn>
-              <a:cxn ang="0">
-                <a:pos x="connsiteX1" y="connsiteY1"/>
-              </a:cxn>
-            </a:cxnLst>
-            <a:rect l="l" t="t" r="r" b="b"/>
-            <a:pathLst>
-              <a:path w="294640" h="182880">
-                <a:moveTo>
-                  <a:pt x="294640" y="182880"/>
-                </a:moveTo>
-                <a:lnTo>
-                  <a:pt x="0" y="0"/>
-                </a:lnTo>
-              </a:path>
-            </a:pathLst>
-          </a:custGeom>
-          <a:noFill/>
-          <a:ln w="28575">
+            <a:ln w="28575">
+              <a:solidFill>
+                <a:schemeClr val="bg1"/>
+              </a:solidFill>
+              <a:prstDash val="solid"/>
+            </a:ln>
+          </p:spPr>
+          <p:style>
+            <a:lnRef idx="2">
+              <a:schemeClr val="accent1">
+                <a:shade val="50000"/>
+              </a:schemeClr>
+            </a:lnRef>
+            <a:fillRef idx="1">
+              <a:schemeClr val="accent1"/>
+            </a:fillRef>
+            <a:effectRef idx="0">
+              <a:schemeClr val="accent1"/>
+            </a:effectRef>
+            <a:fontRef idx="minor">
+              <a:schemeClr val="lt1"/>
+            </a:fontRef>
+          </p:style>
+          <p:txBody>
+            <a:bodyPr rtlCol="0" anchor="ctr"/>
+            <a:lstStyle/>
+            <a:p>
+              <a:pPr algn="ctr"/>
+              <a:endParaRPr lang="en-US"/>
+            </a:p>
+          </p:txBody>
+        </p:sp>
+        <p:sp>
+          <p:nvSpPr>
+            <p:cNvPr id="2059" name="Freeform 2058"/>
+            <p:cNvSpPr/>
+            <p:nvPr/>
+          </p:nvSpPr>
+          <p:spPr>
+            <a:xfrm>
+              <a:off x="5770880" y="1971040"/>
+              <a:ext cx="386080" cy="396240"/>
+            </a:xfrm>
+            <a:custGeom>
+              <a:avLst/>
+              <a:gdLst>
+                <a:gd name="connsiteX0" fmla="*/ 0 w 457200"/>
+                <a:gd name="connsiteY0" fmla="*/ 416560 h 416560"/>
+                <a:gd name="connsiteX1" fmla="*/ 457200 w 457200"/>
+                <a:gd name="connsiteY1" fmla="*/ 0 h 416560"/>
+                <a:gd name="connsiteX0" fmla="*/ 0 w 264160"/>
+                <a:gd name="connsiteY0" fmla="*/ 497840 h 497840"/>
+                <a:gd name="connsiteX1" fmla="*/ 264160 w 264160"/>
+                <a:gd name="connsiteY1" fmla="*/ 0 h 497840"/>
+                <a:gd name="connsiteX0" fmla="*/ 0 w 264160"/>
+                <a:gd name="connsiteY0" fmla="*/ 497840 h 497840"/>
+                <a:gd name="connsiteX1" fmla="*/ 264160 w 264160"/>
+                <a:gd name="connsiteY1" fmla="*/ 0 h 497840"/>
+                <a:gd name="connsiteX0" fmla="*/ 0 w 386080"/>
+                <a:gd name="connsiteY0" fmla="*/ 396240 h 396240"/>
+                <a:gd name="connsiteX1" fmla="*/ 386080 w 386080"/>
+                <a:gd name="connsiteY1" fmla="*/ 0 h 396240"/>
+                <a:gd name="connsiteX0" fmla="*/ 0 w 386080"/>
+                <a:gd name="connsiteY0" fmla="*/ 396240 h 396240"/>
+                <a:gd name="connsiteX1" fmla="*/ 386080 w 386080"/>
+                <a:gd name="connsiteY1" fmla="*/ 0 h 396240"/>
+              </a:gdLst>
+              <a:ahLst/>
+              <a:cxnLst>
+                <a:cxn ang="0">
+                  <a:pos x="connsiteX0" y="connsiteY0"/>
+                </a:cxn>
+                <a:cxn ang="0">
+                  <a:pos x="connsiteX1" y="connsiteY1"/>
+                </a:cxn>
+              </a:cxnLst>
+              <a:rect l="l" t="t" r="r" b="b"/>
+              <a:pathLst>
+                <a:path w="386080" h="396240">
+                  <a:moveTo>
+                    <a:pt x="0" y="396240"/>
+                  </a:moveTo>
+                  <a:cubicBezTo>
+                    <a:pt x="230293" y="311573"/>
+                    <a:pt x="298027" y="165947"/>
+                    <a:pt x="386080" y="0"/>
+                  </a:cubicBezTo>
+                </a:path>
+              </a:pathLst>
+            </a:custGeom>
+            <a:noFill/>
+            <a:ln w="28575">
+              <a:solidFill>
+                <a:schemeClr val="bg1"/>
+              </a:solidFill>
+              <a:prstDash val="solid"/>
+            </a:ln>
+          </p:spPr>
+          <p:style>
+            <a:lnRef idx="2">
+              <a:schemeClr val="accent1">
+                <a:shade val="50000"/>
+              </a:schemeClr>
+            </a:lnRef>
+            <a:fillRef idx="1">
+              <a:schemeClr val="accent1"/>
+            </a:fillRef>
+            <a:effectRef idx="0">
+              <a:schemeClr val="accent1"/>
+            </a:effectRef>
+            <a:fontRef idx="minor">
+              <a:schemeClr val="lt1"/>
+            </a:fontRef>
+          </p:style>
+          <p:txBody>
+            <a:bodyPr rtlCol="0" anchor="ctr"/>
+            <a:lstStyle/>
+            <a:p>
+              <a:pPr algn="ctr"/>
+              <a:endParaRPr lang="en-US"/>
+            </a:p>
+          </p:txBody>
+        </p:sp>
+        <p:sp>
+          <p:nvSpPr>
+            <p:cNvPr id="42" name="Oval 41"/>
+            <p:cNvSpPr/>
+            <p:nvPr/>
+          </p:nvSpPr>
+          <p:spPr>
+            <a:xfrm>
+              <a:off x="6106105" y="1931154"/>
+              <a:ext cx="99067" cy="99067"/>
+            </a:xfrm>
+            <a:prstGeom prst="ellipse">
+              <a:avLst/>
+            </a:prstGeom>
             <a:solidFill>
               <a:schemeClr val="bg1"/>
             </a:solidFill>
-            <a:prstDash val="sysDot"/>
-          </a:ln>
-        </p:spPr>
-        <p:style>
-          <a:lnRef idx="2">
-            <a:schemeClr val="accent1">
-              <a:shade val="50000"/>
-            </a:schemeClr>
-          </a:lnRef>
-          <a:fillRef idx="1">
-            <a:schemeClr val="accent1"/>
-          </a:fillRef>
-          <a:effectRef idx="0">
-            <a:schemeClr val="accent1"/>
-          </a:effectRef>
-          <a:fontRef idx="minor">
-            <a:schemeClr val="lt1"/>
-          </a:fontRef>
-        </p:style>
-        <p:txBody>
-          <a:bodyPr rtlCol="0" anchor="ctr"/>
-          <a:lstStyle/>
-          <a:p>
-            <a:pPr algn="ctr"/>
-            <a:endParaRPr lang="en-US"/>
-          </a:p>
-        </p:txBody>
-      </p:sp>
-      <p:sp>
-        <p:nvSpPr>
-          <p:cNvPr id="2071" name="Freeform 2070"/>
-          <p:cNvSpPr/>
-          <p:nvPr/>
-        </p:nvSpPr>
-        <p:spPr>
-          <a:xfrm>
-            <a:off x="6644640" y="1091978"/>
-            <a:ext cx="894080" cy="736821"/>
-          </a:xfrm>
-          <a:custGeom>
-            <a:avLst/>
-            <a:gdLst>
-              <a:gd name="connsiteX0" fmla="*/ 0 w 924560"/>
-              <a:gd name="connsiteY0" fmla="*/ 0 h 772160"/>
-              <a:gd name="connsiteX1" fmla="*/ 518160 w 924560"/>
-              <a:gd name="connsiteY1" fmla="*/ 304800 h 772160"/>
-              <a:gd name="connsiteX2" fmla="*/ 264160 w 924560"/>
-              <a:gd name="connsiteY2" fmla="*/ 772160 h 772160"/>
-              <a:gd name="connsiteX3" fmla="*/ 924560 w 924560"/>
-              <a:gd name="connsiteY3" fmla="*/ 477520 h 772160"/>
-              <a:gd name="connsiteX0" fmla="*/ 0 w 924560"/>
-              <a:gd name="connsiteY0" fmla="*/ 0 h 772160"/>
-              <a:gd name="connsiteX1" fmla="*/ 518160 w 924560"/>
-              <a:gd name="connsiteY1" fmla="*/ 304800 h 772160"/>
-              <a:gd name="connsiteX2" fmla="*/ 264160 w 924560"/>
-              <a:gd name="connsiteY2" fmla="*/ 772160 h 772160"/>
-              <a:gd name="connsiteX3" fmla="*/ 924560 w 924560"/>
-              <a:gd name="connsiteY3" fmla="*/ 477520 h 772160"/>
-              <a:gd name="connsiteX0" fmla="*/ 0 w 924560"/>
-              <a:gd name="connsiteY0" fmla="*/ 4523 h 776683"/>
-              <a:gd name="connsiteX1" fmla="*/ 518160 w 924560"/>
-              <a:gd name="connsiteY1" fmla="*/ 309323 h 776683"/>
-              <a:gd name="connsiteX2" fmla="*/ 264160 w 924560"/>
-              <a:gd name="connsiteY2" fmla="*/ 776683 h 776683"/>
-              <a:gd name="connsiteX3" fmla="*/ 924560 w 924560"/>
-              <a:gd name="connsiteY3" fmla="*/ 482043 h 776683"/>
-              <a:gd name="connsiteX0" fmla="*/ 0 w 894080"/>
-              <a:gd name="connsiteY0" fmla="*/ 5301 h 736821"/>
-              <a:gd name="connsiteX1" fmla="*/ 487680 w 894080"/>
-              <a:gd name="connsiteY1" fmla="*/ 269461 h 736821"/>
-              <a:gd name="connsiteX2" fmla="*/ 233680 w 894080"/>
-              <a:gd name="connsiteY2" fmla="*/ 736821 h 736821"/>
-              <a:gd name="connsiteX3" fmla="*/ 894080 w 894080"/>
-              <a:gd name="connsiteY3" fmla="*/ 442181 h 736821"/>
-              <a:gd name="connsiteX0" fmla="*/ 0 w 894080"/>
-              <a:gd name="connsiteY0" fmla="*/ 5301 h 736821"/>
-              <a:gd name="connsiteX1" fmla="*/ 487680 w 894080"/>
-              <a:gd name="connsiteY1" fmla="*/ 269461 h 736821"/>
-              <a:gd name="connsiteX2" fmla="*/ 233680 w 894080"/>
-              <a:gd name="connsiteY2" fmla="*/ 736821 h 736821"/>
-              <a:gd name="connsiteX3" fmla="*/ 894080 w 894080"/>
-              <a:gd name="connsiteY3" fmla="*/ 442181 h 736821"/>
-            </a:gdLst>
-            <a:ahLst/>
-            <a:cxnLst>
-              <a:cxn ang="0">
-                <a:pos x="connsiteX0" y="connsiteY0"/>
-              </a:cxn>
-              <a:cxn ang="0">
-                <a:pos x="connsiteX1" y="connsiteY1"/>
-              </a:cxn>
-              <a:cxn ang="0">
-                <a:pos x="connsiteX2" y="connsiteY2"/>
-              </a:cxn>
-              <a:cxn ang="0">
-                <a:pos x="connsiteX3" y="connsiteY3"/>
-              </a:cxn>
-            </a:cxnLst>
-            <a:rect l="l" t="t" r="r" b="b"/>
-            <a:pathLst>
-              <a:path w="894080" h="736821">
-                <a:moveTo>
-                  <a:pt x="0" y="5301"/>
-                </a:moveTo>
-                <a:cubicBezTo>
-                  <a:pt x="355600" y="-35339"/>
-                  <a:pt x="314960" y="167861"/>
-                  <a:pt x="487680" y="269461"/>
-                </a:cubicBezTo>
-                <a:cubicBezTo>
-                  <a:pt x="118533" y="404928"/>
-                  <a:pt x="318347" y="581034"/>
-                  <a:pt x="233680" y="736821"/>
-                </a:cubicBezTo>
-                <a:cubicBezTo>
-                  <a:pt x="585893" y="465888"/>
-                  <a:pt x="673947" y="540394"/>
-                  <a:pt x="894080" y="442181"/>
-                </a:cubicBezTo>
-              </a:path>
-            </a:pathLst>
-          </a:custGeom>
-          <a:noFill/>
-          <a:ln w="28575">
+            <a:ln w="28575">
+              <a:noFill/>
+              <a:prstDash val="sysDot"/>
+            </a:ln>
+          </p:spPr>
+          <p:style>
+            <a:lnRef idx="2">
+              <a:schemeClr val="accent1">
+                <a:shade val="50000"/>
+              </a:schemeClr>
+            </a:lnRef>
+            <a:fillRef idx="1">
+              <a:schemeClr val="accent1"/>
+            </a:fillRef>
+            <a:effectRef idx="0">
+              <a:schemeClr val="accent1"/>
+            </a:effectRef>
+            <a:fontRef idx="minor">
+              <a:schemeClr val="lt1"/>
+            </a:fontRef>
+          </p:style>
+          <p:txBody>
+            <a:bodyPr rtlCol="0" anchor="ctr"/>
+            <a:lstStyle/>
+            <a:p>
+              <a:pPr algn="ctr"/>
+              <a:endParaRPr lang="en-US"/>
+            </a:p>
+          </p:txBody>
+        </p:sp>
+        <p:sp>
+          <p:nvSpPr>
+            <p:cNvPr id="53" name="Oval 52"/>
+            <p:cNvSpPr/>
+            <p:nvPr/>
+          </p:nvSpPr>
+          <p:spPr>
+            <a:xfrm>
+              <a:off x="6049435" y="1404080"/>
+              <a:ext cx="212408" cy="212404"/>
+            </a:xfrm>
+            <a:prstGeom prst="ellipse">
+              <a:avLst/>
+            </a:prstGeom>
             <a:solidFill>
               <a:schemeClr val="bg1"/>
             </a:solidFill>
-            <a:prstDash val="sysDot"/>
-          </a:ln>
-        </p:spPr>
-        <p:style>
-          <a:lnRef idx="2">
-            <a:schemeClr val="accent1">
-              <a:shade val="50000"/>
-            </a:schemeClr>
-          </a:lnRef>
-          <a:fillRef idx="1">
-            <a:schemeClr val="accent1"/>
-          </a:fillRef>
-          <a:effectRef idx="0">
-            <a:schemeClr val="accent1"/>
-          </a:effectRef>
-          <a:fontRef idx="minor">
-            <a:schemeClr val="lt1"/>
-          </a:fontRef>
-        </p:style>
-        <p:txBody>
-          <a:bodyPr rtlCol="0" anchor="ctr"/>
-          <a:lstStyle/>
-          <a:p>
-            <a:pPr algn="ctr"/>
-            <a:endParaRPr lang="en-US"/>
-          </a:p>
-        </p:txBody>
-      </p:sp>
-      <p:sp>
-        <p:nvSpPr>
-          <p:cNvPr id="2072" name="Freeform 2071"/>
-          <p:cNvSpPr/>
-          <p:nvPr/>
-        </p:nvSpPr>
-        <p:spPr>
-          <a:xfrm>
-            <a:off x="6136640" y="1381760"/>
-            <a:ext cx="436880" cy="91440"/>
-          </a:xfrm>
-          <a:custGeom>
-            <a:avLst/>
-            <a:gdLst>
-              <a:gd name="connsiteX0" fmla="*/ 0 w 436880"/>
-              <a:gd name="connsiteY0" fmla="*/ 91440 h 91440"/>
-              <a:gd name="connsiteX1" fmla="*/ 436880 w 436880"/>
-              <a:gd name="connsiteY1" fmla="*/ 0 h 91440"/>
-            </a:gdLst>
-            <a:ahLst/>
-            <a:cxnLst>
-              <a:cxn ang="0">
-                <a:pos x="connsiteX0" y="connsiteY0"/>
-              </a:cxn>
-              <a:cxn ang="0">
-                <a:pos x="connsiteX1" y="connsiteY1"/>
-              </a:cxn>
-            </a:cxnLst>
-            <a:rect l="l" t="t" r="r" b="b"/>
-            <a:pathLst>
-              <a:path w="436880" h="91440">
-                <a:moveTo>
-                  <a:pt x="0" y="91440"/>
-                </a:moveTo>
-                <a:lnTo>
-                  <a:pt x="436880" y="0"/>
-                </a:lnTo>
-              </a:path>
-            </a:pathLst>
-          </a:custGeom>
-          <a:noFill/>
-          <a:ln w="28575">
+            <a:ln w="28575">
+              <a:noFill/>
+              <a:prstDash val="sysDot"/>
+            </a:ln>
+          </p:spPr>
+          <p:style>
+            <a:lnRef idx="2">
+              <a:schemeClr val="accent1">
+                <a:shade val="50000"/>
+              </a:schemeClr>
+            </a:lnRef>
+            <a:fillRef idx="1">
+              <a:schemeClr val="accent1"/>
+            </a:fillRef>
+            <a:effectRef idx="0">
+              <a:schemeClr val="accent1"/>
+            </a:effectRef>
+            <a:fontRef idx="minor">
+              <a:schemeClr val="lt1"/>
+            </a:fontRef>
+          </p:style>
+          <p:txBody>
+            <a:bodyPr rtlCol="0" anchor="ctr"/>
+            <a:lstStyle/>
+            <a:p>
+              <a:pPr algn="ctr"/>
+              <a:endParaRPr lang="en-US"/>
+            </a:p>
+          </p:txBody>
+        </p:sp>
+        <p:sp>
+          <p:nvSpPr>
+            <p:cNvPr id="56" name="Oval 55"/>
+            <p:cNvSpPr/>
+            <p:nvPr/>
+          </p:nvSpPr>
+          <p:spPr>
+            <a:xfrm>
+              <a:off x="6794762" y="1760473"/>
+              <a:ext cx="168234" cy="168230"/>
+            </a:xfrm>
+            <a:prstGeom prst="ellipse">
+              <a:avLst/>
+            </a:prstGeom>
             <a:solidFill>
               <a:schemeClr val="bg1"/>
             </a:solidFill>
-            <a:prstDash val="sysDot"/>
-          </a:ln>
-        </p:spPr>
-        <p:style>
-          <a:lnRef idx="2">
-            <a:schemeClr val="accent1">
-              <a:shade val="50000"/>
-            </a:schemeClr>
-          </a:lnRef>
-          <a:fillRef idx="1">
-            <a:schemeClr val="accent1"/>
-          </a:fillRef>
-          <a:effectRef idx="0">
-            <a:schemeClr val="accent1"/>
-          </a:effectRef>
-          <a:fontRef idx="minor">
-            <a:schemeClr val="lt1"/>
-          </a:fontRef>
-        </p:style>
-        <p:txBody>
-          <a:bodyPr rtlCol="0" anchor="ctr"/>
-          <a:lstStyle/>
-          <a:p>
-            <a:pPr algn="ctr"/>
-            <a:endParaRPr lang="en-US"/>
-          </a:p>
-        </p:txBody>
-      </p:sp>
-      <p:sp>
-        <p:nvSpPr>
-          <p:cNvPr id="2073" name="Freeform 2072"/>
-          <p:cNvSpPr/>
-          <p:nvPr/>
-        </p:nvSpPr>
-        <p:spPr>
-          <a:xfrm>
-            <a:off x="6039957" y="1503680"/>
-            <a:ext cx="463924" cy="467360"/>
-          </a:xfrm>
-          <a:custGeom>
-            <a:avLst/>
-            <a:gdLst>
-              <a:gd name="connsiteX0" fmla="*/ 345440 w 345440"/>
-              <a:gd name="connsiteY0" fmla="*/ 274320 h 467360"/>
-              <a:gd name="connsiteX1" fmla="*/ 40640 w 345440"/>
-              <a:gd name="connsiteY1" fmla="*/ 0 h 467360"/>
-              <a:gd name="connsiteX2" fmla="*/ 0 w 345440"/>
-              <a:gd name="connsiteY2" fmla="*/ 467360 h 467360"/>
-              <a:gd name="connsiteX0" fmla="*/ 345440 w 345440"/>
-              <a:gd name="connsiteY0" fmla="*/ 274320 h 467360"/>
-              <a:gd name="connsiteX1" fmla="*/ 40640 w 345440"/>
-              <a:gd name="connsiteY1" fmla="*/ 0 h 467360"/>
-              <a:gd name="connsiteX2" fmla="*/ 0 w 345440"/>
-              <a:gd name="connsiteY2" fmla="*/ 467360 h 467360"/>
-              <a:gd name="connsiteX0" fmla="*/ 345440 w 345440"/>
-              <a:gd name="connsiteY0" fmla="*/ 274320 h 467360"/>
-              <a:gd name="connsiteX1" fmla="*/ 40640 w 345440"/>
-              <a:gd name="connsiteY1" fmla="*/ 0 h 467360"/>
-              <a:gd name="connsiteX2" fmla="*/ 0 w 345440"/>
-              <a:gd name="connsiteY2" fmla="*/ 467360 h 467360"/>
-              <a:gd name="connsiteX0" fmla="*/ 345440 w 345440"/>
-              <a:gd name="connsiteY0" fmla="*/ 274320 h 467360"/>
-              <a:gd name="connsiteX1" fmla="*/ 40640 w 345440"/>
-              <a:gd name="connsiteY1" fmla="*/ 0 h 467360"/>
-              <a:gd name="connsiteX2" fmla="*/ 0 w 345440"/>
-              <a:gd name="connsiteY2" fmla="*/ 467360 h 467360"/>
-              <a:gd name="connsiteX0" fmla="*/ 345440 w 346922"/>
-              <a:gd name="connsiteY0" fmla="*/ 274320 h 467360"/>
-              <a:gd name="connsiteX1" fmla="*/ 40640 w 346922"/>
-              <a:gd name="connsiteY1" fmla="*/ 0 h 467360"/>
-              <a:gd name="connsiteX2" fmla="*/ 0 w 346922"/>
-              <a:gd name="connsiteY2" fmla="*/ 467360 h 467360"/>
-              <a:gd name="connsiteX0" fmla="*/ 421011 w 422493"/>
-              <a:gd name="connsiteY0" fmla="*/ 274320 h 467360"/>
-              <a:gd name="connsiteX1" fmla="*/ 116211 w 422493"/>
-              <a:gd name="connsiteY1" fmla="*/ 0 h 467360"/>
-              <a:gd name="connsiteX2" fmla="*/ 75571 w 422493"/>
-              <a:gd name="connsiteY2" fmla="*/ 467360 h 467360"/>
-              <a:gd name="connsiteX0" fmla="*/ 480516 w 481998"/>
-              <a:gd name="connsiteY0" fmla="*/ 274320 h 467360"/>
-              <a:gd name="connsiteX1" fmla="*/ 175716 w 481998"/>
-              <a:gd name="connsiteY1" fmla="*/ 0 h 467360"/>
-              <a:gd name="connsiteX2" fmla="*/ 135076 w 481998"/>
-              <a:gd name="connsiteY2" fmla="*/ 467360 h 467360"/>
-              <a:gd name="connsiteX0" fmla="*/ 462442 w 463924"/>
-              <a:gd name="connsiteY0" fmla="*/ 274320 h 467360"/>
-              <a:gd name="connsiteX1" fmla="*/ 157642 w 463924"/>
-              <a:gd name="connsiteY1" fmla="*/ 0 h 467360"/>
-              <a:gd name="connsiteX2" fmla="*/ 117002 w 463924"/>
-              <a:gd name="connsiteY2" fmla="*/ 467360 h 467360"/>
-            </a:gdLst>
-            <a:ahLst/>
-            <a:cxnLst>
-              <a:cxn ang="0">
-                <a:pos x="connsiteX0" y="connsiteY0"/>
-              </a:cxn>
-              <a:cxn ang="0">
-                <a:pos x="connsiteX1" y="connsiteY1"/>
-              </a:cxn>
-              <a:cxn ang="0">
-                <a:pos x="connsiteX2" y="connsiteY2"/>
-              </a:cxn>
-            </a:cxnLst>
-            <a:rect l="l" t="t" r="r" b="b"/>
-            <a:pathLst>
-              <a:path w="463924" h="467360">
-                <a:moveTo>
-                  <a:pt x="462442" y="274320"/>
-                </a:moveTo>
-                <a:cubicBezTo>
-                  <a:pt x="482762" y="101600"/>
-                  <a:pt x="289722" y="91440"/>
-                  <a:pt x="157642" y="0"/>
-                </a:cubicBezTo>
-                <a:cubicBezTo>
-                  <a:pt x="32335" y="145627"/>
-                  <a:pt x="-103131" y="281093"/>
-                  <a:pt x="117002" y="467360"/>
-                </a:cubicBezTo>
-              </a:path>
-            </a:pathLst>
-          </a:custGeom>
-          <a:noFill/>
-          <a:ln w="28575">
+            <a:ln w="28575">
+              <a:noFill/>
+              <a:prstDash val="sysDot"/>
+            </a:ln>
+          </p:spPr>
+          <p:style>
+            <a:lnRef idx="2">
+              <a:schemeClr val="accent1">
+                <a:shade val="50000"/>
+              </a:schemeClr>
+            </a:lnRef>
+            <a:fillRef idx="1">
+              <a:schemeClr val="accent1"/>
+            </a:fillRef>
+            <a:effectRef idx="0">
+              <a:schemeClr val="accent1"/>
+            </a:effectRef>
+            <a:fontRef idx="minor">
+              <a:schemeClr val="lt1"/>
+            </a:fontRef>
+          </p:style>
+          <p:txBody>
+            <a:bodyPr rtlCol="0" anchor="ctr"/>
+            <a:lstStyle/>
+            <a:p>
+              <a:pPr algn="ctr"/>
+              <a:endParaRPr lang="en-US"/>
+            </a:p>
+          </p:txBody>
+        </p:sp>
+        <p:sp>
+          <p:nvSpPr>
+            <p:cNvPr id="57" name="Oval 56"/>
+            <p:cNvSpPr/>
+            <p:nvPr/>
+          </p:nvSpPr>
+          <p:spPr>
+            <a:xfrm>
+              <a:off x="6461975" y="1735039"/>
+              <a:ext cx="99067" cy="99067"/>
+            </a:xfrm>
+            <a:prstGeom prst="ellipse">
+              <a:avLst/>
+            </a:prstGeom>
             <a:solidFill>
               <a:schemeClr val="bg1"/>
             </a:solidFill>
-            <a:prstDash val="sysDot"/>
-          </a:ln>
-        </p:spPr>
-        <p:style>
-          <a:lnRef idx="2">
-            <a:schemeClr val="accent1">
-              <a:shade val="50000"/>
-            </a:schemeClr>
-          </a:lnRef>
-          <a:fillRef idx="1">
-            <a:schemeClr val="accent1"/>
-          </a:fillRef>
-          <a:effectRef idx="0">
-            <a:schemeClr val="accent1"/>
-          </a:effectRef>
-          <a:fontRef idx="minor">
-            <a:schemeClr val="lt1"/>
-          </a:fontRef>
-        </p:style>
-        <p:txBody>
-          <a:bodyPr rtlCol="0" anchor="ctr"/>
-          <a:lstStyle/>
-          <a:p>
-            <a:pPr algn="ctr"/>
-            <a:endParaRPr lang="en-US"/>
-          </a:p>
-        </p:txBody>
-      </p:sp>
+            <a:ln w="28575">
+              <a:noFill/>
+              <a:prstDash val="sysDot"/>
+            </a:ln>
+          </p:spPr>
+          <p:style>
+            <a:lnRef idx="2">
+              <a:schemeClr val="accent1">
+                <a:shade val="50000"/>
+              </a:schemeClr>
+            </a:lnRef>
+            <a:fillRef idx="1">
+              <a:schemeClr val="accent1"/>
+            </a:fillRef>
+            <a:effectRef idx="0">
+              <a:schemeClr val="accent1"/>
+            </a:effectRef>
+            <a:fontRef idx="minor">
+              <a:schemeClr val="lt1"/>
+            </a:fontRef>
+          </p:style>
+          <p:txBody>
+            <a:bodyPr rtlCol="0" anchor="ctr"/>
+            <a:lstStyle/>
+            <a:p>
+              <a:pPr algn="ctr"/>
+              <a:endParaRPr lang="en-US"/>
+            </a:p>
+          </p:txBody>
+        </p:sp>
+        <p:sp>
+          <p:nvSpPr>
+            <p:cNvPr id="59" name="Oval 58"/>
+            <p:cNvSpPr/>
+            <p:nvPr/>
+          </p:nvSpPr>
+          <p:spPr>
+            <a:xfrm>
+              <a:off x="7031159" y="1296887"/>
+              <a:ext cx="172282" cy="172278"/>
+            </a:xfrm>
+            <a:prstGeom prst="ellipse">
+              <a:avLst/>
+            </a:prstGeom>
+            <a:solidFill>
+              <a:schemeClr val="bg1"/>
+            </a:solidFill>
+            <a:ln w="28575">
+              <a:noFill/>
+              <a:prstDash val="sysDot"/>
+            </a:ln>
+          </p:spPr>
+          <p:style>
+            <a:lnRef idx="2">
+              <a:schemeClr val="accent1">
+                <a:shade val="50000"/>
+              </a:schemeClr>
+            </a:lnRef>
+            <a:fillRef idx="1">
+              <a:schemeClr val="accent1"/>
+            </a:fillRef>
+            <a:effectRef idx="0">
+              <a:schemeClr val="accent1"/>
+            </a:effectRef>
+            <a:fontRef idx="minor">
+              <a:schemeClr val="lt1"/>
+            </a:fontRef>
+          </p:style>
+          <p:txBody>
+            <a:bodyPr rtlCol="0" anchor="ctr"/>
+            <a:lstStyle/>
+            <a:p>
+              <a:pPr algn="ctr"/>
+              <a:endParaRPr lang="en-US"/>
+            </a:p>
+          </p:txBody>
+        </p:sp>
+        <p:sp>
+          <p:nvSpPr>
+            <p:cNvPr id="65" name="Oval 64"/>
+            <p:cNvSpPr/>
+            <p:nvPr/>
+          </p:nvSpPr>
+          <p:spPr>
+            <a:xfrm>
+              <a:off x="6561042" y="1049522"/>
+              <a:ext cx="99067" cy="99067"/>
+            </a:xfrm>
+            <a:prstGeom prst="ellipse">
+              <a:avLst/>
+            </a:prstGeom>
+            <a:solidFill>
+              <a:schemeClr val="bg1"/>
+            </a:solidFill>
+            <a:ln w="28575">
+              <a:noFill/>
+              <a:prstDash val="sysDot"/>
+            </a:ln>
+          </p:spPr>
+          <p:style>
+            <a:lnRef idx="2">
+              <a:schemeClr val="accent1">
+                <a:shade val="50000"/>
+              </a:schemeClr>
+            </a:lnRef>
+            <a:fillRef idx="1">
+              <a:schemeClr val="accent1"/>
+            </a:fillRef>
+            <a:effectRef idx="0">
+              <a:schemeClr val="accent1"/>
+            </a:effectRef>
+            <a:fontRef idx="minor">
+              <a:schemeClr val="lt1"/>
+            </a:fontRef>
+          </p:style>
+          <p:txBody>
+            <a:bodyPr rtlCol="0" anchor="ctr"/>
+            <a:lstStyle/>
+            <a:p>
+              <a:pPr algn="ctr"/>
+              <a:endParaRPr lang="en-US"/>
+            </a:p>
+          </p:txBody>
+        </p:sp>
+        <p:sp>
+          <p:nvSpPr>
+            <p:cNvPr id="70" name="Oval 69"/>
+            <p:cNvSpPr/>
+            <p:nvPr/>
+          </p:nvSpPr>
+          <p:spPr>
+            <a:xfrm>
+              <a:off x="6490310" y="1324927"/>
+              <a:ext cx="168234" cy="168230"/>
+            </a:xfrm>
+            <a:prstGeom prst="ellipse">
+              <a:avLst/>
+            </a:prstGeom>
+            <a:solidFill>
+              <a:schemeClr val="bg1"/>
+            </a:solidFill>
+            <a:ln w="28575">
+              <a:noFill/>
+              <a:prstDash val="sysDot"/>
+            </a:ln>
+          </p:spPr>
+          <p:style>
+            <a:lnRef idx="2">
+              <a:schemeClr val="accent1">
+                <a:shade val="50000"/>
+              </a:schemeClr>
+            </a:lnRef>
+            <a:fillRef idx="1">
+              <a:schemeClr val="accent1"/>
+            </a:fillRef>
+            <a:effectRef idx="0">
+              <a:schemeClr val="accent1"/>
+            </a:effectRef>
+            <a:fontRef idx="minor">
+              <a:schemeClr val="lt1"/>
+            </a:fontRef>
+          </p:style>
+          <p:txBody>
+            <a:bodyPr rtlCol="0" anchor="ctr"/>
+            <a:lstStyle/>
+            <a:p>
+              <a:pPr algn="ctr"/>
+              <a:endParaRPr lang="en-US"/>
+            </a:p>
+          </p:txBody>
+        </p:sp>
+        <p:sp>
+          <p:nvSpPr>
+            <p:cNvPr id="81" name="Oval 80"/>
+            <p:cNvSpPr/>
+            <p:nvPr/>
+          </p:nvSpPr>
+          <p:spPr>
+            <a:xfrm>
+              <a:off x="5810100" y="1272791"/>
+              <a:ext cx="99067" cy="99067"/>
+            </a:xfrm>
+            <a:prstGeom prst="ellipse">
+              <a:avLst/>
+            </a:prstGeom>
+            <a:solidFill>
+              <a:schemeClr val="bg1"/>
+            </a:solidFill>
+            <a:ln w="28575">
+              <a:noFill/>
+              <a:prstDash val="sysDot"/>
+            </a:ln>
+          </p:spPr>
+          <p:style>
+            <a:lnRef idx="2">
+              <a:schemeClr val="accent1">
+                <a:shade val="50000"/>
+              </a:schemeClr>
+            </a:lnRef>
+            <a:fillRef idx="1">
+              <a:schemeClr val="accent1"/>
+            </a:fillRef>
+            <a:effectRef idx="0">
+              <a:schemeClr val="accent1"/>
+            </a:effectRef>
+            <a:fontRef idx="minor">
+              <a:schemeClr val="lt1"/>
+            </a:fontRef>
+          </p:style>
+          <p:txBody>
+            <a:bodyPr rtlCol="0" anchor="ctr"/>
+            <a:lstStyle/>
+            <a:p>
+              <a:pPr algn="ctr"/>
+              <a:endParaRPr lang="en-US"/>
+            </a:p>
+          </p:txBody>
+        </p:sp>
+        <p:sp>
+          <p:nvSpPr>
+            <p:cNvPr id="2070" name="Freeform 2069"/>
+            <p:cNvSpPr/>
+            <p:nvPr/>
+          </p:nvSpPr>
+          <p:spPr>
+            <a:xfrm>
+              <a:off x="5872480" y="1320800"/>
+              <a:ext cx="294640" cy="182880"/>
+            </a:xfrm>
+            <a:custGeom>
+              <a:avLst/>
+              <a:gdLst>
+                <a:gd name="connsiteX0" fmla="*/ 294640 w 294640"/>
+                <a:gd name="connsiteY0" fmla="*/ 182880 h 182880"/>
+                <a:gd name="connsiteX1" fmla="*/ 0 w 294640"/>
+                <a:gd name="connsiteY1" fmla="*/ 0 h 182880"/>
+              </a:gdLst>
+              <a:ahLst/>
+              <a:cxnLst>
+                <a:cxn ang="0">
+                  <a:pos x="connsiteX0" y="connsiteY0"/>
+                </a:cxn>
+                <a:cxn ang="0">
+                  <a:pos x="connsiteX1" y="connsiteY1"/>
+                </a:cxn>
+              </a:cxnLst>
+              <a:rect l="l" t="t" r="r" b="b"/>
+              <a:pathLst>
+                <a:path w="294640" h="182880">
+                  <a:moveTo>
+                    <a:pt x="294640" y="182880"/>
+                  </a:moveTo>
+                  <a:lnTo>
+                    <a:pt x="0" y="0"/>
+                  </a:lnTo>
+                </a:path>
+              </a:pathLst>
+            </a:custGeom>
+            <a:noFill/>
+            <a:ln w="28575">
+              <a:solidFill>
+                <a:schemeClr val="bg1"/>
+              </a:solidFill>
+              <a:prstDash val="sysDot"/>
+            </a:ln>
+          </p:spPr>
+          <p:style>
+            <a:lnRef idx="2">
+              <a:schemeClr val="accent1">
+                <a:shade val="50000"/>
+              </a:schemeClr>
+            </a:lnRef>
+            <a:fillRef idx="1">
+              <a:schemeClr val="accent1"/>
+            </a:fillRef>
+            <a:effectRef idx="0">
+              <a:schemeClr val="accent1"/>
+            </a:effectRef>
+            <a:fontRef idx="minor">
+              <a:schemeClr val="lt1"/>
+            </a:fontRef>
+          </p:style>
+          <p:txBody>
+            <a:bodyPr rtlCol="0" anchor="ctr"/>
+            <a:lstStyle/>
+            <a:p>
+              <a:pPr algn="ctr"/>
+              <a:endParaRPr lang="en-US"/>
+            </a:p>
+          </p:txBody>
+        </p:sp>
+        <p:sp>
+          <p:nvSpPr>
+            <p:cNvPr id="2071" name="Freeform 2070"/>
+            <p:cNvSpPr/>
+            <p:nvPr/>
+          </p:nvSpPr>
+          <p:spPr>
+            <a:xfrm>
+              <a:off x="6644640" y="1091978"/>
+              <a:ext cx="894080" cy="736821"/>
+            </a:xfrm>
+            <a:custGeom>
+              <a:avLst/>
+              <a:gdLst>
+                <a:gd name="connsiteX0" fmla="*/ 0 w 924560"/>
+                <a:gd name="connsiteY0" fmla="*/ 0 h 772160"/>
+                <a:gd name="connsiteX1" fmla="*/ 518160 w 924560"/>
+                <a:gd name="connsiteY1" fmla="*/ 304800 h 772160"/>
+                <a:gd name="connsiteX2" fmla="*/ 264160 w 924560"/>
+                <a:gd name="connsiteY2" fmla="*/ 772160 h 772160"/>
+                <a:gd name="connsiteX3" fmla="*/ 924560 w 924560"/>
+                <a:gd name="connsiteY3" fmla="*/ 477520 h 772160"/>
+                <a:gd name="connsiteX0" fmla="*/ 0 w 924560"/>
+                <a:gd name="connsiteY0" fmla="*/ 0 h 772160"/>
+                <a:gd name="connsiteX1" fmla="*/ 518160 w 924560"/>
+                <a:gd name="connsiteY1" fmla="*/ 304800 h 772160"/>
+                <a:gd name="connsiteX2" fmla="*/ 264160 w 924560"/>
+                <a:gd name="connsiteY2" fmla="*/ 772160 h 772160"/>
+                <a:gd name="connsiteX3" fmla="*/ 924560 w 924560"/>
+                <a:gd name="connsiteY3" fmla="*/ 477520 h 772160"/>
+                <a:gd name="connsiteX0" fmla="*/ 0 w 924560"/>
+                <a:gd name="connsiteY0" fmla="*/ 4523 h 776683"/>
+                <a:gd name="connsiteX1" fmla="*/ 518160 w 924560"/>
+                <a:gd name="connsiteY1" fmla="*/ 309323 h 776683"/>
+                <a:gd name="connsiteX2" fmla="*/ 264160 w 924560"/>
+                <a:gd name="connsiteY2" fmla="*/ 776683 h 776683"/>
+                <a:gd name="connsiteX3" fmla="*/ 924560 w 924560"/>
+                <a:gd name="connsiteY3" fmla="*/ 482043 h 776683"/>
+                <a:gd name="connsiteX0" fmla="*/ 0 w 894080"/>
+                <a:gd name="connsiteY0" fmla="*/ 5301 h 736821"/>
+                <a:gd name="connsiteX1" fmla="*/ 487680 w 894080"/>
+                <a:gd name="connsiteY1" fmla="*/ 269461 h 736821"/>
+                <a:gd name="connsiteX2" fmla="*/ 233680 w 894080"/>
+                <a:gd name="connsiteY2" fmla="*/ 736821 h 736821"/>
+                <a:gd name="connsiteX3" fmla="*/ 894080 w 894080"/>
+                <a:gd name="connsiteY3" fmla="*/ 442181 h 736821"/>
+                <a:gd name="connsiteX0" fmla="*/ 0 w 894080"/>
+                <a:gd name="connsiteY0" fmla="*/ 5301 h 736821"/>
+                <a:gd name="connsiteX1" fmla="*/ 487680 w 894080"/>
+                <a:gd name="connsiteY1" fmla="*/ 269461 h 736821"/>
+                <a:gd name="connsiteX2" fmla="*/ 233680 w 894080"/>
+                <a:gd name="connsiteY2" fmla="*/ 736821 h 736821"/>
+                <a:gd name="connsiteX3" fmla="*/ 894080 w 894080"/>
+                <a:gd name="connsiteY3" fmla="*/ 442181 h 736821"/>
+              </a:gdLst>
+              <a:ahLst/>
+              <a:cxnLst>
+                <a:cxn ang="0">
+                  <a:pos x="connsiteX0" y="connsiteY0"/>
+                </a:cxn>
+                <a:cxn ang="0">
+                  <a:pos x="connsiteX1" y="connsiteY1"/>
+                </a:cxn>
+                <a:cxn ang="0">
+                  <a:pos x="connsiteX2" y="connsiteY2"/>
+                </a:cxn>
+                <a:cxn ang="0">
+                  <a:pos x="connsiteX3" y="connsiteY3"/>
+                </a:cxn>
+              </a:cxnLst>
+              <a:rect l="l" t="t" r="r" b="b"/>
+              <a:pathLst>
+                <a:path w="894080" h="736821">
+                  <a:moveTo>
+                    <a:pt x="0" y="5301"/>
+                  </a:moveTo>
+                  <a:cubicBezTo>
+                    <a:pt x="355600" y="-35339"/>
+                    <a:pt x="314960" y="167861"/>
+                    <a:pt x="487680" y="269461"/>
+                  </a:cubicBezTo>
+                  <a:cubicBezTo>
+                    <a:pt x="118533" y="404928"/>
+                    <a:pt x="318347" y="581034"/>
+                    <a:pt x="233680" y="736821"/>
+                  </a:cubicBezTo>
+                  <a:cubicBezTo>
+                    <a:pt x="585893" y="465888"/>
+                    <a:pt x="673947" y="540394"/>
+                    <a:pt x="894080" y="442181"/>
+                  </a:cubicBezTo>
+                </a:path>
+              </a:pathLst>
+            </a:custGeom>
+            <a:noFill/>
+            <a:ln w="28575">
+              <a:solidFill>
+                <a:schemeClr val="bg1"/>
+              </a:solidFill>
+              <a:prstDash val="sysDot"/>
+            </a:ln>
+          </p:spPr>
+          <p:style>
+            <a:lnRef idx="2">
+              <a:schemeClr val="accent1">
+                <a:shade val="50000"/>
+              </a:schemeClr>
+            </a:lnRef>
+            <a:fillRef idx="1">
+              <a:schemeClr val="accent1"/>
+            </a:fillRef>
+            <a:effectRef idx="0">
+              <a:schemeClr val="accent1"/>
+            </a:effectRef>
+            <a:fontRef idx="minor">
+              <a:schemeClr val="lt1"/>
+            </a:fontRef>
+          </p:style>
+          <p:txBody>
+            <a:bodyPr rtlCol="0" anchor="ctr"/>
+            <a:lstStyle/>
+            <a:p>
+              <a:pPr algn="ctr"/>
+              <a:endParaRPr lang="en-US"/>
+            </a:p>
+          </p:txBody>
+        </p:sp>
+        <p:sp>
+          <p:nvSpPr>
+            <p:cNvPr id="2072" name="Freeform 2071"/>
+            <p:cNvSpPr/>
+            <p:nvPr/>
+          </p:nvSpPr>
+          <p:spPr>
+            <a:xfrm>
+              <a:off x="6136640" y="1381760"/>
+              <a:ext cx="436880" cy="91440"/>
+            </a:xfrm>
+            <a:custGeom>
+              <a:avLst/>
+              <a:gdLst>
+                <a:gd name="connsiteX0" fmla="*/ 0 w 436880"/>
+                <a:gd name="connsiteY0" fmla="*/ 91440 h 91440"/>
+                <a:gd name="connsiteX1" fmla="*/ 436880 w 436880"/>
+                <a:gd name="connsiteY1" fmla="*/ 0 h 91440"/>
+              </a:gdLst>
+              <a:ahLst/>
+              <a:cxnLst>
+                <a:cxn ang="0">
+                  <a:pos x="connsiteX0" y="connsiteY0"/>
+                </a:cxn>
+                <a:cxn ang="0">
+                  <a:pos x="connsiteX1" y="connsiteY1"/>
+                </a:cxn>
+              </a:cxnLst>
+              <a:rect l="l" t="t" r="r" b="b"/>
+              <a:pathLst>
+                <a:path w="436880" h="91440">
+                  <a:moveTo>
+                    <a:pt x="0" y="91440"/>
+                  </a:moveTo>
+                  <a:lnTo>
+                    <a:pt x="436880" y="0"/>
+                  </a:lnTo>
+                </a:path>
+              </a:pathLst>
+            </a:custGeom>
+            <a:noFill/>
+            <a:ln w="28575">
+              <a:solidFill>
+                <a:schemeClr val="bg1"/>
+              </a:solidFill>
+              <a:prstDash val="sysDot"/>
+            </a:ln>
+          </p:spPr>
+          <p:style>
+            <a:lnRef idx="2">
+              <a:schemeClr val="accent1">
+                <a:shade val="50000"/>
+              </a:schemeClr>
+            </a:lnRef>
+            <a:fillRef idx="1">
+              <a:schemeClr val="accent1"/>
+            </a:fillRef>
+            <a:effectRef idx="0">
+              <a:schemeClr val="accent1"/>
+            </a:effectRef>
+            <a:fontRef idx="minor">
+              <a:schemeClr val="lt1"/>
+            </a:fontRef>
+          </p:style>
+          <p:txBody>
+            <a:bodyPr rtlCol="0" anchor="ctr"/>
+            <a:lstStyle/>
+            <a:p>
+              <a:pPr algn="ctr"/>
+              <a:endParaRPr lang="en-US"/>
+            </a:p>
+          </p:txBody>
+        </p:sp>
+        <p:sp>
+          <p:nvSpPr>
+            <p:cNvPr id="2073" name="Freeform 2072"/>
+            <p:cNvSpPr/>
+            <p:nvPr/>
+          </p:nvSpPr>
+          <p:spPr>
+            <a:xfrm>
+              <a:off x="6039957" y="1503680"/>
+              <a:ext cx="463924" cy="467360"/>
+            </a:xfrm>
+            <a:custGeom>
+              <a:avLst/>
+              <a:gdLst>
+                <a:gd name="connsiteX0" fmla="*/ 345440 w 345440"/>
+                <a:gd name="connsiteY0" fmla="*/ 274320 h 467360"/>
+                <a:gd name="connsiteX1" fmla="*/ 40640 w 345440"/>
+                <a:gd name="connsiteY1" fmla="*/ 0 h 467360"/>
+                <a:gd name="connsiteX2" fmla="*/ 0 w 345440"/>
+                <a:gd name="connsiteY2" fmla="*/ 467360 h 467360"/>
+                <a:gd name="connsiteX0" fmla="*/ 345440 w 345440"/>
+                <a:gd name="connsiteY0" fmla="*/ 274320 h 467360"/>
+                <a:gd name="connsiteX1" fmla="*/ 40640 w 345440"/>
+                <a:gd name="connsiteY1" fmla="*/ 0 h 467360"/>
+                <a:gd name="connsiteX2" fmla="*/ 0 w 345440"/>
+                <a:gd name="connsiteY2" fmla="*/ 467360 h 467360"/>
+                <a:gd name="connsiteX0" fmla="*/ 345440 w 345440"/>
+                <a:gd name="connsiteY0" fmla="*/ 274320 h 467360"/>
+                <a:gd name="connsiteX1" fmla="*/ 40640 w 345440"/>
+                <a:gd name="connsiteY1" fmla="*/ 0 h 467360"/>
+                <a:gd name="connsiteX2" fmla="*/ 0 w 345440"/>
+                <a:gd name="connsiteY2" fmla="*/ 467360 h 467360"/>
+                <a:gd name="connsiteX0" fmla="*/ 345440 w 345440"/>
+                <a:gd name="connsiteY0" fmla="*/ 274320 h 467360"/>
+                <a:gd name="connsiteX1" fmla="*/ 40640 w 345440"/>
+                <a:gd name="connsiteY1" fmla="*/ 0 h 467360"/>
+                <a:gd name="connsiteX2" fmla="*/ 0 w 345440"/>
+                <a:gd name="connsiteY2" fmla="*/ 467360 h 467360"/>
+                <a:gd name="connsiteX0" fmla="*/ 345440 w 346922"/>
+                <a:gd name="connsiteY0" fmla="*/ 274320 h 467360"/>
+                <a:gd name="connsiteX1" fmla="*/ 40640 w 346922"/>
+                <a:gd name="connsiteY1" fmla="*/ 0 h 467360"/>
+                <a:gd name="connsiteX2" fmla="*/ 0 w 346922"/>
+                <a:gd name="connsiteY2" fmla="*/ 467360 h 467360"/>
+                <a:gd name="connsiteX0" fmla="*/ 421011 w 422493"/>
+                <a:gd name="connsiteY0" fmla="*/ 274320 h 467360"/>
+                <a:gd name="connsiteX1" fmla="*/ 116211 w 422493"/>
+                <a:gd name="connsiteY1" fmla="*/ 0 h 467360"/>
+                <a:gd name="connsiteX2" fmla="*/ 75571 w 422493"/>
+                <a:gd name="connsiteY2" fmla="*/ 467360 h 467360"/>
+                <a:gd name="connsiteX0" fmla="*/ 480516 w 481998"/>
+                <a:gd name="connsiteY0" fmla="*/ 274320 h 467360"/>
+                <a:gd name="connsiteX1" fmla="*/ 175716 w 481998"/>
+                <a:gd name="connsiteY1" fmla="*/ 0 h 467360"/>
+                <a:gd name="connsiteX2" fmla="*/ 135076 w 481998"/>
+                <a:gd name="connsiteY2" fmla="*/ 467360 h 467360"/>
+                <a:gd name="connsiteX0" fmla="*/ 462442 w 463924"/>
+                <a:gd name="connsiteY0" fmla="*/ 274320 h 467360"/>
+                <a:gd name="connsiteX1" fmla="*/ 157642 w 463924"/>
+                <a:gd name="connsiteY1" fmla="*/ 0 h 467360"/>
+                <a:gd name="connsiteX2" fmla="*/ 117002 w 463924"/>
+                <a:gd name="connsiteY2" fmla="*/ 467360 h 467360"/>
+              </a:gdLst>
+              <a:ahLst/>
+              <a:cxnLst>
+                <a:cxn ang="0">
+                  <a:pos x="connsiteX0" y="connsiteY0"/>
+                </a:cxn>
+                <a:cxn ang="0">
+                  <a:pos x="connsiteX1" y="connsiteY1"/>
+                </a:cxn>
+                <a:cxn ang="0">
+                  <a:pos x="connsiteX2" y="connsiteY2"/>
+                </a:cxn>
+              </a:cxnLst>
+              <a:rect l="l" t="t" r="r" b="b"/>
+              <a:pathLst>
+                <a:path w="463924" h="467360">
+                  <a:moveTo>
+                    <a:pt x="462442" y="274320"/>
+                  </a:moveTo>
+                  <a:cubicBezTo>
+                    <a:pt x="482762" y="101600"/>
+                    <a:pt x="289722" y="91440"/>
+                    <a:pt x="157642" y="0"/>
+                  </a:cubicBezTo>
+                  <a:cubicBezTo>
+                    <a:pt x="32335" y="145627"/>
+                    <a:pt x="-103131" y="281093"/>
+                    <a:pt x="117002" y="467360"/>
+                  </a:cubicBezTo>
+                </a:path>
+              </a:pathLst>
+            </a:custGeom>
+            <a:noFill/>
+            <a:ln w="28575">
+              <a:solidFill>
+                <a:schemeClr val="bg1"/>
+              </a:solidFill>
+              <a:prstDash val="sysDot"/>
+            </a:ln>
+          </p:spPr>
+          <p:style>
+            <a:lnRef idx="2">
+              <a:schemeClr val="accent1">
+                <a:shade val="50000"/>
+              </a:schemeClr>
+            </a:lnRef>
+            <a:fillRef idx="1">
+              <a:schemeClr val="accent1"/>
+            </a:fillRef>
+            <a:effectRef idx="0">
+              <a:schemeClr val="accent1"/>
+            </a:effectRef>
+            <a:fontRef idx="minor">
+              <a:schemeClr val="lt1"/>
+            </a:fontRef>
+          </p:style>
+          <p:txBody>
+            <a:bodyPr rtlCol="0" anchor="ctr"/>
+            <a:lstStyle/>
+            <a:p>
+              <a:pPr algn="ctr"/>
+              <a:endParaRPr lang="en-US"/>
+            </a:p>
+          </p:txBody>
+        </p:sp>
+      </p:grpSp>
       <p:pic>
         <p:nvPicPr>
           <p:cNvPr id="88" name="Picture 87"/>
@@ -9960,10 +9778,33 @@
           </a:prstGeom>
         </p:spPr>
       </p:pic>
+      <p:pic>
+        <p:nvPicPr>
+          <p:cNvPr id="2078" name="Picture 2077"/>
+          <p:cNvPicPr>
+            <a:picLocks noChangeAspect="1"/>
+          </p:cNvPicPr>
+          <p:nvPr/>
+        </p:nvPicPr>
+        <p:blipFill rotWithShape="1">
+          <a:blip r:embed="rId5"/>
+          <a:srcRect t="14863" r="4921" b="11425"/>
+          <a:stretch/>
+        </p:blipFill>
+        <p:spPr>
+          <a:xfrm>
+            <a:off x="6009474" y="4000817"/>
+            <a:ext cx="1907044" cy="1402080"/>
+          </a:xfrm>
+          <a:prstGeom prst="rect">
+            <a:avLst/>
+          </a:prstGeom>
+        </p:spPr>
+      </p:pic>
     </p:spTree>
     <p:extLst>
       <p:ext uri="{BB962C8B-B14F-4D97-AF65-F5344CB8AC3E}">
-        <p14:creationId xmlns:p14="http://schemas.microsoft.com/office/powerpoint/2010/main" val="3344291435"/>
+        <p14:creationId xmlns:p14="http://schemas.microsoft.com/office/powerpoint/2010/main" val="47033971"/>
       </p:ext>
     </p:extLst>
   </p:cSld>

</xml_diff>